<commit_message>
Live Lecture 9 update
</commit_message>
<xml_diff>
--- a/lectures/lecture-08/Lecture-Live/Lecture 08 - Lecture.pptx
+++ b/lectures/lecture-08/Lecture-Live/Lecture 08 - Lecture.pptx
@@ -149,6 +149,1001 @@
     </p:ext>
   </p:extLst>
 </p:presentation>
+</file>
+
+<file path=ppt/ink/ink1.xml><?xml version="1.0" encoding="utf-8"?>
+<inkml:ink xmlns:inkml="http://www.w3.org/2003/InkML">
+  <inkml:definitions>
+    <inkml:context xml:id="ctx0">
+      <inkml:inkSource xml:id="inkSrc0">
+        <inkml:traceFormat>
+          <inkml:channel name="X" type="integer" min="-2.14748E9" max="2.14748E9" units="cm"/>
+          <inkml:channel name="Y" type="integer" min="-2.14748E9" max="2.14748E9" units="cm"/>
+          <inkml:channel name="F" type="integer" max="32767" units="dev"/>
+          <inkml:channel name="OA" type="integer" max="360" units="deg"/>
+          <inkml:channel name="OE" type="integer" max="90" units="deg"/>
+        </inkml:traceFormat>
+        <inkml:channelProperties>
+          <inkml:channelProperty channel="X" name="resolution" value="1000" units="1/cm"/>
+          <inkml:channelProperty channel="Y" name="resolution" value="1000" units="1/cm"/>
+          <inkml:channelProperty channel="F" name="resolution" value="0" units="1/dev"/>
+          <inkml:channelProperty channel="OA" name="resolution" value="1000" units="1/deg"/>
+          <inkml:channelProperty channel="OE" name="resolution" value="1000" units="1/deg"/>
+        </inkml:channelProperties>
+      </inkml:inkSource>
+      <inkml:timestamp xml:id="ts0" timeString="2021-04-14T19:00:27.677"/>
+    </inkml:context>
+    <inkml:brush xml:id="br0">
+      <inkml:brushProperty name="width" value="0.05" units="cm"/>
+      <inkml:brushProperty name="height" value="0.05" units="cm"/>
+      <inkml:brushProperty name="color" value="#E71224"/>
+    </inkml:brush>
+  </inkml:definitions>
+  <inkml:trace contextRef="#ctx0" brushRef="#br0">271 78 10104 0 0,'-2'-20'1096'0'0,"-2"6"414"0"0,4 11-809 0 0,0 0 0 0 0,-1 0 0 0 0,0 0 0 0 0,0-1 0 0 0,0 1 0 0 0,0 0 0 0 0,0 0 0 0 0,-1 0 0 0 0,1 0 0 0 0,-1 1 0 0 0,0-1 0 0 0,-4-4 2604 0 0,5 9-3196 0 0,0-1-1 0 0,0 1 0 0 0,0-1 1 0 0,0 1-1 0 0,0-1 0 0 0,-1 0 1 0 0,1 1-1 0 0,0-1 0 0 0,-3 1 1 0 0,0 3-1 0 0,1-2-71 0 0,1 1-1 0 0,1-1 0 0 0,-1 1 1 0 0,0 0-1 0 0,1 0 0 0 0,-1 5 1 0 0,-4 8-16 0 0,-15 48-21 0 0,-21 108 0 0 0,16-55 0 0 0,14-71 26 0 0,-16 74 156 0 0,28-120-175 0 0,0-1-1 0 0,0 0 0 0 0,0 0 1 0 0,0 0-1 0 0,0 0 0 0 0,0 0 1 0 0,0 1-1 0 0,0-1 0 0 0,-1 0 1 0 0,1 0-1 0 0,0 0 0 0 0,0 0 1 0 0,0 0-1 0 0,0 1 0 0 0,0-1 1 0 0,0 0-1 0 0,0 0 0 0 0,0 0 1 0 0,0 0-1 0 0,0 0 0 0 0,0 0 1 0 0,0 1-1 0 0,-1-1 0 0 0,1 0 1 0 0,0 0-1 0 0,0 0 0 0 0,0 0 1 0 0,0 0-1 0 0,0 0 0 0 0,0 0 1 0 0,-1 0-1 0 0,1 0 0 0 0,0 0 1 0 0,0 0-1 0 0,0 0 0 0 0,0 0 1 0 0,-1 0-1 0 0,1 1 0 0 0,0-1 1 0 0,-6-5 123 0 0,-5-11 17 0 0,10 15-110 0 0,-4-8 21 0 0,1 0 0 0 0,0-1-1 0 0,0 1 1 0 0,-3-15 0 0 0,0 0 45 0 0,3 1-1 0 0,3 19-56 0 0,1 1 0 0 0,-1-1-1 0 0,0 1 1 0 0,0-1 0 0 0,-2-5-1 0 0,2 7-15 0 0,-1-3 74 0 0,1 9-28 0 0,0 4-70 0 0,-4 27-22 0 0,2-1 0 0 0,1 0 0 0 0,3 43 0 0 0,5-34 16 0 0,-5-39 0 0 0,0 0 0 0 0,0-1 0 0 0,0 0 0 0 0,1 1 0 0 0,-1-1 0 0 0,1 0 0 0 0,0 1 0 0 0,0-1 0 0 0,4 5 0 0 0,-5-7 12 0 0,1 0-1 0 0,-1 0 1 0 0,0 0-1 0 0,1 0 1 0 0,0 0-1 0 0,-1 0 1 0 0,1 0-1 0 0,0 0 1 0 0,-1-1-1 0 0,1 1 1 0 0,0-1-1 0 0,0 1 1 0 0,-1-1-1 0 0,1 0 1 0 0,0 1-1 0 0,0-1 1 0 0,0 0-1 0 0,-1 0 1 0 0,1-1-1 0 0,0 1 1 0 0,0 0-1 0 0,0-1 1 0 0,-1 1-1 0 0,1-1 1 0 0,0 1 0 0 0,3-2-1 0 0,3-3 108 0 0,1 1-1 0 0,-1-1 1 0 0,15-12 0 0 0,-10 7-41 0 0,9-7 39 0 0,-15 11-91 0 0,0 0 0 0 0,0 1 0 0 0,13-7 0 0 0,65-27-212 0 0,-25 19-4337 0 0,-51 17 2571 0 0</inkml:trace>
+</inkml:ink>
+</file>
+
+<file path=ppt/ink/ink10.xml><?xml version="1.0" encoding="utf-8"?>
+<inkml:ink xmlns:inkml="http://www.w3.org/2003/InkML">
+  <inkml:definitions>
+    <inkml:context xml:id="ctx0">
+      <inkml:inkSource xml:id="inkSrc0">
+        <inkml:traceFormat>
+          <inkml:channel name="X" type="integer" min="-2.14748E9" max="2.14748E9" units="cm"/>
+          <inkml:channel name="Y" type="integer" min="-2.14748E9" max="2.14748E9" units="cm"/>
+          <inkml:channel name="F" type="integer" max="32767" units="dev"/>
+          <inkml:channel name="OA" type="integer" max="360" units="deg"/>
+          <inkml:channel name="OE" type="integer" max="90" units="deg"/>
+        </inkml:traceFormat>
+        <inkml:channelProperties>
+          <inkml:channelProperty channel="X" name="resolution" value="1000" units="1/cm"/>
+          <inkml:channelProperty channel="Y" name="resolution" value="1000" units="1/cm"/>
+          <inkml:channelProperty channel="F" name="resolution" value="0" units="1/dev"/>
+          <inkml:channelProperty channel="OA" name="resolution" value="1000" units="1/deg"/>
+          <inkml:channelProperty channel="OE" name="resolution" value="1000" units="1/deg"/>
+        </inkml:channelProperties>
+      </inkml:inkSource>
+      <inkml:timestamp xml:id="ts0" timeString="2021-04-14T19:00:38.797"/>
+    </inkml:context>
+    <inkml:brush xml:id="br0">
+      <inkml:brushProperty name="width" value="0.05" units="cm"/>
+      <inkml:brushProperty name="height" value="0.05" units="cm"/>
+      <inkml:brushProperty name="color" value="#E71224"/>
+    </inkml:brush>
+  </inkml:definitions>
+  <inkml:trace contextRef="#ctx0" brushRef="#br0">0 451 5064 0 0,'0'0'11390'0'0,"8"-13"-6815"0"0,17-86 1440 0 0,-19 68-5199 0 0,1 1-1 0 0,12-30 1 0 0,-3 17-640 0 0,-6 15-85 0 0,1 0 0 0 0,2 1 0 0 0,27-45 0 0 0,-26 57 261 0 0,-8 11-320 0 0,2 4-43 0 0,-6 2 4 0 0,1-1 0 0 0,-1 1-1 0 0,0 0 1 0 0,0 0-1 0 0,0 0 1 0 0,0 0 0 0 0,0 0-1 0 0,0 0 1 0 0,-1 0 0 0 0,1 1-1 0 0,-1-1 1 0 0,0 0-1 0 0,2 5 1 0 0,1 1-15 0 0,-1 0-1 0 0,4 17 1 0 0,7 42 16 0 0,5 73 1 0 0,-17-120-145 0 0,-1-13-10 0 0,0-1 1 0 0,0 0-1 0 0,-1 1 1 0 0,0-1-1 0 0,0 0 0 0 0,0 1 1 0 0,-1-1-1 0 0,0 0 1 0 0,0 1-1 0 0,-1-1 0 0 0,-2 7 1 0 0,4-13 7 0 0,0 1 1 0 0,-1-1-1 0 0,1 1 1 0 0,0-1-1 0 0,0 0 1 0 0,-1 1-1 0 0,1-1 1 0 0,0 1-1 0 0,-1-1 1 0 0,1 0-1 0 0,0 1 1 0 0,-1-1-1 0 0,1 0 1 0 0,0 0-1 0 0,-1 1 1 0 0,1-1-1 0 0,-1 0 1 0 0,1 0-1 0 0,0 1 1 0 0,-1-1-1 0 0,1 0 1 0 0,-1 0-1 0 0,1 0 1 0 0,-1 0-1 0 0,1 0 1 0 0,-1 0-1 0 0,1 0 1 0 0,-1 0-1 0 0,1 0 1 0 0,-1 0-1 0 0,1 0 1 0 0,-1 0-1 0 0,1 0 1 0 0,-1 0-1 0 0</inkml:trace>
+</inkml:ink>
+</file>
+
+<file path=ppt/ink/ink11.xml><?xml version="1.0" encoding="utf-8"?>
+<inkml:ink xmlns:inkml="http://www.w3.org/2003/InkML">
+  <inkml:definitions>
+    <inkml:context xml:id="ctx0">
+      <inkml:inkSource xml:id="inkSrc0">
+        <inkml:traceFormat>
+          <inkml:channel name="X" type="integer" min="-2.14748E9" max="2.14748E9" units="cm"/>
+          <inkml:channel name="Y" type="integer" min="-2.14748E9" max="2.14748E9" units="cm"/>
+          <inkml:channel name="F" type="integer" max="32767" units="dev"/>
+          <inkml:channel name="OA" type="integer" max="360" units="deg"/>
+          <inkml:channel name="OE" type="integer" max="90" units="deg"/>
+        </inkml:traceFormat>
+        <inkml:channelProperties>
+          <inkml:channelProperty channel="X" name="resolution" value="1000" units="1/cm"/>
+          <inkml:channelProperty channel="Y" name="resolution" value="1000" units="1/cm"/>
+          <inkml:channelProperty channel="F" name="resolution" value="0" units="1/dev"/>
+          <inkml:channelProperty channel="OA" name="resolution" value="1000" units="1/deg"/>
+          <inkml:channelProperty channel="OE" name="resolution" value="1000" units="1/deg"/>
+        </inkml:channelProperties>
+      </inkml:inkSource>
+      <inkml:timestamp xml:id="ts0" timeString="2021-04-14T19:00:39.137"/>
+    </inkml:context>
+    <inkml:brush xml:id="br0">
+      <inkml:brushProperty name="width" value="0.05" units="cm"/>
+      <inkml:brushProperty name="height" value="0.05" units="cm"/>
+      <inkml:brushProperty name="color" value="#E71224"/>
+    </inkml:brush>
+  </inkml:definitions>
+  <inkml:trace contextRef="#ctx0" brushRef="#br0">0 1 11056 0 0,'0'0'505'0'0,"5"5"170"0"0,-2-2-230 0 0,0 1 1 0 0,1-1 0 0 0,-1-1 0 0 0,1 1-1 0 0,-1 0 1 0 0,1-1 0 0 0,0 0 0 0 0,6 3 0 0 0,36 11 6580 0 0,-6-4-6598 0 0,-38-11-541 0 0,0 0-1 0 0,0 0 1 0 0,0-1 0 0 0,0 1 0 0 0,0-1-1 0 0,0 1 1 0 0,0-1 0 0 0,1 0 0 0 0,-1 0-1 0 0,0 0 1 0 0,0 0 0 0 0,0-1 0 0 0,1 1 0 0 0,-1 0-1 0 0,3-2 1 0 0,6 0-1002 0 0</inkml:trace>
+</inkml:ink>
+</file>
+
+<file path=ppt/ink/ink12.xml><?xml version="1.0" encoding="utf-8"?>
+<inkml:ink xmlns:inkml="http://www.w3.org/2003/InkML">
+  <inkml:definitions>
+    <inkml:context xml:id="ctx0">
+      <inkml:inkSource xml:id="inkSrc0">
+        <inkml:traceFormat>
+          <inkml:channel name="X" type="integer" min="-2.14748E9" max="2.14748E9" units="cm"/>
+          <inkml:channel name="Y" type="integer" min="-2.14748E9" max="2.14748E9" units="cm"/>
+          <inkml:channel name="F" type="integer" max="32767" units="dev"/>
+          <inkml:channel name="OA" type="integer" max="360" units="deg"/>
+          <inkml:channel name="OE" type="integer" max="90" units="deg"/>
+        </inkml:traceFormat>
+        <inkml:channelProperties>
+          <inkml:channelProperty channel="X" name="resolution" value="1000" units="1/cm"/>
+          <inkml:channelProperty channel="Y" name="resolution" value="1000" units="1/cm"/>
+          <inkml:channelProperty channel="F" name="resolution" value="0" units="1/dev"/>
+          <inkml:channelProperty channel="OA" name="resolution" value="1000" units="1/deg"/>
+          <inkml:channelProperty channel="OE" name="resolution" value="1000" units="1/deg"/>
+        </inkml:channelProperties>
+      </inkml:inkSource>
+      <inkml:timestamp xml:id="ts0" timeString="2021-04-14T19:00:39.512"/>
+    </inkml:context>
+    <inkml:brush xml:id="br0">
+      <inkml:brushProperty name="width" value="0.05" units="cm"/>
+      <inkml:brushProperty name="height" value="0.05" units="cm"/>
+      <inkml:brushProperty name="color" value="#E71224"/>
+    </inkml:brush>
+  </inkml:definitions>
+  <inkml:trace contextRef="#ctx0" brushRef="#br0">81 1 6912 0 0,'-5'0'608'0'0,"2"0"-480"0"0,-5 0-128 0 0,1 0 0 0 0,2 0 1872 0 0,-3 2 352 0 0,0 0 72 0 0,1-2 8 0 0,-1 0-1321 0 0,0 0-271 0 0,2 0-48 0 0,0 0 272 0 0,4-2-512 0 0</inkml:trace>
+</inkml:ink>
+</file>
+
+<file path=ppt/ink/ink13.xml><?xml version="1.0" encoding="utf-8"?>
+<inkml:ink xmlns:inkml="http://www.w3.org/2003/InkML">
+  <inkml:definitions>
+    <inkml:context xml:id="ctx0">
+      <inkml:inkSource xml:id="inkSrc0">
+        <inkml:traceFormat>
+          <inkml:channel name="X" type="integer" min="-2.14748E9" max="2.14748E9" units="cm"/>
+          <inkml:channel name="Y" type="integer" min="-2.14748E9" max="2.14748E9" units="cm"/>
+          <inkml:channel name="F" type="integer" max="32767" units="dev"/>
+          <inkml:channel name="OA" type="integer" max="360" units="deg"/>
+          <inkml:channel name="OE" type="integer" max="90" units="deg"/>
+        </inkml:traceFormat>
+        <inkml:channelProperties>
+          <inkml:channelProperty channel="X" name="resolution" value="1000" units="1/cm"/>
+          <inkml:channelProperty channel="Y" name="resolution" value="1000" units="1/cm"/>
+          <inkml:channelProperty channel="F" name="resolution" value="0" units="1/dev"/>
+          <inkml:channelProperty channel="OA" name="resolution" value="1000" units="1/deg"/>
+          <inkml:channelProperty channel="OE" name="resolution" value="1000" units="1/deg"/>
+        </inkml:channelProperties>
+      </inkml:inkSource>
+      <inkml:timestamp xml:id="ts0" timeString="2021-04-14T19:00:52.646"/>
+    </inkml:context>
+    <inkml:brush xml:id="br0">
+      <inkml:brushProperty name="width" value="0.05" units="cm"/>
+      <inkml:brushProperty name="height" value="0.05" units="cm"/>
+      <inkml:brushProperty name="color" value="#E71224"/>
+    </inkml:brush>
+  </inkml:definitions>
+  <inkml:trace contextRef="#ctx0" brushRef="#br0">17 53 2304 0 0,'-15'2'14040'0'0,"15"-3"-13957"0"0,0 1 1 0 0,0-1-1 0 0,-1 1 1 0 0,1-1-1 0 0,0 1 1 0 0,0-1-1 0 0,0 1 1 0 0,0-1-1 0 0,0 1 1 0 0,0-1-1 0 0,-1 1 1 0 0,1-1-1 0 0,1 0 1 0 0,-1 1-1 0 0,0-1 1 0 0,0 1-1 0 0,0-1 1 0 0,0 1-1 0 0,0-1 1 0 0,0 1 0 0 0,1-1-1 0 0,-1 1 1 0 0,0-1-1 0 0,0 1 1 0 0,1-1-1 0 0,-1 1 1 0 0,0-1-1 0 0,1 1 1 0 0,-1-1-1 0 0,1 0 1 0 0,17-11 474 0 0,-9 9 16 0 0,0 0 0 0 0,0 2 0 0 0,1-1 0 0 0,-1 1 0 0 0,1 0 0 0 0,13 1 0 0 0,-9 0-385 0 0,-4 0-54 0 0,1 0 0 0 0,21 3 0 0 0,-18-1 9 0 0,1 0 0 0 0,16-1-1 0 0,2 0 162 0 0,162 6 461 0 0,-159-8-704 0 0,37 2 36 0 0,139 21 158 0 0,-116-10-508 0 0,184 19 989 0 0,-216-28-429 0 0,1-2 1 0 0,89-11-1 0 0,-80 1-66 0 0,190-19 412 0 0,-124 30-432 0 0,-42 1-76 0 0,-58-3 137 0 0,0-1-1 0 0,58-10 1 0 0,-10-7 161 0 0,-85 18-449 0 0,0-1-1 0 0,-1 0 0 0 0,1 1 1 0 0,0-1-1 0 0,0 0 1 0 0,-1-1-1 0 0,1 1 1 0 0,-1 0-1 0 0,1-1 1 0 0,-1 1-1 0 0,1-1 0 0 0,-1 0 1 0 0,4-4-1 0 0,-5 5-7 0 0,3-4-2790 0 0</inkml:trace>
+</inkml:ink>
+</file>
+
+<file path=ppt/ink/ink14.xml><?xml version="1.0" encoding="utf-8"?>
+<inkml:ink xmlns:inkml="http://www.w3.org/2003/InkML">
+  <inkml:definitions>
+    <inkml:context xml:id="ctx0">
+      <inkml:inkSource xml:id="inkSrc0">
+        <inkml:traceFormat>
+          <inkml:channel name="X" type="integer" min="-2.14748E9" max="2.14748E9" units="cm"/>
+          <inkml:channel name="Y" type="integer" min="-2.14748E9" max="2.14748E9" units="cm"/>
+          <inkml:channel name="F" type="integer" max="32767" units="dev"/>
+          <inkml:channel name="OA" type="integer" max="360" units="deg"/>
+          <inkml:channel name="OE" type="integer" max="90" units="deg"/>
+        </inkml:traceFormat>
+        <inkml:channelProperties>
+          <inkml:channelProperty channel="X" name="resolution" value="1000" units="1/cm"/>
+          <inkml:channelProperty channel="Y" name="resolution" value="1000" units="1/cm"/>
+          <inkml:channelProperty channel="F" name="resolution" value="0" units="1/dev"/>
+          <inkml:channelProperty channel="OA" name="resolution" value="1000" units="1/deg"/>
+          <inkml:channelProperty channel="OE" name="resolution" value="1000" units="1/deg"/>
+        </inkml:channelProperties>
+      </inkml:inkSource>
+      <inkml:timestamp xml:id="ts0" timeString="2021-04-14T19:01:00.987"/>
+    </inkml:context>
+    <inkml:brush xml:id="br0">
+      <inkml:brushProperty name="width" value="0.05" units="cm"/>
+      <inkml:brushProperty name="height" value="0.05" units="cm"/>
+      <inkml:brushProperty name="color" value="#E71224"/>
+    </inkml:brush>
+  </inkml:definitions>
+  <inkml:trace contextRef="#ctx0" brushRef="#br0">2 105 3224 0 0,'-2'-28'18532'0'0,"2"28"-18401"0"0,49 5 1501 0 0,-26-4-860 0 0,31 6 0 0 0,-20-3-416 0 0,-21-3-262 0 0,0 1 0 0 0,23 6 0 0 0,-21-4 52 0 0,31 3 0 0 0,-6 0-30 0 0,-37-7-107 0 0,1 0 1 0 0,0 1 0 0 0,0-1 0 0 0,0 0 0 0 0,-1-1 0 0 0,6 0 0 0 0,16-1 49 0 0,-24 2-60 0 0,7 1 32 0 0,0 0 0 0 0,1-1-1 0 0,14-1 1 0 0,111-10 731 0 0,-100 6-395 0 0,-17 2-479 0 0,0 1 0 0 0,1 0-1 0 0,29 1 1 0 0,-37 2 146 0 0,0-1 0 0 0,20-3 0 0 0,-20 1 6 0 0,1 1 0 0 0,20 1 0 0 0,-9 1 9 0 0,33-3 1 0 0,-9 0-11 0 0,104-6 51 0 0,-65 2-52 0 0,63-7 79 0 0,-18 6 26 0 0,61 12 160 0 0,-146-2-222 0 0,-29-1 13 0 0,30-2 0 0 0,137-5 359 0 0,-169 5-394 0 0,57-5 223 0 0,-1 0 60 0 0,29 3-25 0 0,-79 2-238 0 0,-12 1-15 0 0,-1-1 0 0 0,0 0 0 0 0,0 0 0 0 0,0-1 0 0 0,0 0 0 0 0,14-3 0 0 0,-20 4 12 0 0,10-12 908 0 0,-6-12-2289 0 0,9 17-4651 0 0</inkml:trace>
+</inkml:ink>
+</file>
+
+<file path=ppt/ink/ink15.xml><?xml version="1.0" encoding="utf-8"?>
+<inkml:ink xmlns:inkml="http://www.w3.org/2003/InkML">
+  <inkml:definitions>
+    <inkml:context xml:id="ctx0">
+      <inkml:inkSource xml:id="inkSrc0">
+        <inkml:traceFormat>
+          <inkml:channel name="X" type="integer" min="-2.14748E9" max="2.14748E9" units="cm"/>
+          <inkml:channel name="Y" type="integer" min="-2.14748E9" max="2.14748E9" units="cm"/>
+          <inkml:channel name="F" type="integer" max="32767" units="dev"/>
+          <inkml:channel name="OA" type="integer" max="360" units="deg"/>
+          <inkml:channel name="OE" type="integer" max="90" units="deg"/>
+        </inkml:traceFormat>
+        <inkml:channelProperties>
+          <inkml:channelProperty channel="X" name="resolution" value="1000" units="1/cm"/>
+          <inkml:channelProperty channel="Y" name="resolution" value="1000" units="1/cm"/>
+          <inkml:channelProperty channel="F" name="resolution" value="0" units="1/dev"/>
+          <inkml:channelProperty channel="OA" name="resolution" value="1000" units="1/deg"/>
+          <inkml:channelProperty channel="OE" name="resolution" value="1000" units="1/deg"/>
+        </inkml:channelProperties>
+      </inkml:inkSource>
+      <inkml:timestamp xml:id="ts0" timeString="2021-04-14T19:01:04.296"/>
+    </inkml:context>
+    <inkml:brush xml:id="br0">
+      <inkml:brushProperty name="width" value="0.05" units="cm"/>
+      <inkml:brushProperty name="height" value="0.05" units="cm"/>
+      <inkml:brushProperty name="color" value="#E71224"/>
+    </inkml:brush>
+  </inkml:definitions>
+  <inkml:trace contextRef="#ctx0" brushRef="#br0">62 39 15664 0 0,'-6'0'223'0'0,"1"1"1"0"0,-1-1 0 0 0,0 1 0 0 0,0 1 0 0 0,0-1-1 0 0,1 1 1 0 0,-10 3 0 0 0,14-4-147 0 0,1-1-1 0 0,0 0 1 0 0,-1 0 0 0 0,1 0 0 0 0,0 0-1 0 0,-1 1 1 0 0,1-1 0 0 0,0 0-1 0 0,0 0 1 0 0,-1 1 0 0 0,1-1-1 0 0,0 0 1 0 0,0 0 0 0 0,-1 1-1 0 0,1-1 1 0 0,0 0 0 0 0,0 1-1 0 0,0-1 1 0 0,0 0 0 0 0,-1 1-1 0 0,1-1 1 0 0,0 0 0 0 0,0 1-1 0 0,0-1 1 0 0,0 0 0 0 0,0 1-1 0 0,0-1 1 0 0,0 0 0 0 0,0 1-1 0 0,0-1 1 0 0,0 0 0 0 0,0 1-1 0 0,0-1 1 0 0,0 1 0 0 0,0-1-1 0 0,1 0 1 0 0,-1 1 0 0 0,0-1-1 0 0,0 0 1 0 0,0 1 0 0 0,0-1 0 0 0,1 0-1 0 0,-1 0 1 0 0,0 1 0 0 0,0-1-1 0 0,0 0 1 0 0,1 0 0 0 0,-1 1-1 0 0,0-1 1 0 0,1 0 0 0 0,-1 0-1 0 0,0 0 1 0 0,1 1 0 0 0,-1-1-1 0 0,0 0 1 0 0,1 0 0 0 0,-1 0-1 0 0,0 0 1 0 0,1 0 0 0 0,0 1-1 0 0,22 5 272 0 0,-8-6-99 0 0,-1 0 0 0 0,1-2 0 0 0,-1 0-1 0 0,1 0 1 0 0,27-10 0 0 0,-5 3 264 0 0,-8 0-938 0 0,-1 0 1 0 0,35-18-1 0 0,-61 26-9 0 0</inkml:trace>
+</inkml:ink>
+</file>
+
+<file path=ppt/ink/ink16.xml><?xml version="1.0" encoding="utf-8"?>
+<inkml:ink xmlns:inkml="http://www.w3.org/2003/InkML">
+  <inkml:definitions>
+    <inkml:context xml:id="ctx0">
+      <inkml:inkSource xml:id="inkSrc0">
+        <inkml:traceFormat>
+          <inkml:channel name="X" type="integer" min="-2.14748E9" max="2.14748E9" units="cm"/>
+          <inkml:channel name="Y" type="integer" min="-2.14748E9" max="2.14748E9" units="cm"/>
+          <inkml:channel name="F" type="integer" max="32767" units="dev"/>
+          <inkml:channel name="OA" type="integer" max="360" units="deg"/>
+          <inkml:channel name="OE" type="integer" max="90" units="deg"/>
+        </inkml:traceFormat>
+        <inkml:channelProperties>
+          <inkml:channelProperty channel="X" name="resolution" value="1000" units="1/cm"/>
+          <inkml:channelProperty channel="Y" name="resolution" value="1000" units="1/cm"/>
+          <inkml:channelProperty channel="F" name="resolution" value="0" units="1/dev"/>
+          <inkml:channelProperty channel="OA" name="resolution" value="1000" units="1/deg"/>
+          <inkml:channelProperty channel="OE" name="resolution" value="1000" units="1/deg"/>
+        </inkml:channelProperties>
+      </inkml:inkSource>
+      <inkml:timestamp xml:id="ts0" timeString="2021-04-14T19:01:04.672"/>
+    </inkml:context>
+    <inkml:brush xml:id="br0">
+      <inkml:brushProperty name="width" value="0.05" units="cm"/>
+      <inkml:brushProperty name="height" value="0.05" units="cm"/>
+      <inkml:brushProperty name="color" value="#E71224"/>
+    </inkml:brush>
+  </inkml:definitions>
+  <inkml:trace contextRef="#ctx0" brushRef="#br0">305 1 3224 0 0,'-3'3'-356'0'0,"-12"12"2704"0"0,10-10 671 0 0,1 0 0 0 0,0 0-1 0 0,0 1 1 0 0,-6 10 0 0 0,4-3-955 0 0,2 3-3484 0 0,-51 250 2277 0 0,5-18-231 0 0,7-70-91 0 0,-30 140 460 0 0,67-288-898 0 0,-10 72 212 0 0,13-74-247 0 0,1-19-2 0 0,1 0 0 0 0,1 0 0 0 0,-1 0 0 0 0,2 9 0 0 0,-1-15-42 0 0,1 0-1 0 0,0 0 0 0 0,-1 0 1 0 0,1 0-1 0 0,0 0 1 0 0,0 0-1 0 0,1-1 0 0 0,-1 1 1 0 0,1 0-1 0 0,-1-1 1 0 0,1 1-1 0 0,0-1 1 0 0,0 0-1 0 0,0 0 0 0 0,0 1 1 0 0,3 1-1 0 0,1 0-6 0 0,1 1 0 0 0,-1-2 0 0 0,1 1-1 0 0,0-1 1 0 0,0 0 0 0 0,9 3 0 0 0,46 9 41 0 0,-56-13-52 0 0,107 18-2406 0 0,-59-14-1493 0 0,63 0-1 0 0,-86-6-2574 0 0</inkml:trace>
+</inkml:ink>
+</file>
+
+<file path=ppt/ink/ink17.xml><?xml version="1.0" encoding="utf-8"?>
+<inkml:ink xmlns:inkml="http://www.w3.org/2003/InkML">
+  <inkml:definitions>
+    <inkml:context xml:id="ctx0">
+      <inkml:inkSource xml:id="inkSrc0">
+        <inkml:traceFormat>
+          <inkml:channel name="X" type="integer" min="-2.14748E9" max="2.14748E9" units="cm"/>
+          <inkml:channel name="Y" type="integer" min="-2.14748E9" max="2.14748E9" units="cm"/>
+          <inkml:channel name="F" type="integer" max="32767" units="dev"/>
+          <inkml:channel name="OA" type="integer" max="360" units="deg"/>
+          <inkml:channel name="OE" type="integer" max="90" units="deg"/>
+        </inkml:traceFormat>
+        <inkml:channelProperties>
+          <inkml:channelProperty channel="X" name="resolution" value="1000" units="1/cm"/>
+          <inkml:channelProperty channel="Y" name="resolution" value="1000" units="1/cm"/>
+          <inkml:channelProperty channel="F" name="resolution" value="0" units="1/dev"/>
+          <inkml:channelProperty channel="OA" name="resolution" value="1000" units="1/deg"/>
+          <inkml:channelProperty channel="OE" name="resolution" value="1000" units="1/deg"/>
+        </inkml:channelProperties>
+      </inkml:inkSource>
+      <inkml:timestamp xml:id="ts0" timeString="2021-04-14T19:01:16.346"/>
+    </inkml:context>
+    <inkml:brush xml:id="br0">
+      <inkml:brushProperty name="width" value="0.05" units="cm"/>
+      <inkml:brushProperty name="height" value="0.05" units="cm"/>
+      <inkml:brushProperty name="color" value="#E71224"/>
+    </inkml:brush>
+  </inkml:definitions>
+  <inkml:trace contextRef="#ctx0" brushRef="#br0">94 91 11600 0 0,'0'0'562'0'0,"-12"-18"148"0"0,11 17-579 0 0,0 0 1 0 0,0 0-1 0 0,0 0 1 0 0,0 0-1 0 0,0 1 1 0 0,0-1 0 0 0,0 0-1 0 0,0 0 1 0 0,0 1-1 0 0,-1-1 1 0 0,1 1 0 0 0,0-1-1 0 0,0 1 1 0 0,-1-1-1 0 0,1 1 1 0 0,0 0-1 0 0,-1 0 1 0 0,-1-1 0 0 0,2 1 288 0 0,-1 0-66 0 0,0 0 1 0 0,0 0-1 0 0,0 0 1 0 0,0 1 0 0 0,0-1-1 0 0,0 0 1 0 0,0 1 0 0 0,-3 0-1 0 0,0 3 745 0 0,0 0 0 0 0,0-1-1 0 0,-9 5 1 0 0,13-8-582 0 0,-5 1 395 0 0,10 2 759 0 0,13 1-766 0 0,72-12-665 0 0,-38 7-87 0 0,-27-1-6 0 0,-1 2 0 0 0,1 1 0 0 0,26 4 0 0 0,-35-3-29 0 0,1-1-1 0 0,25-1 1 0 0,-17-1 36 0 0,70 4 119 0 0,52 7 254 0 0,19-7-247 0 0,-81 3-216 0 0,-1 0 0 0 0,-24-4 0 0 0,-35 0-6 0 0,1-1 0 0 0,-1-2 0 0 0,41-5 0 0 0,-16 1-17 0 0,-19 3-7 0 0,79-4 19 0 0,-52 2-8 0 0,33-4 46 0 0,26-10-27 0 0,81-9 271 0 0,-9 2 297 0 0,-97 15-743 0 0,157 2 0 0 0,-234 8 190 0 0,208 7-330 0 0,-158-4 447 0 0,84 15 0 0 0,-36-3-145 0 0,48-5 109 0 0,-135-9-69 0 0,-14-1-60 0 0,0 1 0 0 0,-1 0 0 0 0,0 0 0 0 0,1 1 0 0 0,16 4 0 0 0,-20-5-19 0 0,-6-1-13 0 0,1 0 1 0 0,-1 0 0 0 0,0 0 0 0 0,0 0 0 0 0,1 0 0 0 0,-1 0 0 0 0,0 1 0 0 0,0-1 0 0 0,1 0 0 0 0,-1 1 0 0 0,0-1 0 0 0,2 2 0 0 0,2 0-19 0 0,-5-1-71 0 0,-1-2-9 0 0,-15-11-1037 0 0,4 2-2546 0 0</inkml:trace>
+</inkml:ink>
+</file>
+
+<file path=ppt/ink/ink18.xml><?xml version="1.0" encoding="utf-8"?>
+<inkml:ink xmlns:inkml="http://www.w3.org/2003/InkML">
+  <inkml:definitions>
+    <inkml:context xml:id="ctx0">
+      <inkml:inkSource xml:id="inkSrc0">
+        <inkml:traceFormat>
+          <inkml:channel name="X" type="integer" min="-2.14748E9" max="2.14748E9" units="cm"/>
+          <inkml:channel name="Y" type="integer" min="-2.14748E9" max="2.14748E9" units="cm"/>
+          <inkml:channel name="F" type="integer" max="32767" units="dev"/>
+          <inkml:channel name="OA" type="integer" max="360" units="deg"/>
+          <inkml:channel name="OE" type="integer" max="90" units="deg"/>
+        </inkml:traceFormat>
+        <inkml:channelProperties>
+          <inkml:channelProperty channel="X" name="resolution" value="1000" units="1/cm"/>
+          <inkml:channelProperty channel="Y" name="resolution" value="1000" units="1/cm"/>
+          <inkml:channelProperty channel="F" name="resolution" value="0" units="1/dev"/>
+          <inkml:channelProperty channel="OA" name="resolution" value="1000" units="1/deg"/>
+          <inkml:channelProperty channel="OE" name="resolution" value="1000" units="1/deg"/>
+        </inkml:channelProperties>
+      </inkml:inkSource>
+      <inkml:timestamp xml:id="ts0" timeString="2021-04-14T19:01:20.811"/>
+    </inkml:context>
+    <inkml:brush xml:id="br0">
+      <inkml:brushProperty name="width" value="0.05" units="cm"/>
+      <inkml:brushProperty name="height" value="0.05" units="cm"/>
+      <inkml:brushProperty name="color" value="#E71224"/>
+    </inkml:brush>
+  </inkml:definitions>
+  <inkml:trace contextRef="#ctx0" brushRef="#br0">48 35 13824 0 0,'0'0'314'0'0,"-13"0"760"0"0,10 0-1002 0 0,0 0 0 0 0,0 0 0 0 0,0-1 1 0 0,0 1-1 0 0,0-1 0 0 0,-5-1 1 0 0,0-4 3820 0 0,12-4-1202 0 0,-2 8-2594 0 0,0 1 0 0 0,0 0 1 0 0,0-1-1 0 0,0 1 0 0 0,0 0 0 0 0,1 0 0 0 0,-1 0 0 0 0,1 1 1 0 0,-1-1-1 0 0,0 0 0 0 0,1 1 0 0 0,-1 0 0 0 0,1-1 0 0 0,4 1 1 0 0,42 4 194 0 0,-33-2-209 0 0,18 1-78 0 0,77 6-568 0 0,-94-9 764 0 0,0-1-1 0 0,0 0 0 0 0,0-1 1 0 0,24-6-1 0 0,-34 6-172 0 0,7-4 1240 0 0,-23 19-968 0 0,3 2-316 0 0,0 0-1 0 0,1 0 1 0 0,1 1 0 0 0,0-1-1 0 0,1 1 1 0 0,-2 20 0 0 0,3-15-44 0 0,1-1 0 0 0,1 1 1 0 0,5 34-1 0 0,15 60 548 0 0,4-24-471 0 0,43 106-1 0 0,-32-105 14 0 0,68 129 0 0 0,-87-190 88 0 0,23 55-1 0 0,-34-73-2 0 0,-1 0 0 0 0,0 1 0 0 0,-1-1 0 0 0,0 1 0 0 0,-2 0 0 0 0,1 0 0 0 0,-2 17 0 0 0,-1-22-45 0 0,0-1-1 0 0,-1 1 1 0 0,0 0 0 0 0,-1-1-1 0 0,0 0 1 0 0,-1 1 0 0 0,1-1 0 0 0,-1 0-1 0 0,-6 8 1 0 0,-3 3 362 0 0,-1 0 0 0 0,-20 21 0 0 0,17-24-162 0 0,-27 21-1 0 0,39-33-220 0 0,-11 6 46 0 0,0 0 0 0 0,-1 0 0 0 0,0-2 0 0 0,-1 0 0 0 0,0-1 0 0 0,-34 8 0 0 0,43-13-111 0 0,0 0-1 0 0,0 0 0 0 0,0-1 0 0 0,0 0 1 0 0,0-1-1 0 0,0 0 0 0 0,0 0 0 0 0,-15-3 1 0 0,19 1-97 0 0</inkml:trace>
+</inkml:ink>
+</file>
+
+<file path=ppt/ink/ink19.xml><?xml version="1.0" encoding="utf-8"?>
+<inkml:ink xmlns:inkml="http://www.w3.org/2003/InkML">
+  <inkml:definitions>
+    <inkml:context xml:id="ctx0">
+      <inkml:inkSource xml:id="inkSrc0">
+        <inkml:traceFormat>
+          <inkml:channel name="X" type="integer" min="-2.14748E9" max="2.14748E9" units="cm"/>
+          <inkml:channel name="Y" type="integer" min="-2.14748E9" max="2.14748E9" units="cm"/>
+          <inkml:channel name="F" type="integer" max="32767" units="dev"/>
+          <inkml:channel name="OA" type="integer" max="360" units="deg"/>
+          <inkml:channel name="OE" type="integer" max="90" units="deg"/>
+        </inkml:traceFormat>
+        <inkml:channelProperties>
+          <inkml:channelProperty channel="X" name="resolution" value="1000" units="1/cm"/>
+          <inkml:channelProperty channel="Y" name="resolution" value="1000" units="1/cm"/>
+          <inkml:channelProperty channel="F" name="resolution" value="0" units="1/dev"/>
+          <inkml:channelProperty channel="OA" name="resolution" value="1000" units="1/deg"/>
+          <inkml:channelProperty channel="OE" name="resolution" value="1000" units="1/deg"/>
+        </inkml:channelProperties>
+      </inkml:inkSource>
+      <inkml:timestamp xml:id="ts0" timeString="2021-04-14T19:01:25.421"/>
+    </inkml:context>
+    <inkml:brush xml:id="br0">
+      <inkml:brushProperty name="width" value="0.05" units="cm"/>
+      <inkml:brushProperty name="height" value="0.05" units="cm"/>
+      <inkml:brushProperty name="color" value="#E71224"/>
+    </inkml:brush>
+  </inkml:definitions>
+  <inkml:trace contextRef="#ctx0" brushRef="#br0">0 6 2760 0 0,'0'0'125'0'0,"16"4"5260"0"0,-11-3-6406 0 0,-1-1 1009 0 0,-3 0 693 0 0,0 0-546 0 0,-1 0 83 0 0,1 0 0 0 0,0 0-1 0 0,-1 0 1 0 0,1-1 0 0 0,-1 1-1 0 0,1 0 1 0 0,0 0-1 0 0,-1 0 1 0 0,1-1 0 0 0,-1 1-1 0 0,1 0 1 0 0,-1-1-1 0 0,1 1 1 0 0,-1 0 0 0 0,1-1-1 0 0,-1 1 1 0 0,1-1 0 0 0,-1 1-1 0 0,0-1 1 0 0,1 1-1 0 0,-1-1 1 0 0,2-2 3097 0 0</inkml:trace>
+</inkml:ink>
+</file>
+
+<file path=ppt/ink/ink2.xml><?xml version="1.0" encoding="utf-8"?>
+<inkml:ink xmlns:inkml="http://www.w3.org/2003/InkML">
+  <inkml:definitions>
+    <inkml:context xml:id="ctx0">
+      <inkml:inkSource xml:id="inkSrc0">
+        <inkml:traceFormat>
+          <inkml:channel name="X" type="integer" min="-2.14748E9" max="2.14748E9" units="cm"/>
+          <inkml:channel name="Y" type="integer" min="-2.14748E9" max="2.14748E9" units="cm"/>
+          <inkml:channel name="F" type="integer" max="32767" units="dev"/>
+          <inkml:channel name="OA" type="integer" max="360" units="deg"/>
+          <inkml:channel name="OE" type="integer" max="90" units="deg"/>
+        </inkml:traceFormat>
+        <inkml:channelProperties>
+          <inkml:channelProperty channel="X" name="resolution" value="1000" units="1/cm"/>
+          <inkml:channelProperty channel="Y" name="resolution" value="1000" units="1/cm"/>
+          <inkml:channelProperty channel="F" name="resolution" value="0" units="1/dev"/>
+          <inkml:channelProperty channel="OA" name="resolution" value="1000" units="1/deg"/>
+          <inkml:channelProperty channel="OE" name="resolution" value="1000" units="1/deg"/>
+        </inkml:channelProperties>
+      </inkml:inkSource>
+      <inkml:timestamp xml:id="ts0" timeString="2021-04-14T19:00:33.149"/>
+    </inkml:context>
+    <inkml:brush xml:id="br0">
+      <inkml:brushProperty name="width" value="0.05" units="cm"/>
+      <inkml:brushProperty name="height" value="0.05" units="cm"/>
+      <inkml:brushProperty name="color" value="#E71224"/>
+    </inkml:brush>
+  </inkml:definitions>
+  <inkml:trace contextRef="#ctx0" brushRef="#br0">315 51 1840 0 0,'-14'-2'1336'0'0,"-28"-16"6243"0"0,8 5 2696 0 0,40 17-8636 0 0,11 6-903 0 0,9-4-219 0 0,1-1 1 0 0,0-2-1 0 0,31 1 1 0 0,82-6 547 0 0,-38-1-495 0 0,80 17 206 0 0,-105-6-463 0 0,66 7 343 0 0,-136-14-612 0 0,25 3 394 0 0,-28-3-320 0 0,-5 0-19 0 0,-15 2-6 0 0,-13-3-88 0 0,-31-2-1 0 0,52 1 3 0 0,-126-14 308 0 0,-62-15-698 0 0,-10 0 72 0 0,195 29 306 0 0,-62-4-78 0 0,65 5 92 0 0,0 0 0 0 0,0 1 0 0 0,0 0 0 0 0,0 0 0 0 0,0 1 0 0 0,-12 4 0 0 0,20-6-5 0 0,0 0-1 0 0,0 0 1 0 0,0 0-1 0 0,0 0 1 0 0,0 0-1 0 0,0 0 1 0 0,0 0-1 0 0,0 0 1 0 0,0 0-1 0 0,0 0 1 0 0,0 0-1 0 0,0 0 1 0 0,0 1-1 0 0,0-1 1 0 0,0 0-1 0 0,0 0 1 0 0,0 0-1 0 0,0 0 1 0 0,0 0-1 0 0,0 0 1 0 0,0 0-1 0 0,0 0 1 0 0,0 0 0 0 0,0 0-1 0 0,0 0 1 0 0,0 1-1 0 0,0-1 1 0 0,0 0-1 0 0,0 0 1 0 0,0 0-1 0 0,0 0 1 0 0,0 0-1 0 0,0 0 1 0 0,0 0-1 0 0,0 0 1 0 0,0 0-1 0 0,0 0 1 0 0,0 0-1 0 0,0 0 1 0 0,0 0-1 0 0,0 0 1 0 0,0 0-1 0 0,0 1 1 0 0,0-1-1 0 0,0 0 1 0 0,1 0-1 0 0,-1 0 1 0 0,0 0-1 0 0,0 0 1 0 0,0 0-1 0 0,0 0 1 0 0,0 0 0 0 0,0 0-1 0 0,0 0 1 0 0,0 0-1 0 0,0 0 1 0 0,0 0-1 0 0,0 0 1 0 0,0 0-1 0 0,1 0 1 0 0,-1 0-1 0 0,0 0 1 0 0,0 0-1 0 0,11 4 60 0 0,13 1-67 0 0,31-4 183 0 0,95-12 1 0 0,15 0 137 0 0,-126 12-397 0 0,0 2 0 0 0,46 9 1 0 0,74 24 613 0 0,-120-26-524 0 0,-17-5 90 0 0,0 2-1 0 0,0 0 0 0 0,0 1 0 0 0,-1 1 0 0 0,22 13 0 0 0,-42-22-102 0 0,-1 0 0 0 0,1 1 0 0 0,0-1 0 0 0,-1 0 0 0 0,1 1 0 0 0,0-1 0 0 0,-1 1 0 0 0,1-1 0 0 0,-1 1 0 0 0,1-1 0 0 0,-1 1 0 0 0,1 0 0 0 0,-1-1 0 0 0,1 1 0 0 0,-1 0 0 0 0,1-1 0 0 0,-1 1 0 0 0,0 0 0 0 0,0-1 0 0 0,1 1 0 0 0,-1 1 0 0 0,0-1 9 0 0,0-1 0 0 0,0 1 0 0 0,-1-1 0 0 0,1 1 0 0 0,0-1 0 0 0,-1 1 0 0 0,1-1 1 0 0,0 1-1 0 0,-1-1 0 0 0,1 0 0 0 0,-1 1 0 0 0,1-1 0 0 0,0 1 0 0 0,-1-1 0 0 0,1 0 0 0 0,-1 0 0 0 0,1 1 0 0 0,-1-1 0 0 0,1 0 0 0 0,-1 0 0 0 0,-1 1 0 0 0,-3 0 42 0 0,0 1 0 0 0,0-1 1 0 0,0-1-1 0 0,-11 1 0 0 0,15-1-47 0 0,-254-10 258 0 0,233 7-264 0 0,-250-24-249 0 0,205 22 435 0 0,-41-1-295 0 0,98 6 54 0 0,-10 0 22 0 0,1 0-1 0 0,-1 2 0 0 0,1 0 0 0 0,-20 4 1 0 0,30-4 91 0 0,-7 1 141 0 0,15-3-189 0 0,1 0 0 0 0,-1 0 0 0 0,1 0 0 0 0,0 0 0 0 0,-1 0 0 0 0,1 0 0 0 0,-1 0 0 0 0,1 0 0 0 0,0 0-1 0 0,-1 1 1 0 0,1-1 0 0 0,0 0 0 0 0,-1 0 0 0 0,1 1 0 0 0,0-1 0 0 0,0 0 0 0 0,-1 0 0 0 0,1 1 0 0 0,0-1 0 0 0,0 0 0 0 0,-1 1 0 0 0,1-1 0 0 0,0 0 0 0 0,0 1 0 0 0,0-1 0 0 0,-1 1 0 0 0,1-1-118 0 0,2 1-107 0 0,41 7 325 0 0,1-2 0 0 0,0-1 1 0 0,63-3-1 0 0,202-13-173 0 0,-259 8 64 0 0,14 3 84 0 0,-64 0-80 0 0,0 0 0 0 0,0 0 0 0 0,0 0 0 0 0,0 0 0 0 0,0 0 0 0 0,-1 0 0 0 0,1 0 0 0 0,0 0 0 0 0,0 0 0 0 0,0 0 0 0 0,0 0 0 0 0,0 0 0 0 0,0 0 0 0 0,0 0 0 0 0,0 0 0 0 0,0 0 0 0 0,1 0 0 0 0,-1 0 0 0 0,0 0 0 0 0,0 0 0 0 0,0 0 0 0 0,0 0 0 0 0,0 1 0 0 0,0-1 0 0 0,0 0 0 0 0,0 0 0 0 0,0 0 0 0 0,0 0 0 0 0,0 0 0 0 0,0 0 0 0 0,0 0 0 0 0,0 0 0 0 0,0 0 0 0 0,0 0 0 0 0,0 0 0 0 0,0 0 0 0 0,0 0 0 0 0,0 0 0 0 0,0 0 0 0 0,0 0 0 0 0,0 0 0 0 0,0 0 0 0 0,0 0 0 0 0,0 0 0 0 0,0 0 0 0 0,0 0 0 0 0,0 0 0 0 0,0 0 0 0 0,1 0 0 0 0,-1 0 0 0 0,0 0 0 0 0,0 0 0 0 0,0 0 0 0 0,0 0 0 0 0,-6 3 0 0 0,-10 2 0 0 0,-30-4 41 0 0,1-1 1 0 0,-67-9-1 0 0,-89-24-185 0 0,169 27 43 0 0,2 0-13 0 0,-149-24-330 0 0,123 23 362 0 0,-66 0-1 0 0,110 7 75 0 0,-28 1 1 0 0,37-1 8 0 0,0 0-1 0 0,-1 1 0 0 0,1 0 0 0 0,0-1 1 0 0,-1 1-1 0 0,1 0 0 0 0,0 1 1 0 0,-4 1-1 0 0,6-3 0 0 0,1 0 0 0 0,0 0 0 0 0,0 1 0 0 0,0-1 0 0 0,-1 0 0 0 0,1 0 0 0 0,0 0 0 0 0,0 0 0 0 0,0 1 0 0 0,-1-1 0 0 0,1 0 0 0 0,0 0 0 0 0,0 1 0 0 0,0-1 0 0 0,0 0 0 0 0,0 0 0 0 0,-1 1 0 0 0,1-1 0 0 0,0 0 0 0 0,0 0 0 0 0,0 1 0 0 0,0-1 0 0 0,0 0 0 0 0,0 0 0 0 0,0 1 0 0 0,0-1 0 0 0,0 0 0 0 0,0 1 0 0 0,0-1 0 0 0,0 0 0 0 0,0 0 0 0 0,0 1 0 0 0,0-1 0 0 0,1 0 0 0 0,1 4 0 0 0,0-3 0 0 0,-1 1 0 0 0,1-1 0 0 0,-1 0 0 0 0,1 1 0 0 0,0-1 0 0 0,-1 0 0 0 0,1 0 0 0 0,0 0 0 0 0,0 0 0 0 0,0 0 0 0 0,0-1 0 0 0,0 1 0 0 0,2 0 0 0 0,29 4 0 0 0,12-4 61 0 0,0-3 1 0 0,51-7-1 0 0,-53 4-29 0 0,163-28 217 0 0,25-1-46 0 0,-207 31-179 0 0,-7 1 3 0 0,1 1 0 0 0,0 0 0 0 0,23 3 0 0 0,-37-1-28 0 0,0 0-1 0 0,0 0 1 0 0,-1 0-1 0 0,1 1 1 0 0,0 0-1 0 0,-1 0 1 0 0,1 0-1 0 0,2 2 1 0 0,-5-3-155 0 0,-1 0 8 0 0,0-1 0 0 0,0 1-1 0 0,-1 0 1 0 0,1-1 0 0 0,0 1 0 0 0,-1 0 0 0 0,1-1 0 0 0,-1 1 0 0 0,1-1 0 0 0,-1 1 0 0 0,1-1 0 0 0,-1 1-1 0 0,1-1 1 0 0,-1 1 0 0 0,0 0 0 0 0</inkml:trace>
+</inkml:ink>
+</file>
+
+<file path=ppt/ink/ink20.xml><?xml version="1.0" encoding="utf-8"?>
+<inkml:ink xmlns:inkml="http://www.w3.org/2003/InkML">
+  <inkml:definitions>
+    <inkml:context xml:id="ctx0">
+      <inkml:inkSource xml:id="inkSrc0">
+        <inkml:traceFormat>
+          <inkml:channel name="X" type="integer" min="-2.14748E9" max="2.14748E9" units="cm"/>
+          <inkml:channel name="Y" type="integer" min="-2.14748E9" max="2.14748E9" units="cm"/>
+          <inkml:channel name="F" type="integer" max="32767" units="dev"/>
+          <inkml:channel name="OA" type="integer" max="360" units="deg"/>
+          <inkml:channel name="OE" type="integer" max="90" units="deg"/>
+        </inkml:traceFormat>
+        <inkml:channelProperties>
+          <inkml:channelProperty channel="X" name="resolution" value="1000" units="1/cm"/>
+          <inkml:channelProperty channel="Y" name="resolution" value="1000" units="1/cm"/>
+          <inkml:channelProperty channel="F" name="resolution" value="0" units="1/dev"/>
+          <inkml:channelProperty channel="OA" name="resolution" value="1000" units="1/deg"/>
+          <inkml:channelProperty channel="OE" name="resolution" value="1000" units="1/deg"/>
+        </inkml:channelProperties>
+      </inkml:inkSource>
+      <inkml:timestamp xml:id="ts0" timeString="2021-04-14T19:01:26.028"/>
+    </inkml:context>
+    <inkml:brush xml:id="br0">
+      <inkml:brushProperty name="width" value="0.05" units="cm"/>
+      <inkml:brushProperty name="height" value="0.05" units="cm"/>
+      <inkml:brushProperty name="color" value="#E71224"/>
+    </inkml:brush>
+  </inkml:definitions>
+  <inkml:trace contextRef="#ctx0" brushRef="#br0">300 37 10568 0 0,'0'0'2654'0'0,"14"-22"452"0"0,-14 22-3013 0 0,0-1 1 0 0,0 1 0 0 0,0-1 0 0 0,0 1 0 0 0,0-1-1 0 0,0 1 1 0 0,0-1 0 0 0,0 1 0 0 0,-1-1 0 0 0,1 1-1 0 0,0-1 1 0 0,0 1 0 0 0,-1-1 0 0 0,1 1 0 0 0,0-1-1 0 0,-1 1 1 0 0,1 0 0 0 0,0-1 0 0 0,-1 1 0 0 0,1 0-1 0 0,-1-1 1 0 0,1 1 0 0 0,-1 0 0 0 0,1-1 0 0 0,-1 1-1 0 0,-17-4 1192 0 0,-18 8-45 0 0,18 0-991 0 0,0 0 0 0 0,1 1 0 0 0,0 1 0 0 0,0 1 0 0 0,1 1 0 0 0,-27 16 0 0 0,35-19-235 0 0,0 1 0 0 0,0 0-1 0 0,1 0 1 0 0,0 0 0 0 0,0 1-1 0 0,1 0 1 0 0,0 1 0 0 0,0-1-1 0 0,0 1 1 0 0,1 1 0 0 0,0-1-1 0 0,1 1 1 0 0,0-1 0 0 0,-3 12-1 0 0,3-10-12 0 0,2 0 1 0 0,0 0-1 0 0,0 1 0 0 0,0-1 0 0 0,2 1 0 0 0,-1-1 1 0 0,1 1-1 0 0,1 0 0 0 0,2 16 0 0 0,-2-23 18 0 0,0-1 0 0 0,0 1 0 0 0,0-1 0 0 0,0 1 0 0 0,0-1 0 0 0,1 0-1 0 0,-1 1 1 0 0,1-1 0 0 0,0 0 0 0 0,0 0 0 0 0,4 4 0 0 0,-5-6-16 0 0,1 1 0 0 0,0-1 0 0 0,-1 0 0 0 0,1 0 0 0 0,0 0 1 0 0,0 0-1 0 0,0 0 0 0 0,0 0 0 0 0,0 0 0 0 0,0 0 0 0 0,0-1 0 0 0,0 1 0 0 0,0-1 0 0 0,0 0 1 0 0,0 1-1 0 0,0-1 0 0 0,0 0 0 0 0,0 0 0 0 0,1-1 0 0 0,2 1 0 0 0,1-2 32 0 0,-1 1 0 0 0,1-1-1 0 0,-1 0 1 0 0,0-1-1 0 0,0 1 1 0 0,0-1 0 0 0,0 0-1 0 0,0 0 1 0 0,-1-1 0 0 0,1 1-1 0 0,-1-1 1 0 0,6-6-1 0 0,5-8 199 0 0,22-31-1 0 0,-35 46-200 0 0,21-34 1111 0 0,24-49-1 0 0,-41 76-803 0 0,-4 6-175 0 0,0 0 0 0 0,0 1 0 0 0,-1-1 0 0 0,1 0 1 0 0,-1 0-1 0 0,1 0 0 0 0,-1 0 0 0 0,0-6 1232 0 0,-1 18-1191 0 0,-8 100-47 0 0,2-51-161 0 0,-4 37 67 0 0,-31 129 0 0 0,35-201-58 0 0,4-14-167 0 0,-1 0 0 0 0,1 0 0 0 0,1 1 0 0 0,0-1 0 0 0,0 0 1 0 0,0 1-1 0 0,2 8 0 0 0,7 21-5482 0 0,-5-30-334 0 0</inkml:trace>
+</inkml:ink>
+</file>
+
+<file path=ppt/ink/ink21.xml><?xml version="1.0" encoding="utf-8"?>
+<inkml:ink xmlns:inkml="http://www.w3.org/2003/InkML">
+  <inkml:definitions>
+    <inkml:context xml:id="ctx0">
+      <inkml:inkSource xml:id="inkSrc0">
+        <inkml:traceFormat>
+          <inkml:channel name="X" type="integer" min="-2.14748E9" max="2.14748E9" units="cm"/>
+          <inkml:channel name="Y" type="integer" min="-2.14748E9" max="2.14748E9" units="cm"/>
+          <inkml:channel name="F" type="integer" max="32767" units="dev"/>
+          <inkml:channel name="OA" type="integer" max="360" units="deg"/>
+          <inkml:channel name="OE" type="integer" max="90" units="deg"/>
+        </inkml:traceFormat>
+        <inkml:channelProperties>
+          <inkml:channelProperty channel="X" name="resolution" value="1000" units="1/cm"/>
+          <inkml:channelProperty channel="Y" name="resolution" value="1000" units="1/cm"/>
+          <inkml:channelProperty channel="F" name="resolution" value="0" units="1/dev"/>
+          <inkml:channelProperty channel="OA" name="resolution" value="1000" units="1/deg"/>
+          <inkml:channelProperty channel="OE" name="resolution" value="1000" units="1/deg"/>
+        </inkml:channelProperties>
+      </inkml:inkSource>
+      <inkml:timestamp xml:id="ts0" timeString="2021-04-14T19:01:26.632"/>
+    </inkml:context>
+    <inkml:brush xml:id="br0">
+      <inkml:brushProperty name="width" value="0.05" units="cm"/>
+      <inkml:brushProperty name="height" value="0.05" units="cm"/>
+      <inkml:brushProperty name="color" value="#E71224"/>
+    </inkml:brush>
+  </inkml:definitions>
+  <inkml:trace contextRef="#ctx0" brushRef="#br0">295 134 3224 0 0,'0'0'12422'0'0,"-10"-18"-4862"0"0,2 13-5777 0 0,7 4-1672 0 0,1 0 1 0 0,-1 1 0 0 0,0-1-1 0 0,0 0 1 0 0,1 1-1 0 0,-1-1 1 0 0,0 1 0 0 0,0-1-1 0 0,0 1 1 0 0,0 0-1 0 0,0-1 1 0 0,0 1 0 0 0,-1 0-1 0 0,-1-1-34 0 0,0 1 0 0 0,0 0 0 0 0,0 0-1 0 0,0 0 1 0 0,0 0 0 0 0,0 1 0 0 0,0-1-1 0 0,0 1 1 0 0,0 0 0 0 0,0 0 0 0 0,0 0-1 0 0,0 0 1 0 0,-5 3 0 0 0,-2 2 17 0 0,1 0 0 0 0,-13 12 0 0 0,11-9-51 0 0,1 1-40 0 0,0 0 0 0 0,0 0 0 0 0,1 1 0 0 0,1 0-1 0 0,0 0 1 0 0,-13 24 0 0 0,-30 80-7 0 0,43-95 4 0 0,1 1 0 0 0,1 1 0 0 0,1-1 0 0 0,1 1 0 0 0,-3 40 0 0 0,6-50 0 0 0,1-1 0 0 0,1 1 0 0 0,0-1 0 0 0,0 1 0 0 0,1-1 0 0 0,1 0 0 0 0,0 1 0 0 0,0-1 0 0 0,1-1 0 0 0,0 1 0 0 0,1 0 0 0 0,12 18 0 0 0,-15-26 5 0 0,1 0 0 0 0,-1 0 0 0 0,1 0 0 0 0,0 0 0 0 0,0 0-1 0 0,1 0 1 0 0,-1-1 0 0 0,1 1 0 0 0,-1-1 0 0 0,1 0 0 0 0,0 0 0 0 0,-1 0-1 0 0,1-1 1 0 0,7 3 0 0 0,-4-3 14 0 0,-1 0-1 0 0,1 0 1 0 0,0-1 0 0 0,-1 0-1 0 0,1 0 1 0 0,0 0 0 0 0,-1-1-1 0 0,11-2 1 0 0,-3-1 19 0 0,0-1 1 0 0,0 0 0 0 0,0 0-1 0 0,-1-2 1 0 0,0 1-1 0 0,-1-2 1 0 0,21-15-1 0 0,-11 6 135 0 0,-2-2-1 0 0,0 0 0 0 0,-1-2 0 0 0,-1 0 0 0 0,26-40 0 0 0,-36 49-71 0 0,-1-1 0 0 0,0 1-1 0 0,-1-2 1 0 0,0 1 0 0 0,-1 0-1 0 0,-1-1 1 0 0,0 0 0 0 0,-1 0-1 0 0,0-1 1 0 0,-1 1-1 0 0,-1 0 1 0 0,-1-26 0 0 0,-1 29-24 0 0,-1 0 0 0 0,-1 1 1 0 0,0-1-1 0 0,0 0 0 0 0,-1 1 0 0 0,0-1 1 0 0,-1 1-1 0 0,0 0 0 0 0,-12-16 0 0 0,0 4-38 0 0,-1 0 0 0 0,-35-33 0 0 0,41 44-19 0 0,0 1 1 0 0,0 1-1 0 0,-1 0 0 0 0,-1 0 0 0 0,1 1 1 0 0,-25-10-1 0 0,29 15-163 0 0,0-1 1 0 0,0 2-1 0 0,-1-1 1 0 0,1 1 0 0 0,-1 0-1 0 0,1 1 1 0 0,-1 1-1 0 0,0-1 1 0 0,0 1-1 0 0,1 1 1 0 0,-19 3-1 0 0,13 1-1318 0 0,1 2-378 0 0</inkml:trace>
+</inkml:ink>
+</file>
+
+<file path=ppt/ink/ink22.xml><?xml version="1.0" encoding="utf-8"?>
+<inkml:ink xmlns:inkml="http://www.w3.org/2003/InkML">
+  <inkml:definitions>
+    <inkml:context xml:id="ctx0">
+      <inkml:inkSource xml:id="inkSrc0">
+        <inkml:traceFormat>
+          <inkml:channel name="X" type="integer" min="-2.14748E9" max="2.14748E9" units="cm"/>
+          <inkml:channel name="Y" type="integer" min="-2.14748E9" max="2.14748E9" units="cm"/>
+          <inkml:channel name="F" type="integer" max="32767" units="dev"/>
+          <inkml:channel name="OA" type="integer" max="360" units="deg"/>
+          <inkml:channel name="OE" type="integer" max="90" units="deg"/>
+        </inkml:traceFormat>
+        <inkml:channelProperties>
+          <inkml:channelProperty channel="X" name="resolution" value="1000" units="1/cm"/>
+          <inkml:channelProperty channel="Y" name="resolution" value="1000" units="1/cm"/>
+          <inkml:channelProperty channel="F" name="resolution" value="0" units="1/dev"/>
+          <inkml:channelProperty channel="OA" name="resolution" value="1000" units="1/deg"/>
+          <inkml:channelProperty channel="OE" name="resolution" value="1000" units="1/deg"/>
+        </inkml:channelProperties>
+      </inkml:inkSource>
+      <inkml:timestamp xml:id="ts0" timeString="2021-04-14T19:01:27.837"/>
+    </inkml:context>
+    <inkml:brush xml:id="br0">
+      <inkml:brushProperty name="width" value="0.05" units="cm"/>
+      <inkml:brushProperty name="height" value="0.05" units="cm"/>
+      <inkml:brushProperty name="color" value="#E71224"/>
+    </inkml:brush>
+  </inkml:definitions>
+  <inkml:trace contextRef="#ctx0" brushRef="#br0">3 341 2760 0 0,'-3'4'11240'0'0,"24"-34"-8984"0"0,76-144 3466 0 0,-89 160-4971 0 0,17-22 0 0 0,-4 6-106 0 0,5-6-87 0 0,-24 34-524 0 0,0-1-1 0 0,1 1 1 0 0,-1 0-1 0 0,1-1 1 0 0,-1 1-1 0 0,1 1 0 0 0,0-1 1 0 0,0 0-1 0 0,0 1 1 0 0,0-1-1 0 0,3 0 1 0 0,-5 2-32 0 0,0 0 0 0 0,0 0 0 0 0,0 0 0 0 0,0 0 1 0 0,0 0-1 0 0,0 1 0 0 0,0-1 0 0 0,0 0 1 0 0,0 1-1 0 0,0-1 0 0 0,0 1 0 0 0,0-1 1 0 0,0 1-1 0 0,0-1 0 0 0,-1 1 0 0 0,1 0 0 0 0,0-1 1 0 0,0 1-1 0 0,-1 0 0 0 0,1 0 0 0 0,0 0 1 0 0,-1-1-1 0 0,1 1 0 0 0,-1 0 0 0 0,1 0 1 0 0,-1 0-1 0 0,0 0 0 0 0,1 0 0 0 0,0 2 0 0 0,1 3 19 0 0,1 1 0 0 0,-1 0-1 0 0,1 8 1 0 0,5 21-2 0 0,10 64 15 0 0,-16-84-52 0 0,1-1 0 0 0,1 1 0 0 0,12 29 0 0 0,-15-42 18 0 0,9 16 0 0 0,-10-19 0 0 0,1 1 0 0 0,-1-1 0 0 0,1 1 0 0 0,-1-1 0 0 0,1 1 0 0 0,-1-1 0 0 0,1 0 0 0 0,-1 1 0 0 0,1-1 0 0 0,0 0 0 0 0,-1 0 0 0 0,1 1 0 0 0,0-1 0 0 0,-1 0 0 0 0,1 0 0 0 0,0 0 0 0 0,-1 0 0 0 0,1 0 0 0 0,0 0 0 0 0,-1 0 0 0 0,1 0 0 0 0,0 0 0 0 0,-1 0 0 0 0,1 0 0 0 0,0 0 0 0 0,-1 0 0 0 0,1-1 0 0 0,0 1 0 0 0,-1 0 0 0 0,1 0 0 0 0,0-1 0 0 0,3-2 17 0 0,0 0 0 0 0,0 0 1 0 0,-1 0-1 0 0,1 0 0 0 0,-1-1 0 0 0,0 1 0 0 0,0-1 0 0 0,0 0 0 0 0,4-8 0 0 0,2-4 128 0 0,9-21-1 0 0,-8 10 232 0 0,-4 11-103 0 0,1 0 1 0 0,9-16-1 0 0,-3 9 81 0 0,-10 17-259 0 0,-1 0-1 0 0,2 0 1 0 0,-1 1 0 0 0,1 0-1 0 0,0-1 1 0 0,5-5-1 0 0,8 2 170 0 0,-17 9-262 0 0,1 0 0 0 0,-1 0 0 0 0,0-1 0 0 0,0 1 0 0 0,1 0 0 0 0,-1 0 0 0 0,0 0 0 0 0,1 0 0 0 0,-1 0 0 0 0,0 0 0 0 0,1 0 0 0 0,-1-1 0 0 0,0 1 0 0 0,1 0-1 0 0,-1 0 1 0 0,0 0 0 0 0,0 0 0 0 0,1 0 0 0 0,-1 0 0 0 0,0 1 0 0 0,1-1 0 0 0,-1 0 0 0 0,0 0 0 0 0,1 0 0 0 0,-1 0 0 0 0,0 0 0 0 0,1 0 0 0 0,-1 1 0 0 0,0-1 0 0 0,0 0 0 0 0,1 0 0 0 0,-1 0 0 0 0,0 1 0 0 0,0-1 0 0 0,1 0 0 0 0,-1 0 0 0 0,0 0 0 0 0,0 1-1 0 0,1 0 1 0 0,-1-1 0 0 0,3 2-4 0 0,-1 1 0 0 0,1-1 0 0 0,-1 0 0 0 0,0 1 0 0 0,0 0 0 0 0,0 0 0 0 0,0-1 0 0 0,0 1 0 0 0,-1 0-1 0 0,1 0 1 0 0,1 6 0 0 0,0 2-38 0 0,0-1 0 0 0,1 16-1 0 0,-3-15-50 0 0,1 0 0 0 0,4 12-1 0 0,-5-20-242 0 0,1 0 0 0 0,0 0 0 0 0,0 1 0 0 0,0-1 0 0 0,5 5 0 0 0,-7-8 198 0 0,1 1-1 0 0,-1-1 0 0 0,1 0 0 0 0,-1 0 1 0 0,1 0-1 0 0,-1 1 0 0 0,1-1 1 0 0,-1 0-1 0 0,1 0 0 0 0,-1 0 0 0 0,1 0 1 0 0,-1 0-1 0 0,1 0 0 0 0,-1 0 1 0 0,1 0-1 0 0,-1 0 0 0 0,1 0 0 0 0,-1 0 1 0 0,1-1-1 0 0,0 1 0 0 0,0 0-302 0 0,10-2-1435 0 0</inkml:trace>
+</inkml:ink>
+</file>
+
+<file path=ppt/ink/ink23.xml><?xml version="1.0" encoding="utf-8"?>
+<inkml:ink xmlns:inkml="http://www.w3.org/2003/InkML">
+  <inkml:definitions>
+    <inkml:context xml:id="ctx0">
+      <inkml:inkSource xml:id="inkSrc0">
+        <inkml:traceFormat>
+          <inkml:channel name="X" type="integer" min="-2.14748E9" max="2.14748E9" units="cm"/>
+          <inkml:channel name="Y" type="integer" min="-2.14748E9" max="2.14748E9" units="cm"/>
+          <inkml:channel name="F" type="integer" max="32767" units="dev"/>
+          <inkml:channel name="OA" type="integer" max="360" units="deg"/>
+          <inkml:channel name="OE" type="integer" max="90" units="deg"/>
+        </inkml:traceFormat>
+        <inkml:channelProperties>
+          <inkml:channelProperty channel="X" name="resolution" value="1000" units="1/cm"/>
+          <inkml:channelProperty channel="Y" name="resolution" value="1000" units="1/cm"/>
+          <inkml:channelProperty channel="F" name="resolution" value="0" units="1/dev"/>
+          <inkml:channelProperty channel="OA" name="resolution" value="1000" units="1/deg"/>
+          <inkml:channelProperty channel="OE" name="resolution" value="1000" units="1/deg"/>
+        </inkml:channelProperties>
+      </inkml:inkSource>
+      <inkml:timestamp xml:id="ts0" timeString="2021-04-14T19:01:28.195"/>
+    </inkml:context>
+    <inkml:brush xml:id="br0">
+      <inkml:brushProperty name="width" value="0.05" units="cm"/>
+      <inkml:brushProperty name="height" value="0.05" units="cm"/>
+      <inkml:brushProperty name="color" value="#E71224"/>
+    </inkml:brush>
+  </inkml:definitions>
+  <inkml:trace contextRef="#ctx0" brushRef="#br0">79 298 9216 0 0,'0'0'816'0'0,"0"11"-656"0"0,-3 1-160 0 0,1 6 0 0 0,-4 5 1880 0 0,4 2 336 0 0,-5 0 71 0 0,4 9 17 0 0,-5-1-1432 0 0,3 2-280 0 0,-4-2-56 0 0,1 1-16 0 0,0 0-360 0 0,2-5-64 0 0,0-1-24 0 0,3-3 0 0 0,0-2-880 0 0,3-3-184 0 0</inkml:trace>
+  <inkml:trace contextRef="#ctx0" brushRef="#br0" timeOffset="1">209 4 17503 0 0,'0'0'776'0'0,"-9"0"160"0"0,4-3-744 0 0,2 6-192 0 0,-3 4 0 0 0,0 0 0 0 0,-2 4 0 0 0,3-2 0 0 0</inkml:trace>
+</inkml:ink>
+</file>
+
+<file path=ppt/ink/ink24.xml><?xml version="1.0" encoding="utf-8"?>
+<inkml:ink xmlns:inkml="http://www.w3.org/2003/InkML">
+  <inkml:definitions>
+    <inkml:context xml:id="ctx0">
+      <inkml:inkSource xml:id="inkSrc0">
+        <inkml:traceFormat>
+          <inkml:channel name="X" type="integer" min="-2.14748E9" max="2.14748E9" units="cm"/>
+          <inkml:channel name="Y" type="integer" min="-2.14748E9" max="2.14748E9" units="cm"/>
+          <inkml:channel name="F" type="integer" max="32767" units="dev"/>
+          <inkml:channel name="OA" type="integer" max="360" units="deg"/>
+          <inkml:channel name="OE" type="integer" max="90" units="deg"/>
+        </inkml:traceFormat>
+        <inkml:channelProperties>
+          <inkml:channelProperty channel="X" name="resolution" value="1000" units="1/cm"/>
+          <inkml:channelProperty channel="Y" name="resolution" value="1000" units="1/cm"/>
+          <inkml:channelProperty channel="F" name="resolution" value="0" units="1/dev"/>
+          <inkml:channelProperty channel="OA" name="resolution" value="1000" units="1/deg"/>
+          <inkml:channelProperty channel="OE" name="resolution" value="1000" units="1/deg"/>
+        </inkml:channelProperties>
+      </inkml:inkSource>
+      <inkml:timestamp xml:id="ts0" timeString="2021-04-14T19:01:28.557"/>
+    </inkml:context>
+    <inkml:brush xml:id="br0">
+      <inkml:brushProperty name="width" value="0.05" units="cm"/>
+      <inkml:brushProperty name="height" value="0.05" units="cm"/>
+      <inkml:brushProperty name="color" value="#E71224"/>
+    </inkml:brush>
+  </inkml:definitions>
+  <inkml:trace contextRef="#ctx0" brushRef="#br0">0 349 10136 0 0,'0'0'918'0'0,"6"-5"-410"0"0,5-38 8147 0 0,40-109-3233 0 0,-35 90-4306 0 0,-1 7-212 0 0,-12 48-816 0 0,-2 4-48 0 0,0 1 0 0 0,0 0-1 0 0,-1-1 1 0 0,1 1 0 0 0,0-1 0 0 0,-1 1 0 0 0,1-6 0 0 0,2 45 13 0 0,-4-12-53 0 0,2 1 0 0 0,0-1 0 0 0,2 1 0 0 0,1-1 0 0 0,1 0 0 0 0,10 30 0 0 0,-13-48 3 0 0,0-3 11 0 0,-1 0-1 0 0,1 0 1 0 0,0 0-1 0 0,0 0 1 0 0,0 0 0 0 0,3 4-1 0 0,-4-7-7 0 0,0-1-1 0 0,-1 1 1 0 0,1 0 0 0 0,0 0 0 0 0,0-1-1 0 0,0 1 1 0 0,0 0 0 0 0,0-1 0 0 0,0 1-1 0 0,0-1 1 0 0,0 1 0 0 0,1-1 0 0 0,-1 0-1 0 0,0 1 1 0 0,0-1 0 0 0,0 0-1 0 0,0 0 1 0 0,0 0 0 0 0,1 0 0 0 0,-1 0-1 0 0,0 0 1 0 0,0 0 0 0 0,0 0 0 0 0,0 0-1 0 0,1-1 1 0 0,-1 1 0 0 0,0 0-1 0 0,1-1 1 0 0,1-1 47 0 0,-1 0 0 0 0,0 1 1 0 0,1-1-1 0 0,-1 0 0 0 0,0 0 0 0 0,0-1 0 0 0,0 1 0 0 0,-1 0 0 0 0,1 0 1 0 0,0-1-1 0 0,1-2 0 0 0,0-1 29 0 0,4-6 46 0 0,0-1 1 0 0,8-22-1 0 0,4-7 39 0 0,-6 13-615 0 0,-8 18-8 0 0,0 0 0 0 0,0 1-1 0 0,9-12 1 0 0,-4 8-1201 0 0,-1 1-381 0 0</inkml:trace>
+</inkml:ink>
+</file>
+
+<file path=ppt/ink/ink25.xml><?xml version="1.0" encoding="utf-8"?>
+<inkml:ink xmlns:inkml="http://www.w3.org/2003/InkML">
+  <inkml:definitions>
+    <inkml:context xml:id="ctx0">
+      <inkml:inkSource xml:id="inkSrc0">
+        <inkml:traceFormat>
+          <inkml:channel name="X" type="integer" min="-2.14748E9" max="2.14748E9" units="cm"/>
+          <inkml:channel name="Y" type="integer" min="-2.14748E9" max="2.14748E9" units="cm"/>
+          <inkml:channel name="F" type="integer" max="32767" units="dev"/>
+          <inkml:channel name="OA" type="integer" max="360" units="deg"/>
+          <inkml:channel name="OE" type="integer" max="90" units="deg"/>
+        </inkml:traceFormat>
+        <inkml:channelProperties>
+          <inkml:channelProperty channel="X" name="resolution" value="1000" units="1/cm"/>
+          <inkml:channelProperty channel="Y" name="resolution" value="1000" units="1/cm"/>
+          <inkml:channelProperty channel="F" name="resolution" value="0" units="1/dev"/>
+          <inkml:channelProperty channel="OA" name="resolution" value="1000" units="1/deg"/>
+          <inkml:channelProperty channel="OE" name="resolution" value="1000" units="1/deg"/>
+        </inkml:channelProperties>
+      </inkml:inkSource>
+      <inkml:timestamp xml:id="ts0" timeString="2021-04-14T19:01:28.902"/>
+    </inkml:context>
+    <inkml:brush xml:id="br0">
+      <inkml:brushProperty name="width" value="0.05" units="cm"/>
+      <inkml:brushProperty name="height" value="0.05" units="cm"/>
+      <inkml:brushProperty name="color" value="#E71224"/>
+    </inkml:brush>
+  </inkml:definitions>
+  <inkml:trace contextRef="#ctx0" brushRef="#br0">95 8 19351 0 0,'0'0'66'0'0,"0"-1"0"0"0,0 1 0 0 0,0 0 0 0 0,-1-1 0 0 0,1 1 0 0 0,0-1-1 0 0,0 1 1 0 0,-1 0 0 0 0,1-1 0 0 0,0 1 0 0 0,0 0 0 0 0,-1-1-1 0 0,1 1 1 0 0,0 0 0 0 0,-1-1 0 0 0,1 1 0 0 0,-1 0 0 0 0,1 0 0 0 0,0 0-1 0 0,-1-1 1 0 0,1 1 0 0 0,-1 0 0 0 0,1 0 0 0 0,0 0 0 0 0,-1 0 0 0 0,1 0-1 0 0,-1 0 1 0 0,1-1 0 0 0,-1 1 0 0 0,0 1-39 0 0,-1-1 0 0 0,1 0-1 0 0,0 1 1 0 0,0-1 0 0 0,0 1 0 0 0,-1-1 0 0 0,1 1 0 0 0,0-1-1 0 0,0 1 1 0 0,-1 1 0 0 0,-22 21 164 0 0,24-23-182 0 0,-6 8 249 0 0,0-1 0 0 0,1 1 0 0 0,0 0 0 0 0,0 0-1 0 0,1 1 1 0 0,-7 17 0 0 0,10-23-190 0 0,0 0-1 0 0,0 0 1 0 0,1 1-1 0 0,-1-1 1 0 0,1 0-1 0 0,-1 1 1 0 0,1-1-1 0 0,0 1 1 0 0,0-1-1 0 0,1 0 0 0 0,-1 1 1 0 0,1-1-1 0 0,-1 0 1 0 0,1 1-1 0 0,0-1 1 0 0,1 0-1 0 0,-1 0 1 0 0,0 0-1 0 0,1 0 1 0 0,0 0-1 0 0,-1 0 1 0 0,6 5-1 0 0,-6-6-69 0 0,1-1 1 0 0,0 1-1 0 0,0 0 0 0 0,-1-1 0 0 0,1 0 0 0 0,0 1 1 0 0,0-1-1 0 0,0 0 0 0 0,1 0 0 0 0,-1 0 1 0 0,0-1-1 0 0,0 1 0 0 0,0 0 0 0 0,1-1 0 0 0,-1 1 1 0 0,5-1-1 0 0,-3 0 17 0 0,0 0 1 0 0,0-1-1 0 0,0 1 1 0 0,0-1-1 0 0,-1 0 0 0 0,1 0 1 0 0,0-1-1 0 0,0 1 1 0 0,4-3-1 0 0,0 0 4 0 0,0-1 0 0 0,-1 0 0 0 0,0-1-1 0 0,1 1 1 0 0,-2-1 0 0 0,1-1 0 0 0,-1 1 0 0 0,6-9 0 0 0,50-85 939 0 0,-52 83-471 0 0,-9 17-438 0 0,-1-1 1 0 0,1 0 0 0 0,0 0-1 0 0,-1 0 1 0 0,1 0 0 0 0,0 1-1 0 0,-1-1 1 0 0,1 0 0 0 0,0 1-1 0 0,0-1 1 0 0,0 0 0 0 0,-1 1-1 0 0,1-1 1 0 0,0 1 0 0 0,1-1-1 0 0,7 20 182 0 0,-8-9-401 0 0,1 0 0 0 0,-1 1 0 0 0,-1 18 0 0 0,0-14-369 0 0,2 23-1 0 0,-1-34 459 0 0,-1 0 0 0 0,1 0 0 0 0,0 0 0 0 0,0-1 0 0 0,1 1 0 0 0,-1 0 0 0 0,1-1 0 0 0,0 1 0 0 0,0-1 0 0 0,4 6 0 0 0,-6-9-99 0 0,1 1 1 0 0,-1-1 0 0 0,1 1 0 0 0,-1 0-1 0 0,1-1 1 0 0,-1 0 0 0 0,1 1 0 0 0,0-1 0 0 0,-1 1-1 0 0,1-1 1 0 0,-1 0 0 0 0,1 1 0 0 0,0-1 0 0 0,0 0-1 0 0,-1 0 1 0 0,1 1 0 0 0,0-1 0 0 0,-1 0-1 0 0,1 0 1 0 0,0 0 0 0 0,0 0 0 0 0,-1 0 0 0 0,1 0-1 0 0,0 0 1 0 0,0 0 0 0 0,-1 0 0 0 0,1 0 0 0 0,1-1-1 0 0</inkml:trace>
+</inkml:ink>
+</file>
+
+<file path=ppt/ink/ink26.xml><?xml version="1.0" encoding="utf-8"?>
+<inkml:ink xmlns:inkml="http://www.w3.org/2003/InkML">
+  <inkml:definitions>
+    <inkml:context xml:id="ctx0">
+      <inkml:inkSource xml:id="inkSrc0">
+        <inkml:traceFormat>
+          <inkml:channel name="X" type="integer" min="-2.14748E9" max="2.14748E9" units="cm"/>
+          <inkml:channel name="Y" type="integer" min="-2.14748E9" max="2.14748E9" units="cm"/>
+          <inkml:channel name="F" type="integer" max="32767" units="dev"/>
+          <inkml:channel name="OA" type="integer" max="360" units="deg"/>
+          <inkml:channel name="OE" type="integer" max="90" units="deg"/>
+        </inkml:traceFormat>
+        <inkml:channelProperties>
+          <inkml:channelProperty channel="X" name="resolution" value="1000" units="1/cm"/>
+          <inkml:channelProperty channel="Y" name="resolution" value="1000" units="1/cm"/>
+          <inkml:channelProperty channel="F" name="resolution" value="0" units="1/dev"/>
+          <inkml:channelProperty channel="OA" name="resolution" value="1000" units="1/deg"/>
+          <inkml:channelProperty channel="OE" name="resolution" value="1000" units="1/deg"/>
+        </inkml:channelProperties>
+      </inkml:inkSource>
+      <inkml:timestamp xml:id="ts0" timeString="2021-04-14T19:01:29.293"/>
+    </inkml:context>
+    <inkml:brush xml:id="br0">
+      <inkml:brushProperty name="width" value="0.05" units="cm"/>
+      <inkml:brushProperty name="height" value="0.05" units="cm"/>
+      <inkml:brushProperty name="color" value="#E71224"/>
+    </inkml:brush>
+  </inkml:definitions>
+  <inkml:trace contextRef="#ctx0" brushRef="#br0">204 32 23039 0 0,'0'0'2'0'0,"0"-5"576"0"0,0-1 1 0 0,0 1-1 0 0,2-11 0 0 0,4 39 566 0 0,0 194 102 0 0,-9-69-863 0 0,0-41-306 0 0,3-96-76 0 0,6 138-426 0 0,-3-109-1825 0 0,-3-24 911 0 0</inkml:trace>
+  <inkml:trace contextRef="#ctx0" brushRef="#br0" timeOffset="1">1 423 22175 0 0,'0'0'2010'0'0,"1"0"-1658"0"0,30 12 278 0 0,3-1 200 0 0,-22-7-677 0 0,0 0 0 0 0,0-1 1 0 0,21 3-1 0 0,1-2-679 0 0,37 9 0 0 0,-27-3-6701 0 0,-42-10 6589 0 0,19 6-6983 0 0</inkml:trace>
+</inkml:ink>
+</file>
+
+<file path=ppt/ink/ink27.xml><?xml version="1.0" encoding="utf-8"?>
+<inkml:ink xmlns:inkml="http://www.w3.org/2003/InkML">
+  <inkml:definitions>
+    <inkml:context xml:id="ctx0">
+      <inkml:inkSource xml:id="inkSrc0">
+        <inkml:traceFormat>
+          <inkml:channel name="X" type="integer" min="-2.14748E9" max="2.14748E9" units="cm"/>
+          <inkml:channel name="Y" type="integer" min="-2.14748E9" max="2.14748E9" units="cm"/>
+          <inkml:channel name="F" type="integer" max="32767" units="dev"/>
+          <inkml:channel name="OA" type="integer" max="360" units="deg"/>
+          <inkml:channel name="OE" type="integer" max="90" units="deg"/>
+        </inkml:traceFormat>
+        <inkml:channelProperties>
+          <inkml:channelProperty channel="X" name="resolution" value="1000" units="1/cm"/>
+          <inkml:channelProperty channel="Y" name="resolution" value="1000" units="1/cm"/>
+          <inkml:channelProperty channel="F" name="resolution" value="0" units="1/dev"/>
+          <inkml:channelProperty channel="OA" name="resolution" value="1000" units="1/deg"/>
+          <inkml:channelProperty channel="OE" name="resolution" value="1000" units="1/deg"/>
+        </inkml:channelProperties>
+      </inkml:inkSource>
+      <inkml:timestamp xml:id="ts0" timeString="2021-04-14T19:01:29.653"/>
+    </inkml:context>
+    <inkml:brush xml:id="br0">
+      <inkml:brushProperty name="width" value="0.05" units="cm"/>
+      <inkml:brushProperty name="height" value="0.05" units="cm"/>
+      <inkml:brushProperty name="color" value="#E71224"/>
+    </inkml:brush>
+  </inkml:definitions>
+  <inkml:trace contextRef="#ctx0" brushRef="#br0">31 161 12896 0 0,'0'0'997'0'0,"6"-5"-618"0"0,1 1 244 0 0,-1-1 1 0 0,0 0 0 0 0,0 0 0 0 0,-1 0 0 0 0,1-1-1 0 0,-1 1 1 0 0,0-1 0 0 0,-1-1 0 0 0,1 1 0 0 0,-1-1 0 0 0,-1 1-1 0 0,1-1 1 0 0,-1-1 0 0 0,0 1 0 0 0,2-9 0 0 0,-4 14-559 0 0,-1 0 1 0 0,0 0 0 0 0,1 0 0 0 0,-1 0 0 0 0,0 0 0 0 0,0 0 0 0 0,0 0 0 0 0,-1 0-1 0 0,1 0 1 0 0,0 0 0 0 0,-1 0 0 0 0,1 0 0 0 0,-1 0 0 0 0,0 0 0 0 0,1 0 0 0 0,-1 0-1 0 0,0 0 1 0 0,0 1 0 0 0,0-1 0 0 0,-3-3 0 0 0,3 4-38 0 0,0 1 0 0 0,-1-1 1 0 0,1 0-1 0 0,0 0 0 0 0,0 1 0 0 0,-1-1 1 0 0,1 1-1 0 0,0-1 0 0 0,-1 1 0 0 0,1 0 1 0 0,0-1-1 0 0,-1 1 0 0 0,1 0 0 0 0,0 0 0 0 0,-1 0 1 0 0,1 0-1 0 0,-1 0 0 0 0,1 0 0 0 0,0 1 1 0 0,-1-1-1 0 0,1 0 0 0 0,0 1 0 0 0,-1-1 1 0 0,1 1-1 0 0,0-1 0 0 0,-1 1 0 0 0,1 0 0 0 0,0-1 1 0 0,0 1-1 0 0,-2 2 0 0 0,-1 0 5 0 0,0 0-1 0 0,0 1 0 0 0,1 0 1 0 0,-1 0-1 0 0,1 0 0 0 0,0 0 1 0 0,0 0-1 0 0,-4 9 0 0 0,1 1-81 0 0,-9 24 1 0 0,14-34-55 0 0,-1 0 0 0 0,1 0 0 0 0,1 0 0 0 0,-1 0 0 0 0,0 0 0 0 0,1 7 1 0 0,0-9-155 0 0,0-1 0 0 0,1 0 0 0 0,-1 1 1 0 0,0-1-1 0 0,1 1 0 0 0,-1-1 1 0 0,1 0-1 0 0,-1 1 0 0 0,2 1 0 0 0,-1-2-198 0 0,-1 0-1 0 0,1 0 0 0 0,0 0 1 0 0,0 0-1 0 0,0-1 0 0 0,0 1 1 0 0,-1 0-1 0 0,1-1 0 0 0,0 1 1 0 0,0-1-1 0 0,0 1 0 0 0,0-1 1 0 0,0 1-1 0 0,2 0 0 0 0,11 1-6702 0 0</inkml:trace>
+</inkml:ink>
+</file>
+
+<file path=ppt/ink/ink28.xml><?xml version="1.0" encoding="utf-8"?>
+<inkml:ink xmlns:inkml="http://www.w3.org/2003/InkML">
+  <inkml:definitions>
+    <inkml:context xml:id="ctx0">
+      <inkml:inkSource xml:id="inkSrc0">
+        <inkml:traceFormat>
+          <inkml:channel name="X" type="integer" min="-2.14748E9" max="2.14748E9" units="cm"/>
+          <inkml:channel name="Y" type="integer" min="-2.14748E9" max="2.14748E9" units="cm"/>
+          <inkml:channel name="F" type="integer" max="32767" units="dev"/>
+          <inkml:channel name="OA" type="integer" max="360" units="deg"/>
+          <inkml:channel name="OE" type="integer" max="90" units="deg"/>
+        </inkml:traceFormat>
+        <inkml:channelProperties>
+          <inkml:channelProperty channel="X" name="resolution" value="1000" units="1/cm"/>
+          <inkml:channelProperty channel="Y" name="resolution" value="1000" units="1/cm"/>
+          <inkml:channelProperty channel="F" name="resolution" value="0" units="1/dev"/>
+          <inkml:channelProperty channel="OA" name="resolution" value="1000" units="1/deg"/>
+          <inkml:channelProperty channel="OE" name="resolution" value="1000" units="1/deg"/>
+        </inkml:channelProperties>
+      </inkml:inkSource>
+      <inkml:timestamp xml:id="ts0" timeString="2021-04-14T19:01:30.041"/>
+    </inkml:context>
+    <inkml:brush xml:id="br0">
+      <inkml:brushProperty name="width" value="0.05" units="cm"/>
+      <inkml:brushProperty name="height" value="0.05" units="cm"/>
+      <inkml:brushProperty name="color" value="#E71224"/>
+    </inkml:brush>
+  </inkml:definitions>
+  <inkml:trace contextRef="#ctx0" brushRef="#br0">69 1 19063 0 0,'0'0'871'0'0,"-11"7"322"0"0,8-3-854 0 0,0-1-1 0 0,1 1 0 0 0,0-1 0 0 0,0 1 0 0 0,0 0 0 0 0,1 0 1 0 0,-1-1-1 0 0,1 1 0 0 0,0 1 0 0 0,0-1 0 0 0,0 0 0 0 0,0 0 1 0 0,1 0-1 0 0,0 0 0 0 0,0 6 0 0 0,1-3-17 0 0,-1-1-1 0 0,2 0 1 0 0,-1 0 0 0 0,1 0-1 0 0,0 0 1 0 0,0-1 0 0 0,1 1-1 0 0,-1 0 1 0 0,7 8-1 0 0,-5-8-187 0 0,0 1 0 0 0,-1-1-1 0 0,0 1 1 0 0,0 0-1 0 0,4 14 1 0 0,-6-17-110 0 0,0 0 0 0 0,-1 0 0 0 0,1 0 0 0 0,-1 0 0 0 0,0 0 0 0 0,0 1 0 0 0,0-1 0 0 0,-1 0 0 0 0,0 0 0 0 0,1 0 0 0 0,-1 0 0 0 0,-3 5 0 0 0,2-3-70 0 0,-1 0 0 0 0,-1-1 0 0 0,1 1 0 0 0,-1-1 0 0 0,0 0-1 0 0,0 0 1 0 0,-6 5 0 0 0,-5 3-2897 0 0,-2-4-4193 0 0,4-6-1652 0 0</inkml:trace>
+</inkml:ink>
+</file>
+
+<file path=ppt/ink/ink29.xml><?xml version="1.0" encoding="utf-8"?>
+<inkml:ink xmlns:inkml="http://www.w3.org/2003/InkML">
+  <inkml:definitions>
+    <inkml:context xml:id="ctx0">
+      <inkml:inkSource xml:id="inkSrc0">
+        <inkml:traceFormat>
+          <inkml:channel name="X" type="integer" min="-2.14748E9" max="2.14748E9" units="cm"/>
+          <inkml:channel name="Y" type="integer" min="-2.14748E9" max="2.14748E9" units="cm"/>
+          <inkml:channel name="F" type="integer" max="32767" units="dev"/>
+          <inkml:channel name="OA" type="integer" max="360" units="deg"/>
+          <inkml:channel name="OE" type="integer" max="90" units="deg"/>
+        </inkml:traceFormat>
+        <inkml:channelProperties>
+          <inkml:channelProperty channel="X" name="resolution" value="1000" units="1/cm"/>
+          <inkml:channelProperty channel="Y" name="resolution" value="1000" units="1/cm"/>
+          <inkml:channelProperty channel="F" name="resolution" value="0" units="1/dev"/>
+          <inkml:channelProperty channel="OA" name="resolution" value="1000" units="1/deg"/>
+          <inkml:channelProperty channel="OE" name="resolution" value="1000" units="1/deg"/>
+        </inkml:channelProperties>
+      </inkml:inkSource>
+      <inkml:timestamp xml:id="ts0" timeString="2021-04-14T19:01:36.187"/>
+    </inkml:context>
+    <inkml:brush xml:id="br0">
+      <inkml:brushProperty name="width" value="0.05" units="cm"/>
+      <inkml:brushProperty name="height" value="0.05" units="cm"/>
+      <inkml:brushProperty name="color" value="#E71224"/>
+    </inkml:brush>
+  </inkml:definitions>
+  <inkml:trace contextRef="#ctx0" brushRef="#br0">22 153 3680 0 0,'0'0'284'0'0,"0"0"-190"0"0,-22-15 18248 0 0,23 14-18023 0 0,4-5 1984 0 0,-3 5-2168 0 0,0 1 0 0 0,0-1 0 0 0,0 1 0 0 0,0-1 0 0 0,0 1 0 0 0,0 0 0 0 0,0 0-1 0 0,0 0 1 0 0,0 0 0 0 0,0 0 0 0 0,-1 0 0 0 0,1 0 0 0 0,0 1 0 0 0,3 0 0 0 0,27 10 394 0 0,-5 0-145 0 0,33 7-1 0 0,11 5-22 0 0,-15-4-83 0 0,0-4 0 0 0,64 10 0 0 0,-5-1 224 0 0,-87-16-343 0 0,-17-5-48 0 0,-1 0-1 0 0,1 0 1 0 0,0-1-1 0 0,13 0 1 0 0,-24-2-100 0 0,0 0 0 0 0,1 0 0 0 0,-1 0 0 0 0,0-1 0 0 0,0 1 0 0 0,0 0 1 0 0,1 0-1 0 0,-1-1 0 0 0,0 1 0 0 0,0 0 0 0 0,0 0 0 0 0,1-1 0 0 0,-1 1 0 0 0,0 0 0 0 0,0 0 0 0 0,0-1 0 0 0,0 1 0 0 0,0 0 0 0 0,0-1 0 0 0,0 1 0 0 0,0 0 1 0 0,0-1-1 0 0,0 1 0 0 0,0 0 0 0 0,0-1 0 0 0,0 1 0 0 0,0 0 0 0 0,0 0 0 0 0,0-1 0 0 0,0 1 0 0 0,0 0 0 0 0,0-1 0 0 0,-3-12 112 0 0,-2 4-74 0 0,0-1 0 0 0,0 1 0 0 0,-1 0 0 0 0,0 0 0 0 0,-1 1 0 0 0,0 0 0 0 0,-10-9 0 0 0,-60-47 35 0 0,49 43-80 0 0,-115-79-4 0 0,123 90 28 0 0,20 10-26 0 0,0 0-1 0 0,0 0 0 0 0,0 0 1 0 0,0 0-1 0 0,0 0 0 0 0,0-1 0 0 0,0 1 1 0 0,0 0-1 0 0,0 0 0 0 0,0 0 1 0 0,-1 0-1 0 0,1 0 0 0 0,0 0 0 0 0,0 0 1 0 0,0 0-1 0 0,0 0 0 0 0,0 0 1 0 0,0 0-1 0 0,0 0 0 0 0,0 0 1 0 0,0 0-1 0 0,-1 0 0 0 0,1 0 0 0 0,0 0 1 0 0,0 0-1 0 0,0 0 0 0 0,0 0 1 0 0,0 0-1 0 0,0 0 0 0 0,0 0 1 0 0,0 0-1 0 0,0 0 0 0 0,0 0 0 0 0,0 1 1 0 0,-1-1-1 0 0,1 0 0 0 0,0 0 1 0 0,0 0-1 0 0,0 0 0 0 0,0 0 1 0 0,0 0-1 0 0,0 0 0 0 0,0 0 0 0 0,0 0 1 0 0,0 0-1 0 0,0 0 0 0 0,0 0 1 0 0,0 1-1 0 0,0-1 0 0 0,6 9 34 0 0,-2-6-35 0 0,0 0 0 0 0,0 1 0 0 0,0-1 0 0 0,1-1 0 0 0,-1 1 0 0 0,1-1 0 0 0,0 1 0 0 0,5 1 0 0 0,42 11 0 0 0,-45-13 0 0 0,17 3 10 0 0,33 3 0 0 0,0-1 45 0 0,131 16 187 0 0,-76-11 132 0 0,-112-12-371 0 0,1 0 1 0 0,-1 0 0 0 0,0 0-1 0 0,1 0 1 0 0,-1 0 0 0 0,0 0 0 0 0,1 0-1 0 0,-1 0 1 0 0,0 0 0 0 0,1 0-1 0 0,-1 0 1 0 0,0 0 0 0 0,1 0-1 0 0,-1 0 1 0 0,0 0 0 0 0,1 1-1 0 0,-1-1 1 0 0,0 0 0 0 0,1 0 0 0 0,-1 0-1 0 0,0 0 1 0 0,1 1 0 0 0,-1-1-1 0 0,0 0 1 0 0,0 0 0 0 0,1 1-1 0 0,-1-1 1 0 0,0 0 0 0 0,0 1-1 0 0,0-1 1 0 0,1 0 0 0 0,-1 0 0 0 0,0 1-1 0 0,0-1 1 0 0,0 0 0 0 0,0 1-1 0 0,-10 11 90 0 0,-18 13-93 0 0,-61 48 0 0 0,37-31 0 0 0,38-29 0 0 0,0-1 0 0 0,-1-1 0 0 0,-17 10 0 0 0,30-20 0 0 0,-15 8 0 0 0,-26 11 0 0 0,37-18 0 0 0,0 0 0 0 0,0 0 0 0 0,0-1 0 0 0,0 0 0 0 0,-1 0 0 0 0,1-1 0 0 0,0 0 0 0 0,-10 0 0 0 0,-8-4-585 0 0,22 4-75 0 0,9-2-3216 0 0,3 0 1173 0 0</inkml:trace>
+</inkml:ink>
+</file>
+
+<file path=ppt/ink/ink3.xml><?xml version="1.0" encoding="utf-8"?>
+<inkml:ink xmlns:inkml="http://www.w3.org/2003/InkML">
+  <inkml:definitions>
+    <inkml:context xml:id="ctx0">
+      <inkml:inkSource xml:id="inkSrc0">
+        <inkml:traceFormat>
+          <inkml:channel name="X" type="integer" min="-2.14748E9" max="2.14748E9" units="cm"/>
+          <inkml:channel name="Y" type="integer" min="-2.14748E9" max="2.14748E9" units="cm"/>
+          <inkml:channel name="F" type="integer" max="32767" units="dev"/>
+          <inkml:channel name="OA" type="integer" max="360" units="deg"/>
+          <inkml:channel name="OE" type="integer" max="90" units="deg"/>
+        </inkml:traceFormat>
+        <inkml:channelProperties>
+          <inkml:channelProperty channel="X" name="resolution" value="1000" units="1/cm"/>
+          <inkml:channelProperty channel="Y" name="resolution" value="1000" units="1/cm"/>
+          <inkml:channelProperty channel="F" name="resolution" value="0" units="1/dev"/>
+          <inkml:channelProperty channel="OA" name="resolution" value="1000" units="1/deg"/>
+          <inkml:channelProperty channel="OE" name="resolution" value="1000" units="1/deg"/>
+        </inkml:channelProperties>
+      </inkml:inkSource>
+      <inkml:timestamp xml:id="ts0" timeString="2021-04-14T19:00:35.949"/>
+    </inkml:context>
+    <inkml:brush xml:id="br0">
+      <inkml:brushProperty name="width" value="0.05" units="cm"/>
+      <inkml:brushProperty name="height" value="0.05" units="cm"/>
+      <inkml:brushProperty name="color" value="#E71224"/>
+    </inkml:brush>
+  </inkml:definitions>
+  <inkml:trace contextRef="#ctx0" brushRef="#br0">1 211 12816 0 0,'0'0'2206'0'0,"11"-14"1362"0"0,-6 9-3121 0 0,1 0 0 0 0,-1 0-1 0 0,1 1 1 0 0,0-1 0 0 0,0 1 0 0 0,1 1-1 0 0,-1 0 1 0 0,1-1 0 0 0,0 2 0 0 0,-1-1-1 0 0,11-1 1 0 0,15-8 528 0 0,-6 3-289 0 0,32-8 0 0 0,8-2 39 0 0,158-57 371 0 0,-223 75-1124 0 0,12-3-2015 0 0,-13 4 1614 0 0,1 0 0 0 0,0-1 1 0 0,0 1-1 0 0,0-1 0 0 0,0 1 0 0 0,0-1 1 0 0,0 1-1 0 0,0-1 0 0 0,0 0 1 0 0,-1 1-1 0 0,1-1 0 0 0,0 0 0 0 0,-1 1 1 0 0,1-1-1 0 0,0 0 0 0 0,0-1 0 0 0</inkml:trace>
+</inkml:ink>
+</file>
+
+<file path=ppt/ink/ink30.xml><?xml version="1.0" encoding="utf-8"?>
+<inkml:ink xmlns:inkml="http://www.w3.org/2003/InkML">
+  <inkml:definitions>
+    <inkml:context xml:id="ctx0">
+      <inkml:inkSource xml:id="inkSrc0">
+        <inkml:traceFormat>
+          <inkml:channel name="X" type="integer" min="-2.14748E9" max="2.14748E9" units="cm"/>
+          <inkml:channel name="Y" type="integer" min="-2.14748E9" max="2.14748E9" units="cm"/>
+          <inkml:channel name="F" type="integer" max="32767" units="dev"/>
+          <inkml:channel name="OA" type="integer" max="360" units="deg"/>
+          <inkml:channel name="OE" type="integer" max="90" units="deg"/>
+        </inkml:traceFormat>
+        <inkml:channelProperties>
+          <inkml:channelProperty channel="X" name="resolution" value="1000" units="1/cm"/>
+          <inkml:channelProperty channel="Y" name="resolution" value="1000" units="1/cm"/>
+          <inkml:channelProperty channel="F" name="resolution" value="0" units="1/dev"/>
+          <inkml:channelProperty channel="OA" name="resolution" value="1000" units="1/deg"/>
+          <inkml:channelProperty channel="OE" name="resolution" value="1000" units="1/deg"/>
+        </inkml:channelProperties>
+      </inkml:inkSource>
+      <inkml:timestamp xml:id="ts0" timeString="2021-04-14T19:01:43.355"/>
+    </inkml:context>
+    <inkml:brush xml:id="br0">
+      <inkml:brushProperty name="width" value="0.05" units="cm"/>
+      <inkml:brushProperty name="height" value="0.05" units="cm"/>
+      <inkml:brushProperty name="color" value="#E71224"/>
+    </inkml:brush>
+  </inkml:definitions>
+  <inkml:trace contextRef="#ctx0" brushRef="#br0">74 9 2304 0 0,'0'0'607'0'0,"-15"-2"1193"0"0,10 0 1971 0 0,-9-2-983 0 0,14 4-2659 0 0,-1 0 1 0 0,1 0-1 0 0,0 0 1 0 0,-1 0-1 0 0,1 0 1 0 0,-1 0-1 0 0,1 0 1 0 0,0 0-1 0 0,-1 0 1 0 0,1 0 0 0 0,-1 0-1 0 0,1 0 1 0 0,-1 1-1 0 0,1-1 1 0 0,0 0-1 0 0,-1 0 1 0 0,1 0-1 0 0,0 1 1 0 0,-1-1-1 0 0,1 0 1 0 0,0 0-1 0 0,-1 1 1 0 0,1-1 0 0 0,0 0-1 0 0,0 1 1 0 0,-1-1-1 0 0,1 0 1 0 0,0 1-1 0 0,-18 12 4155 0 0,18-12-3347 0 0,-11 12 4206 0 0,13-10-5060 0 0,0 0 1 0 0,0-1-1 0 0,0 1 1 0 0,1-1-1 0 0,-1 1 0 0 0,1-1 1 0 0,0 0-1 0 0,0 0 1 0 0,0 0-1 0 0,0 0 1 0 0,0-1-1 0 0,0 1 0 0 0,0-1 1 0 0,6 2-1 0 0,5 1 127 0 0,1-1 0 0 0,18 2 0 0 0,-1-1 126 0 0,28 8 282 0 0,0-2 1 0 0,92 2-1 0 0,-103-13-353 0 0,42 1 167 0 0,-39 2-200 0 0,36 4 220 0 0,-65-4-342 0 0,39 8 221 0 0,-47-8-258 0 0,0 0 0 0 0,24 0 0 0 0,-2-1 59 0 0,-30-1-106 0 0,0 0 0 0 0,-1 0-1 0 0,12-3 1 0 0,4 0 99 0 0,0 1-41 0 0,-2 0-34 0 0,1 0 0 0 0,0 2 0 0 0,0 0 0 0 0,0 1 0 0 0,39 8 0 0 0,-13 6-359 0 0,-46-15 509 0 0,8 2 208 0 0,-2 1-360 0 0,32 9-456 0 0,-26-9 861 0 0,-9-1-442 0 0,-4-1-13 0 0,1-1 1 0 0,-1 0-1 0 0,0 0 0 0 0,0 0 1 0 0,1 0-1 0 0,-1 0 1 0 0,0 0-1 0 0,0 0 0 0 0,1 0 1 0 0,-1-1-1 0 0,0 1 1 0 0,0 0-1 0 0,0 0 1 0 0,1 0-1 0 0,-1 0 0 0 0,0 0 1 0 0,0 0-1 0 0,0 0 1 0 0,1 0-1 0 0,-1-1 0 0 0,0 1 1 0 0,0 0-1 0 0,0 0 1 0 0,1 0-1 0 0,-1 0 1 0 0,0-1-1 0 0,0 1 0 0 0,0 0 1 0 0,0 0-1 0 0,0 0 1 0 0,0-1-1 0 0,0 1 1 0 0,1 0-1 0 0,-1 0 0 0 0,0-1 1 0 0,0 1-1 0 0,0 0 1 0 0,0 0-1 0 0,0 0 0 0 0,0-1 1 0 0,0 1-1 0 0,0 0 1 0 0,0 0-1 0 0,0-1 1 0 0,0 1-1 0 0,0 0 0 0 0,0 0 1 0 0,0 0-1 0 0,-1-1 1 0 0,1 1-1 0 0,0-12-707 0 0,-6 3-1504 0 0,0 5-2215 0 0</inkml:trace>
+</inkml:ink>
+</file>
+
+<file path=ppt/ink/ink31.xml><?xml version="1.0" encoding="utf-8"?>
+<inkml:ink xmlns:inkml="http://www.w3.org/2003/InkML">
+  <inkml:definitions>
+    <inkml:context xml:id="ctx0">
+      <inkml:inkSource xml:id="inkSrc0">
+        <inkml:traceFormat>
+          <inkml:channel name="X" type="integer" min="-2.14748E9" max="2.14748E9" units="cm"/>
+          <inkml:channel name="Y" type="integer" min="-2.14748E9" max="2.14748E9" units="cm"/>
+          <inkml:channel name="F" type="integer" max="32767" units="dev"/>
+          <inkml:channel name="OA" type="integer" max="360" units="deg"/>
+          <inkml:channel name="OE" type="integer" max="90" units="deg"/>
+        </inkml:traceFormat>
+        <inkml:channelProperties>
+          <inkml:channelProperty channel="X" name="resolution" value="1000" units="1/cm"/>
+          <inkml:channelProperty channel="Y" name="resolution" value="1000" units="1/cm"/>
+          <inkml:channelProperty channel="F" name="resolution" value="0" units="1/dev"/>
+          <inkml:channelProperty channel="OA" name="resolution" value="1000" units="1/deg"/>
+          <inkml:channelProperty channel="OE" name="resolution" value="1000" units="1/deg"/>
+        </inkml:channelProperties>
+      </inkml:inkSource>
+      <inkml:timestamp xml:id="ts0" timeString="2021-04-14T19:01:54.255"/>
+    </inkml:context>
+    <inkml:brush xml:id="br0">
+      <inkml:brushProperty name="width" value="0.05" units="cm"/>
+      <inkml:brushProperty name="height" value="0.05" units="cm"/>
+      <inkml:brushProperty name="color" value="#E71224"/>
+    </inkml:brush>
+  </inkml:definitions>
+  <inkml:trace contextRef="#ctx0" brushRef="#br0">1 1 13536 0 0,'0'0'1357'0'0,"8"10"139"0"0,2-7-1078 0 0,-1 0 1 0 0,1-1-1 0 0,0-1 1 0 0,0 1-1 0 0,0-1 1 0 0,0-1-1 0 0,0 0 1 0 0,13-2-1 0 0,9 2 290 0 0,414 12 3911 0 0,-234 6-4152 0 0,-110-8 585 0 0,162 10-147 0 0,-24-9 615 0 0,-221-9-1467 0 0,264-3 95 0 0,-95-24 155 0 0,-146 14 425 0 0,5-1-866 0 0,-16 8-4847 0 0</inkml:trace>
+</inkml:ink>
+</file>
+
+<file path=ppt/ink/ink4.xml><?xml version="1.0" encoding="utf-8"?>
+<inkml:ink xmlns:inkml="http://www.w3.org/2003/InkML">
+  <inkml:definitions>
+    <inkml:context xml:id="ctx0">
+      <inkml:inkSource xml:id="inkSrc0">
+        <inkml:traceFormat>
+          <inkml:channel name="X" type="integer" min="-2.14748E9" max="2.14748E9" units="cm"/>
+          <inkml:channel name="Y" type="integer" min="-2.14748E9" max="2.14748E9" units="cm"/>
+          <inkml:channel name="F" type="integer" max="32767" units="dev"/>
+          <inkml:channel name="OA" type="integer" max="360" units="deg"/>
+          <inkml:channel name="OE" type="integer" max="90" units="deg"/>
+        </inkml:traceFormat>
+        <inkml:channelProperties>
+          <inkml:channelProperty channel="X" name="resolution" value="1000" units="1/cm"/>
+          <inkml:channelProperty channel="Y" name="resolution" value="1000" units="1/cm"/>
+          <inkml:channelProperty channel="F" name="resolution" value="0" units="1/dev"/>
+          <inkml:channelProperty channel="OA" name="resolution" value="1000" units="1/deg"/>
+          <inkml:channelProperty channel="OE" name="resolution" value="1000" units="1/deg"/>
+        </inkml:channelProperties>
+      </inkml:inkSource>
+      <inkml:timestamp xml:id="ts0" timeString="2021-04-14T19:00:36.322"/>
+    </inkml:context>
+    <inkml:brush xml:id="br0">
+      <inkml:brushProperty name="width" value="0.05" units="cm"/>
+      <inkml:brushProperty name="height" value="0.05" units="cm"/>
+      <inkml:brushProperty name="color" value="#E71224"/>
+    </inkml:brush>
+  </inkml:definitions>
+  <inkml:trace contextRef="#ctx0" brushRef="#br0">120 3 3224 0 0,'5'0'17715'0'0,"-8"-1"-17497"0"0,0 1 0 0 0,-1-1 0 0 0,1 1 0 0 0,-1 0 0 0 0,1 0-1 0 0,0 0 1 0 0,-1 0 0 0 0,1 1 0 0 0,-1-1 0 0 0,1 1 0 0 0,0 0 0 0 0,-1 0-1 0 0,1 0 1 0 0,0 1 0 0 0,0-1 0 0 0,0 1 0 0 0,0-1 0 0 0,0 1 0 0 0,0 0-1 0 0,1 0 1 0 0,-1 1 0 0 0,-2 1 0 0 0,0 1-131 0 0,0 0 1 0 0,1 0-1 0 0,0 0 0 0 0,-1 0 1 0 0,2 0-1 0 0,-1 1 1 0 0,1 0-1 0 0,0 0 0 0 0,0 0 1 0 0,-4 11-1 0 0,6-12-37 0 0,0 0 0 0 0,0 0 1 0 0,1 0-1 0 0,-1 0 0 0 0,1 0 0 0 0,0-1 0 0 0,0 1 0 0 0,1 0 0 0 0,0 0 0 0 0,-1 0 1 0 0,2 0-1 0 0,-1-1 0 0 0,3 7 0 0 0,-3-8-9 0 0,1 1 0 0 0,0-1 0 0 0,0 1 0 0 0,0-1 0 0 0,1 0 0 0 0,-1 0 0 0 0,1 0 1 0 0,0 0-1 0 0,0-1 0 0 0,0 1 0 0 0,0-1 0 0 0,0 1 0 0 0,1-1 0 0 0,-1 0 0 0 0,1-1 0 0 0,6 4 0 0 0,-1-2 24 0 0,1-1-1 0 0,0 0 1 0 0,-1 0 0 0 0,1-1-1 0 0,0-1 1 0 0,0 1-1 0 0,15-3 1 0 0,-10 1-798 0 0,0-1 0 0 0,-1-1 0 0 0,1 0 0 0 0,17-7 0 0 0,-14 2-8398 0 0</inkml:trace>
+</inkml:ink>
+</file>
+
+<file path=ppt/ink/ink5.xml><?xml version="1.0" encoding="utf-8"?>
+<inkml:ink xmlns:inkml="http://www.w3.org/2003/InkML">
+  <inkml:definitions>
+    <inkml:context xml:id="ctx0">
+      <inkml:inkSource xml:id="inkSrc0">
+        <inkml:traceFormat>
+          <inkml:channel name="X" type="integer" min="-2.14748E9" max="2.14748E9" units="cm"/>
+          <inkml:channel name="Y" type="integer" min="-2.14748E9" max="2.14748E9" units="cm"/>
+          <inkml:channel name="F" type="integer" max="32767" units="dev"/>
+          <inkml:channel name="OA" type="integer" max="360" units="deg"/>
+          <inkml:channel name="OE" type="integer" max="90" units="deg"/>
+        </inkml:traceFormat>
+        <inkml:channelProperties>
+          <inkml:channelProperty channel="X" name="resolution" value="1000" units="1/cm"/>
+          <inkml:channelProperty channel="Y" name="resolution" value="1000" units="1/cm"/>
+          <inkml:channelProperty channel="F" name="resolution" value="0" units="1/dev"/>
+          <inkml:channelProperty channel="OA" name="resolution" value="1000" units="1/deg"/>
+          <inkml:channelProperty channel="OE" name="resolution" value="1000" units="1/deg"/>
+        </inkml:channelProperties>
+      </inkml:inkSource>
+      <inkml:timestamp xml:id="ts0" timeString="2021-04-14T19:00:36.705"/>
+    </inkml:context>
+    <inkml:brush xml:id="br0">
+      <inkml:brushProperty name="width" value="0.05" units="cm"/>
+      <inkml:brushProperty name="height" value="0.05" units="cm"/>
+      <inkml:brushProperty name="color" value="#E71224"/>
+    </inkml:brush>
+  </inkml:definitions>
+  <inkml:trace contextRef="#ctx0" brushRef="#br0">118 0 14832 0 0,'0'0'1342'0'0,"0"13"-322"0"0,1 1-231 0 0,0 0 1 0 0,-1 0-1 0 0,-1 0 0 0 0,-3 20 1 0 0,-17 55 296 0 0,10-46-346 0 0,-41 144 642 0 0,41-151-1231 0 0,6-22-156 0 0,1 0 1 0 0,1 1-1 0 0,0 0 0 0 0,-2 27 1 0 0,5-41-232 0 0,0 1 1 0 0,0-1-1 0 0,0 0 1 0 0,1 1-1 0 0,-1-1 1 0 0,0 1-1 0 0,1-1 1 0 0,-1 0-1 0 0,1 0 1 0 0,-1 1-1 0 0,1-1 1 0 0,0 0-1 0 0,0 0 1 0 0,-1 0-1 0 0,1 0 1 0 0,0 0-1 0 0,0 0 1 0 0,1 1-1 0 0</inkml:trace>
+</inkml:ink>
+</file>
+
+<file path=ppt/ink/ink6.xml><?xml version="1.0" encoding="utf-8"?>
+<inkml:ink xmlns:inkml="http://www.w3.org/2003/InkML">
+  <inkml:definitions>
+    <inkml:context xml:id="ctx0">
+      <inkml:inkSource xml:id="inkSrc0">
+        <inkml:traceFormat>
+          <inkml:channel name="X" type="integer" min="-2.14748E9" max="2.14748E9" units="cm"/>
+          <inkml:channel name="Y" type="integer" min="-2.14748E9" max="2.14748E9" units="cm"/>
+          <inkml:channel name="F" type="integer" max="32767" units="dev"/>
+          <inkml:channel name="OA" type="integer" max="360" units="deg"/>
+          <inkml:channel name="OE" type="integer" max="90" units="deg"/>
+        </inkml:traceFormat>
+        <inkml:channelProperties>
+          <inkml:channelProperty channel="X" name="resolution" value="1000" units="1/cm"/>
+          <inkml:channelProperty channel="Y" name="resolution" value="1000" units="1/cm"/>
+          <inkml:channelProperty channel="F" name="resolution" value="0" units="1/dev"/>
+          <inkml:channelProperty channel="OA" name="resolution" value="1000" units="1/deg"/>
+          <inkml:channelProperty channel="OE" name="resolution" value="1000" units="1/deg"/>
+        </inkml:channelProperties>
+      </inkml:inkSource>
+      <inkml:timestamp xml:id="ts0" timeString="2021-04-14T19:00:37.091"/>
+    </inkml:context>
+    <inkml:brush xml:id="br0">
+      <inkml:brushProperty name="width" value="0.05" units="cm"/>
+      <inkml:brushProperty name="height" value="0.05" units="cm"/>
+      <inkml:brushProperty name="color" value="#E71224"/>
+    </inkml:brush>
+  </inkml:definitions>
+  <inkml:trace contextRef="#ctx0" brushRef="#br0">138 0 4144 0 0,'0'0'191'0'0,"-15"3"26"0"0,-16 15 1812 0 0,24-12-90 0 0,-1 0 0 0 0,1 1 1 0 0,-11 12-1 0 0,10-9 678 0 0,1 1 1 0 0,-9 16 0 0 0,1 6-419 0 0,14-30-2089 0 0,0 1 1 0 0,0-1-1 0 0,0 1 1 0 0,0-1-1 0 0,1 1 1 0 0,0-1-1 0 0,0 1 1 0 0,0-1-1 0 0,0 1 1 0 0,0 0-1 0 0,1-1 1 0 0,1 5-1 0 0,-2-6-77 0 0,1-1-1 0 0,-1 0 1 0 0,1 0 0 0 0,-1 1 0 0 0,1-1-1 0 0,-1 0 1 0 0,1 0 0 0 0,0 0-1 0 0,0 0 1 0 0,0 0 0 0 0,0 0 0 0 0,0 0-1 0 0,-1 0 1 0 0,2 0 0 0 0,-1 0-1 0 0,0-1 1 0 0,0 1 0 0 0,0 0 0 0 0,0-1-1 0 0,0 1 1 0 0,1 0 0 0 0,-1-1-1 0 0,0 0 1 0 0,1 1 0 0 0,-1-1 0 0 0,0 0-1 0 0,1 0 1 0 0,-1 0 0 0 0,0 1 0 0 0,1-1-1 0 0,-1-1 1 0 0,0 1 0 0 0,1 0-1 0 0,-1 0 1 0 0,0 0 0 0 0,3-1 0 0 0,0-1 17 0 0,0 0 0 0 0,0 0 0 0 0,1 0 0 0 0,-1 0 0 0 0,0 0 0 0 0,-1-1 0 0 0,6-4 0 0 0,24-23 173 0 0,-21 16-133 0 0,-1-1-1 0 0,0 0 1 0 0,10-19-1 0 0,-9 15-1986 0 0,20-26-1 0 0,-24 36 130 0 0</inkml:trace>
+</inkml:ink>
+</file>
+
+<file path=ppt/ink/ink7.xml><?xml version="1.0" encoding="utf-8"?>
+<inkml:ink xmlns:inkml="http://www.w3.org/2003/InkML">
+  <inkml:definitions>
+    <inkml:context xml:id="ctx0">
+      <inkml:inkSource xml:id="inkSrc0">
+        <inkml:traceFormat>
+          <inkml:channel name="X" type="integer" min="-2.14748E9" max="2.14748E9" units="cm"/>
+          <inkml:channel name="Y" type="integer" min="-2.14748E9" max="2.14748E9" units="cm"/>
+          <inkml:channel name="F" type="integer" max="32767" units="dev"/>
+          <inkml:channel name="OA" type="integer" max="360" units="deg"/>
+          <inkml:channel name="OE" type="integer" max="90" units="deg"/>
+        </inkml:traceFormat>
+        <inkml:channelProperties>
+          <inkml:channelProperty channel="X" name="resolution" value="1000" units="1/cm"/>
+          <inkml:channelProperty channel="Y" name="resolution" value="1000" units="1/cm"/>
+          <inkml:channelProperty channel="F" name="resolution" value="0" units="1/dev"/>
+          <inkml:channelProperty channel="OA" name="resolution" value="1000" units="1/deg"/>
+          <inkml:channelProperty channel="OE" name="resolution" value="1000" units="1/deg"/>
+        </inkml:channelProperties>
+      </inkml:inkSource>
+      <inkml:timestamp xml:id="ts0" timeString="2021-04-14T19:00:37.485"/>
+    </inkml:context>
+    <inkml:brush xml:id="br0">
+      <inkml:brushProperty name="width" value="0.05" units="cm"/>
+      <inkml:brushProperty name="height" value="0.05" units="cm"/>
+      <inkml:brushProperty name="color" value="#E71224"/>
+    </inkml:brush>
+  </inkml:definitions>
+  <inkml:trace contextRef="#ctx0" brushRef="#br0">195 1 6912 0 0,'-8'0'714'0'0,"-18"3"1130"0"0,10-1 3338 0 0,-23 6 0 0 0,34-7-4626 0 0,1 1-1 0 0,-1-1 1 0 0,1 1 0 0 0,0 0 0 0 0,-1 0-1 0 0,1 1 1 0 0,0-1 0 0 0,1 1-1 0 0,-7 6 1 0 0,9-9-517 0 0,1 0-1 0 0,-1 1 0 0 0,1-1 0 0 0,0 1 1 0 0,-1-1-1 0 0,1 0 0 0 0,0 1 1 0 0,-1-1-1 0 0,1 1 0 0 0,0-1 0 0 0,0 1 1 0 0,0-1-1 0 0,-1 1 0 0 0,1-1 1 0 0,0 1-1 0 0,0 0 0 0 0,0-1 0 0 0,0 1 1 0 0,0-1-1 0 0,0 1 0 0 0,0-1 1 0 0,0 1-1 0 0,0-1 0 0 0,0 1 1 0 0,0-1-1 0 0,1 1 0 0 0,-1-1 0 0 0,0 2 1 0 0,1-1 5 0 0,0 0 1 0 0,0 1 0 0 0,0-1 0 0 0,0 0-1 0 0,0 1 1 0 0,0-1 0 0 0,1 0-1 0 0,-1 0 1 0 0,2 1 0 0 0,2 1 14 0 0,0 0 1 0 0,-1 0-1 0 0,1-1 1 0 0,0 0-1 0 0,7 2 1 0 0,-8-3-22 0 0,-1 0 1 0 0,1 0 0 0 0,0 1-1 0 0,0-1 1 0 0,0 1-1 0 0,-1 0 1 0 0,1 0 0 0 0,-1 0-1 0 0,0 0 1 0 0,0 1-1 0 0,1 0 1 0 0,-2-1 0 0 0,6 7-1 0 0,-7-7-12 0 0,1-1 0 0 0,-1 1 0 0 0,0 0 0 0 0,0 0 0 0 0,-1 0 0 0 0,1 0 0 0 0,0 0-1 0 0,-1 0 1 0 0,1 0 0 0 0,-1 0 0 0 0,0 0 0 0 0,1 0 0 0 0,-1 0 0 0 0,0 0 0 0 0,0 0-1 0 0,0 0 1 0 0,-1 0 0 0 0,1 0 0 0 0,0 0 0 0 0,-1 0 0 0 0,0 0 0 0 0,1 0 0 0 0,-1 0 0 0 0,0 0-1 0 0,0 0 1 0 0,0 0 0 0 0,-2 2 0 0 0,-1 3-30 0 0,-35 46 217 0 0,34-47-313 0 0,-1 0 0 0 0,-1 0 0 0 0,1 0 0 0 0,-1-1-1 0 0,-12 8 1 0 0,16-11-116 0 0,-28 14-1111 0 0,29-15 768 0 0,-1 0-1 0 0,0-1 1 0 0,0 1-1 0 0,1-1 0 0 0,-1 1 1 0 0,-3-1-1 0 0,0-2-1368 0 0</inkml:trace>
+</inkml:ink>
+</file>
+
+<file path=ppt/ink/ink8.xml><?xml version="1.0" encoding="utf-8"?>
+<inkml:ink xmlns:inkml="http://www.w3.org/2003/InkML">
+  <inkml:definitions>
+    <inkml:context xml:id="ctx0">
+      <inkml:inkSource xml:id="inkSrc0">
+        <inkml:traceFormat>
+          <inkml:channel name="X" type="integer" min="-2.14748E9" max="2.14748E9" units="cm"/>
+          <inkml:channel name="Y" type="integer" min="-2.14748E9" max="2.14748E9" units="cm"/>
+          <inkml:channel name="F" type="integer" max="32767" units="dev"/>
+          <inkml:channel name="OA" type="integer" max="360" units="deg"/>
+          <inkml:channel name="OE" type="integer" max="90" units="deg"/>
+        </inkml:traceFormat>
+        <inkml:channelProperties>
+          <inkml:channelProperty channel="X" name="resolution" value="1000" units="1/cm"/>
+          <inkml:channelProperty channel="Y" name="resolution" value="1000" units="1/cm"/>
+          <inkml:channelProperty channel="F" name="resolution" value="0" units="1/dev"/>
+          <inkml:channelProperty channel="OA" name="resolution" value="1000" units="1/deg"/>
+          <inkml:channelProperty channel="OE" name="resolution" value="1000" units="1/deg"/>
+        </inkml:channelProperties>
+      </inkml:inkSource>
+      <inkml:timestamp xml:id="ts0" timeString="2021-04-14T19:00:37.876"/>
+    </inkml:context>
+    <inkml:brush xml:id="br0">
+      <inkml:brushProperty name="width" value="0.05" units="cm"/>
+      <inkml:brushProperty name="height" value="0.05" units="cm"/>
+      <inkml:brushProperty name="color" value="#E71224"/>
+    </inkml:brush>
+  </inkml:definitions>
+  <inkml:trace contextRef="#ctx0" brushRef="#br0">0 435 2760 0 0,'2'1'207'0'0,"16"10"40"0"0,-2-2 5854 0 0,26 10 1 0 0,-16-11-3850 0 0,-23-8-2033 0 0,-1 1 0 0 0,1-1 0 0 0,0 0 0 0 0,0 0 0 0 0,-1 0 0 0 0,1 0 0 0 0,0-1 0 0 0,0 1 0 0 0,-1-1 1 0 0,1 0-1 0 0,0 0 0 0 0,-1 0 0 0 0,1 0 0 0 0,-1 0 0 0 0,1 0 0 0 0,-1-1 0 0 0,1 1 0 0 0,1-3 0 0 0,-2 3-123 0 0,0 0 0 0 0,-1 0 0 0 0,0-1 0 0 0,1 1 0 0 0,-1-1 0 0 0,0 1 0 0 0,1-1 0 0 0,-1 1 0 0 0,0-1 0 0 0,0 1 0 0 0,0-1 0 0 0,-1 0 0 0 0,1 0 0 0 0,0 1 0 0 0,0-1 0 0 0,-1 0 0 0 0,0 0 0 0 0,1 0 0 0 0,-1 0 0 0 0,0 0 0 0 0,0 0 0 0 0,0 0 0 0 0,0 0 0 0 0,0 1 0 0 0,0-1 0 0 0,-1-3 0 0 0,0 3-44 0 0,1 1 1 0 0,-1 0-1 0 0,0-1 0 0 0,1 1 0 0 0,-1 0 1 0 0,0 0-1 0 0,0 0 0 0 0,0 0 0 0 0,0 0 0 0 0,0 0 1 0 0,0 0-1 0 0,0 0 0 0 0,0 0 0 0 0,0 0 0 0 0,-1 1 1 0 0,1-1-1 0 0,0 1 0 0 0,0-1 0 0 0,-1 0 0 0 0,1 1 1 0 0,0 0-1 0 0,-1-1 0 0 0,-2 1 0 0 0,2-1 21 0 0,0 1-1 0 0,0 0 1 0 0,0 0-1 0 0,0 0 1 0 0,0 0-1 0 0,0 1 1 0 0,0-1-1 0 0,0 0 1 0 0,0 1-1 0 0,0 0 1 0 0,0-1-1 0 0,0 1 1 0 0,0 0 0 0 0,0 0-1 0 0,-3 2 1 0 0,-10 8 282 0 0,10-7-285 0 0,0-1-1 0 0,1 1 0 0 0,-1-1 0 0 0,1 1 1 0 0,0 1-1 0 0,0-1 0 0 0,0 1 0 0 0,0-1 0 0 0,1 1 1 0 0,-1 0-1 0 0,-2 6 0 0 0,4-6-46 0 0,0 0 0 0 0,1 0 1 0 0,-1 0-1 0 0,1 0 0 0 0,0 0 0 0 0,0 1 0 0 0,0 6 0 0 0,1-11-29 0 0,0 1-1 0 0,0 0 1 0 0,1-1-1 0 0,-1 1 1 0 0,0 0-1 0 0,1-1 1 0 0,-1 1-1 0 0,1-1 1 0 0,-1 1-1 0 0,1-1 1 0 0,0 1-1 0 0,0-1 1 0 0,-1 1-1 0 0,1-1 1 0 0,0 0-1 0 0,1 1 1 0 0,-1-1-1 0 0,0 0 1 0 0,0 0-1 0 0,0 0 1 0 0,1 0-1 0 0,-1 0 0 0 0,0 0 1 0 0,1 0-1 0 0,-1 0 1 0 0,4 0-1 0 0,-1 1-272 0 0,1-1 1 0 0,1 1-1 0 0,-1-1 0 0 0,0-1 0 0 0,0 1 0 0 0,0-1 0 0 0,0 0 0 0 0,1 0 0 0 0,-1 0 0 0 0,0-1 0 0 0,0 0 0 0 0,0 0 0 0 0,0 0 0 0 0,0-1 0 0 0,9-3 0 0 0,0-2-908 0 0,0 0 0 0 0,0-1 1 0 0,20-15-1 0 0,-1-3-796 0 0</inkml:trace>
+  <inkml:trace contextRef="#ctx0" brushRef="#br0" timeOffset="1">436 291 2760 0 0,'-29'6'-729'0'0,"2"2"4401"0"0,23-6-2395 0 0,0 0-1 0 0,0 0 0 0 0,0 1 0 0 0,0-1 1 0 0,1 1-1 0 0,-1 0 0 0 0,1 0 0 0 0,0 0 1 0 0,-1 0-1 0 0,-4 7 0 0 0,4-5-983 0 0,1 1 0 0 0,-1 0 0 0 0,1 0 0 0 0,0 0 1 0 0,0 0-1 0 0,1 0 0 0 0,0 1 0 0 0,0-1 0 0 0,1 1 0 0 0,-1-1 0 0 0,1 10 0 0 0,0-12-239 0 0,1 0 0 0 0,1 0 0 0 0,-1 0-1 0 0,1 0 1 0 0,-1 1 0 0 0,1-1 0 0 0,0 0 0 0 0,1 0-1 0 0,-1 0 1 0 0,1-1 0 0 0,0 1 0 0 0,0 0 0 0 0,0-1-1 0 0,0 1 1 0 0,0-1 0 0 0,1 1 0 0 0,0-1 0 0 0,0 0-1 0 0,4 4 1 0 0,-6-6-17 0 0,1 0 0 0 0,0 0 0 0 0,-1 0 0 0 0,1 0 0 0 0,0 0 0 0 0,-1 0 0 0 0,1-1 0 0 0,0 1 0 0 0,0 0 0 0 0,0-1 0 0 0,0 0 0 0 0,0 1 0 0 0,0-1 0 0 0,0 0 0 0 0,3 0 0 0 0,-1 0 36 0 0,0-1 0 0 0,0 0 0 0 0,-1 1 0 0 0,1-1 0 0 0,0-1 0 0 0,0 1 0 0 0,4-3 0 0 0,-1 1 69 0 0,0-1 0 0 0,-1 0 0 0 0,1-1 0 0 0,-1 0-1 0 0,-1 0 1 0 0,1 0 0 0 0,8-9 0 0 0,-4-1 83 0 0,-1 1-1 0 0,0-1 1 0 0,-1-1-1 0 0,-1 0 1 0 0,0 0 0 0 0,-1 0-1 0 0,3-18 1 0 0,3-16 260 0 0,4-55-1 0 0,-7-55 887 0 0,-9 159-1279 0 0,-3 24 0 0 0,-13 54-1109 0 0,-10 146 1 0 0,24-154-1440 0 0,6-24-2053 0 0,0-22-3684 0 0</inkml:trace>
+</inkml:ink>
+</file>
+
+<file path=ppt/ink/ink9.xml><?xml version="1.0" encoding="utf-8"?>
+<inkml:ink xmlns:inkml="http://www.w3.org/2003/InkML">
+  <inkml:definitions>
+    <inkml:context xml:id="ctx0">
+      <inkml:inkSource xml:id="inkSrc0">
+        <inkml:traceFormat>
+          <inkml:channel name="X" type="integer" min="-2.14748E9" max="2.14748E9" units="cm"/>
+          <inkml:channel name="Y" type="integer" min="-2.14748E9" max="2.14748E9" units="cm"/>
+          <inkml:channel name="F" type="integer" max="32767" units="dev"/>
+          <inkml:channel name="OA" type="integer" max="360" units="deg"/>
+          <inkml:channel name="OE" type="integer" max="90" units="deg"/>
+        </inkml:traceFormat>
+        <inkml:channelProperties>
+          <inkml:channelProperty channel="X" name="resolution" value="1000" units="1/cm"/>
+          <inkml:channelProperty channel="Y" name="resolution" value="1000" units="1/cm"/>
+          <inkml:channelProperty channel="F" name="resolution" value="0" units="1/dev"/>
+          <inkml:channelProperty channel="OA" name="resolution" value="1000" units="1/deg"/>
+          <inkml:channelProperty channel="OE" name="resolution" value="1000" units="1/deg"/>
+        </inkml:channelProperties>
+      </inkml:inkSource>
+      <inkml:timestamp xml:id="ts0" timeString="2021-04-14T19:00:38.423"/>
+    </inkml:context>
+    <inkml:brush xml:id="br0">
+      <inkml:brushProperty name="width" value="0.05" units="cm"/>
+      <inkml:brushProperty name="height" value="0.05" units="cm"/>
+      <inkml:brushProperty name="color" value="#E71224"/>
+    </inkml:brush>
+  </inkml:definitions>
+  <inkml:trace contextRef="#ctx0" brushRef="#br0">55 269 8752 0 0,'-4'-7'335'0'0,"1"0"1"0"0,1 0 0 0 0,-1 0-1 0 0,1-1 1 0 0,1 1-1 0 0,-3-15 1 0 0,5-23 7154 0 0,-1 0-2154 0 0,1 53-4312 0 0,0 11-833 0 0,0-1 1 0 0,-2 36-1 0 0,-1-20-269 0 0,-6 46-307 0 0,-1 15 357 0 0,9-76 227 0 0,-2 1-1 0 0,-1-1 1 0 0,-5 24 0 0 0,6-39 730 0 0,1-6-334 0 0,-1-11-107 0 0,1-21-226 0 0,12-160 276 0 0,-10 176-124 0 0,2-3-313 0 0,1-1 1 0 0,1 1-1 0 0,1-1 0 0 0,1 2 1 0 0,12-26-1 0 0,-14 36-85 0 0,0 0 0 0 0,0 0 0 0 0,1 0 0 0 0,1 0 0 0 0,0 1 0 0 0,15-16 0 0 0,-19 22 43 0 0,0 1 1 0 0,0-1-1 0 0,0 0 0 0 0,0 1 1 0 0,0 0-1 0 0,1 0 0 0 0,-1 0 1 0 0,0 0-1 0 0,1 1 0 0 0,0-1 1 0 0,-1 1-1 0 0,1 0 0 0 0,0 0 1 0 0,0 0-1 0 0,0 1 0 0 0,0-1 1 0 0,0 1-1 0 0,0 0 0 0 0,0 0 1 0 0,0 0-1 0 0,-1 1 0 0 0,1-1 1 0 0,7 3-1 0 0,-7-2-40 0 0,1 2 0 0 0,-1-1-1 0 0,0 0 1 0 0,0 1 0 0 0,1 0 0 0 0,-2 0-1 0 0,1 0 1 0 0,0 0 0 0 0,-1 1 0 0 0,1-1-1 0 0,-1 1 1 0 0,0 0 0 0 0,0 0 0 0 0,-1 0-1 0 0,4 7 1 0 0,0 1 17 0 0,-1 1 0 0 0,0-1 0 0 0,-1 1 0 0 0,4 20 0 0 0,-6-23-51 0 0,-1 0-1 0 0,0 0 1 0 0,-1 1-1 0 0,0-1 1 0 0,-1 0-1 0 0,-3 20 1 0 0,3-24 8 0 0,0 1 0 0 0,-1-1 0 0 0,0 0 0 0 0,0 0 0 0 0,-1 0 0 0 0,0 0 0 0 0,0 0 0 0 0,0 0 0 0 0,-1-1 0 0 0,0 0 0 0 0,-8 10 0 0 0,9-13-25 0 0,0 0-1 0 0,0 0 1 0 0,1 0-1 0 0,-1 0 1 0 0,0-1-1 0 0,-1 1 1 0 0,1-1-1 0 0,0 0 1 0 0,0 0-1 0 0,0 0 1 0 0,-6 0-1 0 0,-36 2-5438 0 0,42-3 4792 0 0</inkml:trace>
+</inkml:ink>
 </file>
 
 <file path=ppt/notesMasters/notesMaster1.xml><?xml version="1.0" encoding="utf-8"?>
@@ -4239,6 +5234,1671 @@
           </a:p>
         </p:txBody>
       </p:sp>
+      <mc:AlternateContent xmlns:mc="http://schemas.openxmlformats.org/markup-compatibility/2006">
+        <mc:Choice xmlns:p14="http://schemas.microsoft.com/office/powerpoint/2010/main" Requires="p14">
+          <p:contentPart p14:bwMode="auto" r:id="rId2">
+            <p14:nvContentPartPr>
+              <p14:cNvPr id="4" name="Ink 3">
+                <a:extLst>
+                  <a:ext uri="{FF2B5EF4-FFF2-40B4-BE49-F238E27FC236}">
+                    <a16:creationId xmlns:a16="http://schemas.microsoft.com/office/drawing/2014/main" id="{2F042E64-1AD8-4673-913F-C6A0517F0930}"/>
+                  </a:ext>
+                </a:extLst>
+              </p14:cNvPr>
+              <p14:cNvContentPartPr/>
+              <p14:nvPr/>
+            </p14:nvContentPartPr>
+            <p14:xfrm>
+              <a:off x="2472409" y="1133899"/>
+              <a:ext cx="127440" cy="259200"/>
+            </p14:xfrm>
+          </p:contentPart>
+        </mc:Choice>
+        <mc:Fallback>
+          <p:pic>
+            <p:nvPicPr>
+              <p:cNvPr id="4" name="Ink 3">
+                <a:extLst>
+                  <a:ext uri="{FF2B5EF4-FFF2-40B4-BE49-F238E27FC236}">
+                    <a16:creationId xmlns:a16="http://schemas.microsoft.com/office/drawing/2014/main" id="{2F042E64-1AD8-4673-913F-C6A0517F0930}"/>
+                  </a:ext>
+                </a:extLst>
+              </p:cNvPr>
+              <p:cNvPicPr/>
+              <p:nvPr/>
+            </p:nvPicPr>
+            <p:blipFill>
+              <a:blip r:embed="rId3"/>
+              <a:stretch>
+                <a:fillRect/>
+              </a:stretch>
+            </p:blipFill>
+            <p:spPr>
+              <a:xfrm>
+                <a:off x="2463769" y="1125259"/>
+                <a:ext cx="145080" cy="276840"/>
+              </a:xfrm>
+              <a:prstGeom prst="rect">
+                <a:avLst/>
+              </a:prstGeom>
+            </p:spPr>
+          </p:pic>
+        </mc:Fallback>
+      </mc:AlternateContent>
+      <mc:AlternateContent xmlns:mc="http://schemas.openxmlformats.org/markup-compatibility/2006">
+        <mc:Choice xmlns:p14="http://schemas.microsoft.com/office/powerpoint/2010/main" Requires="p14">
+          <p:contentPart p14:bwMode="auto" r:id="rId4">
+            <p14:nvContentPartPr>
+              <p14:cNvPr id="5" name="Ink 4">
+                <a:extLst>
+                  <a:ext uri="{FF2B5EF4-FFF2-40B4-BE49-F238E27FC236}">
+                    <a16:creationId xmlns:a16="http://schemas.microsoft.com/office/drawing/2014/main" id="{53D61A55-EAA5-4D3A-980A-8D98C22B5158}"/>
+                  </a:ext>
+                </a:extLst>
+              </p14:cNvPr>
+              <p14:cNvContentPartPr/>
+              <p14:nvPr/>
+            </p14:nvContentPartPr>
+            <p14:xfrm>
+              <a:off x="809209" y="2149099"/>
+              <a:ext cx="433080" cy="56880"/>
+            </p14:xfrm>
+          </p:contentPart>
+        </mc:Choice>
+        <mc:Fallback>
+          <p:pic>
+            <p:nvPicPr>
+              <p:cNvPr id="5" name="Ink 4">
+                <a:extLst>
+                  <a:ext uri="{FF2B5EF4-FFF2-40B4-BE49-F238E27FC236}">
+                    <a16:creationId xmlns:a16="http://schemas.microsoft.com/office/drawing/2014/main" id="{53D61A55-EAA5-4D3A-980A-8D98C22B5158}"/>
+                  </a:ext>
+                </a:extLst>
+              </p:cNvPr>
+              <p:cNvPicPr/>
+              <p:nvPr/>
+            </p:nvPicPr>
+            <p:blipFill>
+              <a:blip r:embed="rId5"/>
+              <a:stretch>
+                <a:fillRect/>
+              </a:stretch>
+            </p:blipFill>
+            <p:spPr>
+              <a:xfrm>
+                <a:off x="800209" y="2140099"/>
+                <a:ext cx="450720" cy="74520"/>
+              </a:xfrm>
+              <a:prstGeom prst="rect">
+                <a:avLst/>
+              </a:prstGeom>
+            </p:spPr>
+          </p:pic>
+        </mc:Fallback>
+      </mc:AlternateContent>
+      <p:grpSp>
+        <p:nvGrpSpPr>
+          <p:cNvPr id="17" name="Group 16">
+            <a:extLst>
+              <a:ext uri="{FF2B5EF4-FFF2-40B4-BE49-F238E27FC236}">
+                <a16:creationId xmlns:a16="http://schemas.microsoft.com/office/drawing/2014/main" id="{B215FE31-D0DE-4BC0-B974-A9A5AD2B111C}"/>
+              </a:ext>
+            </a:extLst>
+          </p:cNvPr>
+          <p:cNvGrpSpPr/>
+          <p:nvPr/>
+        </p:nvGrpSpPr>
+        <p:grpSpPr>
+          <a:xfrm>
+            <a:off x="4015729" y="1623499"/>
+            <a:ext cx="989280" cy="332640"/>
+            <a:chOff x="4015729" y="1623499"/>
+            <a:chExt cx="989280" cy="332640"/>
+          </a:xfrm>
+        </p:grpSpPr>
+        <mc:AlternateContent xmlns:mc="http://schemas.openxmlformats.org/markup-compatibility/2006">
+          <mc:Choice xmlns:p14="http://schemas.microsoft.com/office/powerpoint/2010/main" Requires="p14">
+            <p:contentPart p14:bwMode="auto" r:id="rId6">
+              <p14:nvContentPartPr>
+                <p14:cNvPr id="6" name="Ink 5">
+                  <a:extLst>
+                    <a:ext uri="{FF2B5EF4-FFF2-40B4-BE49-F238E27FC236}">
+                      <a16:creationId xmlns:a16="http://schemas.microsoft.com/office/drawing/2014/main" id="{4183831E-CD55-456D-B8ED-1AA12E65C2FE}"/>
+                    </a:ext>
+                  </a:extLst>
+                </p14:cNvPr>
+                <p14:cNvContentPartPr/>
+                <p14:nvPr/>
+              </p14:nvContentPartPr>
+              <p14:xfrm>
+                <a:off x="4015729" y="1879819"/>
+                <a:ext cx="190800" cy="76320"/>
+              </p14:xfrm>
+            </p:contentPart>
+          </mc:Choice>
+          <mc:Fallback>
+            <p:pic>
+              <p:nvPicPr>
+                <p:cNvPr id="6" name="Ink 5">
+                  <a:extLst>
+                    <a:ext uri="{FF2B5EF4-FFF2-40B4-BE49-F238E27FC236}">
+                      <a16:creationId xmlns:a16="http://schemas.microsoft.com/office/drawing/2014/main" id="{4183831E-CD55-456D-B8ED-1AA12E65C2FE}"/>
+                    </a:ext>
+                  </a:extLst>
+                </p:cNvPr>
+                <p:cNvPicPr/>
+                <p:nvPr/>
+              </p:nvPicPr>
+              <p:blipFill>
+                <a:blip r:embed="rId7"/>
+                <a:stretch>
+                  <a:fillRect/>
+                </a:stretch>
+              </p:blipFill>
+              <p:spPr>
+                <a:xfrm>
+                  <a:off x="4007089" y="1871179"/>
+                  <a:ext cx="208440" cy="93960"/>
+                </a:xfrm>
+                <a:prstGeom prst="rect">
+                  <a:avLst/>
+                </a:prstGeom>
+              </p:spPr>
+            </p:pic>
+          </mc:Fallback>
+        </mc:AlternateContent>
+        <mc:AlternateContent xmlns:mc="http://schemas.openxmlformats.org/markup-compatibility/2006">
+          <mc:Choice xmlns:p14="http://schemas.microsoft.com/office/powerpoint/2010/main" Requires="p14">
+            <p:contentPart p14:bwMode="auto" r:id="rId8">
+              <p14:nvContentPartPr>
+                <p14:cNvPr id="7" name="Ink 6">
+                  <a:extLst>
+                    <a:ext uri="{FF2B5EF4-FFF2-40B4-BE49-F238E27FC236}">
+                      <a16:creationId xmlns:a16="http://schemas.microsoft.com/office/drawing/2014/main" id="{8658BB3B-B049-4BB1-AA85-18D30E963AA8}"/>
+                    </a:ext>
+                  </a:extLst>
+                </p14:cNvPr>
+                <p14:cNvContentPartPr/>
+                <p14:nvPr/>
+              </p14:nvContentPartPr>
+              <p14:xfrm>
+                <a:off x="4334689" y="1752739"/>
+                <a:ext cx="95400" cy="82800"/>
+              </p14:xfrm>
+            </p:contentPart>
+          </mc:Choice>
+          <mc:Fallback>
+            <p:pic>
+              <p:nvPicPr>
+                <p:cNvPr id="7" name="Ink 6">
+                  <a:extLst>
+                    <a:ext uri="{FF2B5EF4-FFF2-40B4-BE49-F238E27FC236}">
+                      <a16:creationId xmlns:a16="http://schemas.microsoft.com/office/drawing/2014/main" id="{8658BB3B-B049-4BB1-AA85-18D30E963AA8}"/>
+                    </a:ext>
+                  </a:extLst>
+                </p:cNvPr>
+                <p:cNvPicPr/>
+                <p:nvPr/>
+              </p:nvPicPr>
+              <p:blipFill>
+                <a:blip r:embed="rId9"/>
+                <a:stretch>
+                  <a:fillRect/>
+                </a:stretch>
+              </p:blipFill>
+              <p:spPr>
+                <a:xfrm>
+                  <a:off x="4325689" y="1744099"/>
+                  <a:ext cx="113040" cy="100440"/>
+                </a:xfrm>
+                <a:prstGeom prst="rect">
+                  <a:avLst/>
+                </a:prstGeom>
+              </p:spPr>
+            </p:pic>
+          </mc:Fallback>
+        </mc:AlternateContent>
+        <mc:AlternateContent xmlns:mc="http://schemas.openxmlformats.org/markup-compatibility/2006">
+          <mc:Choice xmlns:p14="http://schemas.microsoft.com/office/powerpoint/2010/main" Requires="p14">
+            <p:contentPart p14:bwMode="auto" r:id="rId10">
+              <p14:nvContentPartPr>
+                <p14:cNvPr id="8" name="Ink 7">
+                  <a:extLst>
+                    <a:ext uri="{FF2B5EF4-FFF2-40B4-BE49-F238E27FC236}">
+                      <a16:creationId xmlns:a16="http://schemas.microsoft.com/office/drawing/2014/main" id="{E7CB7835-EF77-4EE4-BBC0-666F04BFC82C}"/>
+                    </a:ext>
+                  </a:extLst>
+                </p14:cNvPr>
+                <p14:cNvContentPartPr/>
+                <p14:nvPr/>
+              </p14:nvContentPartPr>
+              <p14:xfrm>
+                <a:off x="4541689" y="1623499"/>
+                <a:ext cx="43560" cy="209880"/>
+              </p14:xfrm>
+            </p:contentPart>
+          </mc:Choice>
+          <mc:Fallback>
+            <p:pic>
+              <p:nvPicPr>
+                <p:cNvPr id="8" name="Ink 7">
+                  <a:extLst>
+                    <a:ext uri="{FF2B5EF4-FFF2-40B4-BE49-F238E27FC236}">
+                      <a16:creationId xmlns:a16="http://schemas.microsoft.com/office/drawing/2014/main" id="{E7CB7835-EF77-4EE4-BBC0-666F04BFC82C}"/>
+                    </a:ext>
+                  </a:extLst>
+                </p:cNvPr>
+                <p:cNvPicPr/>
+                <p:nvPr/>
+              </p:nvPicPr>
+              <p:blipFill>
+                <a:blip r:embed="rId11"/>
+                <a:stretch>
+                  <a:fillRect/>
+                </a:stretch>
+              </p:blipFill>
+              <p:spPr>
+                <a:xfrm>
+                  <a:off x="4532689" y="1614499"/>
+                  <a:ext cx="61200" cy="227520"/>
+                </a:xfrm>
+                <a:prstGeom prst="rect">
+                  <a:avLst/>
+                </a:prstGeom>
+              </p:spPr>
+            </p:pic>
+          </mc:Fallback>
+        </mc:AlternateContent>
+        <mc:AlternateContent xmlns:mc="http://schemas.openxmlformats.org/markup-compatibility/2006">
+          <mc:Choice xmlns:p14="http://schemas.microsoft.com/office/powerpoint/2010/main" Requires="p14">
+            <p:contentPart p14:bwMode="auto" r:id="rId12">
+              <p14:nvContentPartPr>
+                <p14:cNvPr id="9" name="Ink 8">
+                  <a:extLst>
+                    <a:ext uri="{FF2B5EF4-FFF2-40B4-BE49-F238E27FC236}">
+                      <a16:creationId xmlns:a16="http://schemas.microsoft.com/office/drawing/2014/main" id="{0928C84F-2138-49CF-B6E7-20F5A88EE899}"/>
+                    </a:ext>
+                  </a:extLst>
+                </p14:cNvPr>
+                <p14:cNvContentPartPr/>
+                <p14:nvPr/>
+              </p14:nvContentPartPr>
+              <p14:xfrm>
+                <a:off x="4593169" y="1752379"/>
+                <a:ext cx="80280" cy="77040"/>
+              </p14:xfrm>
+            </p:contentPart>
+          </mc:Choice>
+          <mc:Fallback>
+            <p:pic>
+              <p:nvPicPr>
+                <p:cNvPr id="9" name="Ink 8">
+                  <a:extLst>
+                    <a:ext uri="{FF2B5EF4-FFF2-40B4-BE49-F238E27FC236}">
+                      <a16:creationId xmlns:a16="http://schemas.microsoft.com/office/drawing/2014/main" id="{0928C84F-2138-49CF-B6E7-20F5A88EE899}"/>
+                    </a:ext>
+                  </a:extLst>
+                </p:cNvPr>
+                <p:cNvPicPr/>
+                <p:nvPr/>
+              </p:nvPicPr>
+              <p:blipFill>
+                <a:blip r:embed="rId13"/>
+                <a:stretch>
+                  <a:fillRect/>
+                </a:stretch>
+              </p:blipFill>
+              <p:spPr>
+                <a:xfrm>
+                  <a:off x="4584529" y="1743379"/>
+                  <a:ext cx="97920" cy="94680"/>
+                </a:xfrm>
+                <a:prstGeom prst="rect">
+                  <a:avLst/>
+                </a:prstGeom>
+              </p:spPr>
+            </p:pic>
+          </mc:Fallback>
+        </mc:AlternateContent>
+        <mc:AlternateContent xmlns:mc="http://schemas.openxmlformats.org/markup-compatibility/2006">
+          <mc:Choice xmlns:p14="http://schemas.microsoft.com/office/powerpoint/2010/main" Requires="p14">
+            <p:contentPart p14:bwMode="auto" r:id="rId14">
+              <p14:nvContentPartPr>
+                <p14:cNvPr id="10" name="Ink 9">
+                  <a:extLst>
+                    <a:ext uri="{FF2B5EF4-FFF2-40B4-BE49-F238E27FC236}">
+                      <a16:creationId xmlns:a16="http://schemas.microsoft.com/office/drawing/2014/main" id="{FC496A06-4E17-4981-A4AB-1737EEE54326}"/>
+                    </a:ext>
+                  </a:extLst>
+                </p14:cNvPr>
+                <p14:cNvContentPartPr/>
+                <p14:nvPr/>
+              </p14:nvContentPartPr>
+              <p14:xfrm>
+                <a:off x="4723489" y="1746619"/>
+                <a:ext cx="70560" cy="108360"/>
+              </p14:xfrm>
+            </p:contentPart>
+          </mc:Choice>
+          <mc:Fallback>
+            <p:pic>
+              <p:nvPicPr>
+                <p:cNvPr id="10" name="Ink 9">
+                  <a:extLst>
+                    <a:ext uri="{FF2B5EF4-FFF2-40B4-BE49-F238E27FC236}">
+                      <a16:creationId xmlns:a16="http://schemas.microsoft.com/office/drawing/2014/main" id="{FC496A06-4E17-4981-A4AB-1737EEE54326}"/>
+                    </a:ext>
+                  </a:extLst>
+                </p:cNvPr>
+                <p:cNvPicPr/>
+                <p:nvPr/>
+              </p:nvPicPr>
+              <p:blipFill>
+                <a:blip r:embed="rId15"/>
+                <a:stretch>
+                  <a:fillRect/>
+                </a:stretch>
+              </p:blipFill>
+              <p:spPr>
+                <a:xfrm>
+                  <a:off x="4714849" y="1737979"/>
+                  <a:ext cx="88200" cy="126000"/>
+                </a:xfrm>
+                <a:prstGeom prst="rect">
+                  <a:avLst/>
+                </a:prstGeom>
+              </p:spPr>
+            </p:pic>
+          </mc:Fallback>
+        </mc:AlternateContent>
+        <mc:AlternateContent xmlns:mc="http://schemas.openxmlformats.org/markup-compatibility/2006">
+          <mc:Choice xmlns:p14="http://schemas.microsoft.com/office/powerpoint/2010/main" Requires="p14">
+            <p:contentPart p14:bwMode="auto" r:id="rId16">
+              <p14:nvContentPartPr>
+                <p14:cNvPr id="11" name="Ink 10">
+                  <a:extLst>
+                    <a:ext uri="{FF2B5EF4-FFF2-40B4-BE49-F238E27FC236}">
+                      <a16:creationId xmlns:a16="http://schemas.microsoft.com/office/drawing/2014/main" id="{B10A9B84-06B5-4127-BA76-DFF9D5E438C7}"/>
+                    </a:ext>
+                  </a:extLst>
+                </p14:cNvPr>
+                <p14:cNvContentPartPr/>
+                <p14:nvPr/>
+              </p14:nvContentPartPr>
+              <p14:xfrm>
+                <a:off x="4800889" y="1643299"/>
+                <a:ext cx="204120" cy="204480"/>
+              </p14:xfrm>
+            </p:contentPart>
+          </mc:Choice>
+          <mc:Fallback>
+            <p:pic>
+              <p:nvPicPr>
+                <p:cNvPr id="11" name="Ink 10">
+                  <a:extLst>
+                    <a:ext uri="{FF2B5EF4-FFF2-40B4-BE49-F238E27FC236}">
+                      <a16:creationId xmlns:a16="http://schemas.microsoft.com/office/drawing/2014/main" id="{B10A9B84-06B5-4127-BA76-DFF9D5E438C7}"/>
+                    </a:ext>
+                  </a:extLst>
+                </p:cNvPr>
+                <p:cNvPicPr/>
+                <p:nvPr/>
+              </p:nvPicPr>
+              <p:blipFill>
+                <a:blip r:embed="rId17"/>
+                <a:stretch>
+                  <a:fillRect/>
+                </a:stretch>
+              </p:blipFill>
+              <p:spPr>
+                <a:xfrm>
+                  <a:off x="4791889" y="1634299"/>
+                  <a:ext cx="221760" cy="222120"/>
+                </a:xfrm>
+                <a:prstGeom prst="rect">
+                  <a:avLst/>
+                </a:prstGeom>
+              </p:spPr>
+            </p:pic>
+          </mc:Fallback>
+        </mc:AlternateContent>
+      </p:grpSp>
+      <p:grpSp>
+        <p:nvGrpSpPr>
+          <p:cNvPr id="16" name="Group 15">
+            <a:extLst>
+              <a:ext uri="{FF2B5EF4-FFF2-40B4-BE49-F238E27FC236}">
+                <a16:creationId xmlns:a16="http://schemas.microsoft.com/office/drawing/2014/main" id="{D235F023-423A-4BF9-ADDB-8D0BB124F889}"/>
+              </a:ext>
+            </a:extLst>
+          </p:cNvPr>
+          <p:cNvGrpSpPr/>
+          <p:nvPr/>
+        </p:nvGrpSpPr>
+        <p:grpSpPr>
+          <a:xfrm>
+            <a:off x="5227489" y="1627459"/>
+            <a:ext cx="245160" cy="189720"/>
+            <a:chOff x="5227489" y="1627459"/>
+            <a:chExt cx="245160" cy="189720"/>
+          </a:xfrm>
+        </p:grpSpPr>
+        <mc:AlternateContent xmlns:mc="http://schemas.openxmlformats.org/markup-compatibility/2006">
+          <mc:Choice xmlns:p14="http://schemas.microsoft.com/office/powerpoint/2010/main" Requires="p14">
+            <p:contentPart p14:bwMode="auto" r:id="rId18">
+              <p14:nvContentPartPr>
+                <p14:cNvPr id="12" name="Ink 11">
+                  <a:extLst>
+                    <a:ext uri="{FF2B5EF4-FFF2-40B4-BE49-F238E27FC236}">
+                      <a16:creationId xmlns:a16="http://schemas.microsoft.com/office/drawing/2014/main" id="{C5488C59-2FFF-4389-A9C1-4149462C1D17}"/>
+                    </a:ext>
+                  </a:extLst>
+                </p14:cNvPr>
+                <p14:cNvContentPartPr/>
+                <p14:nvPr/>
+              </p14:nvContentPartPr>
+              <p14:xfrm>
+                <a:off x="5227489" y="1627459"/>
+                <a:ext cx="108000" cy="189720"/>
+              </p14:xfrm>
+            </p:contentPart>
+          </mc:Choice>
+          <mc:Fallback>
+            <p:pic>
+              <p:nvPicPr>
+                <p:cNvPr id="12" name="Ink 11">
+                  <a:extLst>
+                    <a:ext uri="{FF2B5EF4-FFF2-40B4-BE49-F238E27FC236}">
+                      <a16:creationId xmlns:a16="http://schemas.microsoft.com/office/drawing/2014/main" id="{C5488C59-2FFF-4389-A9C1-4149462C1D17}"/>
+                    </a:ext>
+                  </a:extLst>
+                </p:cNvPr>
+                <p:cNvPicPr/>
+                <p:nvPr/>
+              </p:nvPicPr>
+              <p:blipFill>
+                <a:blip r:embed="rId19"/>
+                <a:stretch>
+                  <a:fillRect/>
+                </a:stretch>
+              </p:blipFill>
+              <p:spPr>
+                <a:xfrm>
+                  <a:off x="5218849" y="1618819"/>
+                  <a:ext cx="125640" cy="207360"/>
+                </a:xfrm>
+                <a:prstGeom prst="rect">
+                  <a:avLst/>
+                </a:prstGeom>
+              </p:spPr>
+            </p:pic>
+          </mc:Fallback>
+        </mc:AlternateContent>
+        <mc:AlternateContent xmlns:mc="http://schemas.openxmlformats.org/markup-compatibility/2006">
+          <mc:Choice xmlns:p14="http://schemas.microsoft.com/office/powerpoint/2010/main" Requires="p14">
+            <p:contentPart p14:bwMode="auto" r:id="rId20">
+              <p14:nvContentPartPr>
+                <p14:cNvPr id="13" name="Ink 12">
+                  <a:extLst>
+                    <a:ext uri="{FF2B5EF4-FFF2-40B4-BE49-F238E27FC236}">
+                      <a16:creationId xmlns:a16="http://schemas.microsoft.com/office/drawing/2014/main" id="{46C96185-681B-4191-868E-8502FC20F655}"/>
+                    </a:ext>
+                  </a:extLst>
+                </p14:cNvPr>
+                <p14:cNvContentPartPr/>
+                <p14:nvPr/>
+              </p14:nvContentPartPr>
+              <p14:xfrm>
+                <a:off x="5377969" y="1632499"/>
+                <a:ext cx="94680" cy="162360"/>
+              </p14:xfrm>
+            </p:contentPart>
+          </mc:Choice>
+          <mc:Fallback>
+            <p:pic>
+              <p:nvPicPr>
+                <p:cNvPr id="13" name="Ink 12">
+                  <a:extLst>
+                    <a:ext uri="{FF2B5EF4-FFF2-40B4-BE49-F238E27FC236}">
+                      <a16:creationId xmlns:a16="http://schemas.microsoft.com/office/drawing/2014/main" id="{46C96185-681B-4191-868E-8502FC20F655}"/>
+                    </a:ext>
+                  </a:extLst>
+                </p:cNvPr>
+                <p:cNvPicPr/>
+                <p:nvPr/>
+              </p:nvPicPr>
+              <p:blipFill>
+                <a:blip r:embed="rId21"/>
+                <a:stretch>
+                  <a:fillRect/>
+                </a:stretch>
+              </p:blipFill>
+              <p:spPr>
+                <a:xfrm>
+                  <a:off x="5368969" y="1623859"/>
+                  <a:ext cx="112320" cy="180000"/>
+                </a:xfrm>
+                <a:prstGeom prst="rect">
+                  <a:avLst/>
+                </a:prstGeom>
+              </p:spPr>
+            </p:pic>
+          </mc:Fallback>
+        </mc:AlternateContent>
+        <mc:AlternateContent xmlns:mc="http://schemas.openxmlformats.org/markup-compatibility/2006">
+          <mc:Choice xmlns:p14="http://schemas.microsoft.com/office/powerpoint/2010/main" Requires="p14">
+            <p:contentPart p14:bwMode="auto" r:id="rId22">
+              <p14:nvContentPartPr>
+                <p14:cNvPr id="14" name="Ink 13">
+                  <a:extLst>
+                    <a:ext uri="{FF2B5EF4-FFF2-40B4-BE49-F238E27FC236}">
+                      <a16:creationId xmlns:a16="http://schemas.microsoft.com/office/drawing/2014/main" id="{17F34049-F4D7-4E7B-85D9-542988E0FB07}"/>
+                    </a:ext>
+                  </a:extLst>
+                </p14:cNvPr>
+                <p14:cNvContentPartPr/>
+                <p14:nvPr/>
+              </p14:nvContentPartPr>
+              <p14:xfrm>
+                <a:off x="5405329" y="1710619"/>
+                <a:ext cx="64080" cy="23760"/>
+              </p14:xfrm>
+            </p:contentPart>
+          </mc:Choice>
+          <mc:Fallback>
+            <p:pic>
+              <p:nvPicPr>
+                <p:cNvPr id="14" name="Ink 13">
+                  <a:extLst>
+                    <a:ext uri="{FF2B5EF4-FFF2-40B4-BE49-F238E27FC236}">
+                      <a16:creationId xmlns:a16="http://schemas.microsoft.com/office/drawing/2014/main" id="{17F34049-F4D7-4E7B-85D9-542988E0FB07}"/>
+                    </a:ext>
+                  </a:extLst>
+                </p:cNvPr>
+                <p:cNvPicPr/>
+                <p:nvPr/>
+              </p:nvPicPr>
+              <p:blipFill>
+                <a:blip r:embed="rId23"/>
+                <a:stretch>
+                  <a:fillRect/>
+                </a:stretch>
+              </p:blipFill>
+              <p:spPr>
+                <a:xfrm>
+                  <a:off x="5396329" y="1701979"/>
+                  <a:ext cx="81720" cy="41400"/>
+                </a:xfrm>
+                <a:prstGeom prst="rect">
+                  <a:avLst/>
+                </a:prstGeom>
+              </p:spPr>
+            </p:pic>
+          </mc:Fallback>
+        </mc:AlternateContent>
+        <mc:AlternateContent xmlns:mc="http://schemas.openxmlformats.org/markup-compatibility/2006">
+          <mc:Choice xmlns:p14="http://schemas.microsoft.com/office/powerpoint/2010/main" Requires="p14">
+            <p:contentPart p14:bwMode="auto" r:id="rId24">
+              <p14:nvContentPartPr>
+                <p14:cNvPr id="15" name="Ink 14">
+                  <a:extLst>
+                    <a:ext uri="{FF2B5EF4-FFF2-40B4-BE49-F238E27FC236}">
+                      <a16:creationId xmlns:a16="http://schemas.microsoft.com/office/drawing/2014/main" id="{9615674A-6121-498E-81EC-1230D93025E8}"/>
+                    </a:ext>
+                  </a:extLst>
+                </p14:cNvPr>
+                <p14:cNvContentPartPr/>
+                <p14:nvPr/>
+              </p14:nvContentPartPr>
+              <p14:xfrm>
+                <a:off x="5250169" y="1747699"/>
+                <a:ext cx="29520" cy="1800"/>
+              </p14:xfrm>
+            </p:contentPart>
+          </mc:Choice>
+          <mc:Fallback>
+            <p:pic>
+              <p:nvPicPr>
+                <p:cNvPr id="15" name="Ink 14">
+                  <a:extLst>
+                    <a:ext uri="{FF2B5EF4-FFF2-40B4-BE49-F238E27FC236}">
+                      <a16:creationId xmlns:a16="http://schemas.microsoft.com/office/drawing/2014/main" id="{9615674A-6121-498E-81EC-1230D93025E8}"/>
+                    </a:ext>
+                  </a:extLst>
+                </p:cNvPr>
+                <p:cNvPicPr/>
+                <p:nvPr/>
+              </p:nvPicPr>
+              <p:blipFill>
+                <a:blip r:embed="rId25"/>
+                <a:stretch>
+                  <a:fillRect/>
+                </a:stretch>
+              </p:blipFill>
+              <p:spPr>
+                <a:xfrm>
+                  <a:off x="5241169" y="1739059"/>
+                  <a:ext cx="47160" cy="19440"/>
+                </a:xfrm>
+                <a:prstGeom prst="rect">
+                  <a:avLst/>
+                </a:prstGeom>
+              </p:spPr>
+            </p:pic>
+          </mc:Fallback>
+        </mc:AlternateContent>
+      </p:grpSp>
+      <mc:AlternateContent xmlns:mc="http://schemas.openxmlformats.org/markup-compatibility/2006">
+        <mc:Choice xmlns:p14="http://schemas.microsoft.com/office/powerpoint/2010/main" Requires="p14">
+          <p:contentPart p14:bwMode="auto" r:id="rId26">
+            <p14:nvContentPartPr>
+              <p14:cNvPr id="18" name="Ink 17">
+                <a:extLst>
+                  <a:ext uri="{FF2B5EF4-FFF2-40B4-BE49-F238E27FC236}">
+                    <a16:creationId xmlns:a16="http://schemas.microsoft.com/office/drawing/2014/main" id="{8F34CC12-EC77-4E4A-A746-FBBE48552D9F}"/>
+                  </a:ext>
+                </a:extLst>
+              </p14:cNvPr>
+              <p14:cNvContentPartPr/>
+              <p14:nvPr/>
+            </p14:nvContentPartPr>
+            <p14:xfrm>
+              <a:off x="872929" y="2601979"/>
+              <a:ext cx="836640" cy="36360"/>
+            </p14:xfrm>
+          </p:contentPart>
+        </mc:Choice>
+        <mc:Fallback>
+          <p:pic>
+            <p:nvPicPr>
+              <p:cNvPr id="18" name="Ink 17">
+                <a:extLst>
+                  <a:ext uri="{FF2B5EF4-FFF2-40B4-BE49-F238E27FC236}">
+                    <a16:creationId xmlns:a16="http://schemas.microsoft.com/office/drawing/2014/main" id="{8F34CC12-EC77-4E4A-A746-FBBE48552D9F}"/>
+                  </a:ext>
+                </a:extLst>
+              </p:cNvPr>
+              <p:cNvPicPr/>
+              <p:nvPr/>
+            </p:nvPicPr>
+            <p:blipFill>
+              <a:blip r:embed="rId27"/>
+              <a:stretch>
+                <a:fillRect/>
+              </a:stretch>
+            </p:blipFill>
+            <p:spPr>
+              <a:xfrm>
+                <a:off x="863929" y="2593339"/>
+                <a:ext cx="854280" cy="54000"/>
+              </a:xfrm>
+              <a:prstGeom prst="rect">
+                <a:avLst/>
+              </a:prstGeom>
+            </p:spPr>
+          </p:pic>
+        </mc:Fallback>
+      </mc:AlternateContent>
+      <mc:AlternateContent xmlns:mc="http://schemas.openxmlformats.org/markup-compatibility/2006">
+        <mc:Choice xmlns:p14="http://schemas.microsoft.com/office/powerpoint/2010/main" Requires="p14">
+          <p:contentPart p14:bwMode="auto" r:id="rId28">
+            <p14:nvContentPartPr>
+              <p14:cNvPr id="19" name="Ink 18">
+                <a:extLst>
+                  <a:ext uri="{FF2B5EF4-FFF2-40B4-BE49-F238E27FC236}">
+                    <a16:creationId xmlns:a16="http://schemas.microsoft.com/office/drawing/2014/main" id="{03A9369B-9609-4864-AD22-D0D2AA7888F3}"/>
+                  </a:ext>
+                </a:extLst>
+              </p14:cNvPr>
+              <p14:cNvContentPartPr/>
+              <p14:nvPr/>
+            </p14:nvContentPartPr>
+            <p14:xfrm>
+              <a:off x="861049" y="2973499"/>
+              <a:ext cx="822240" cy="44640"/>
+            </p14:xfrm>
+          </p:contentPart>
+        </mc:Choice>
+        <mc:Fallback>
+          <p:pic>
+            <p:nvPicPr>
+              <p:cNvPr id="19" name="Ink 18">
+                <a:extLst>
+                  <a:ext uri="{FF2B5EF4-FFF2-40B4-BE49-F238E27FC236}">
+                    <a16:creationId xmlns:a16="http://schemas.microsoft.com/office/drawing/2014/main" id="{03A9369B-9609-4864-AD22-D0D2AA7888F3}"/>
+                  </a:ext>
+                </a:extLst>
+              </p:cNvPr>
+              <p:cNvPicPr/>
+              <p:nvPr/>
+            </p:nvPicPr>
+            <p:blipFill>
+              <a:blip r:embed="rId29"/>
+              <a:stretch>
+                <a:fillRect/>
+              </a:stretch>
+            </p:blipFill>
+            <p:spPr>
+              <a:xfrm>
+                <a:off x="852049" y="2964499"/>
+                <a:ext cx="839880" cy="62280"/>
+              </a:xfrm>
+              <a:prstGeom prst="rect">
+                <a:avLst/>
+              </a:prstGeom>
+            </p:spPr>
+          </p:pic>
+        </mc:Fallback>
+      </mc:AlternateContent>
+      <p:grpSp>
+        <p:nvGrpSpPr>
+          <p:cNvPr id="22" name="Group 21">
+            <a:extLst>
+              <a:ext uri="{FF2B5EF4-FFF2-40B4-BE49-F238E27FC236}">
+                <a16:creationId xmlns:a16="http://schemas.microsoft.com/office/drawing/2014/main" id="{7D4F8115-8E9E-45D4-9FCA-B150BA99755C}"/>
+              </a:ext>
+            </a:extLst>
+          </p:cNvPr>
+          <p:cNvGrpSpPr/>
+          <p:nvPr/>
+        </p:nvGrpSpPr>
+        <p:grpSpPr>
+          <a:xfrm>
+            <a:off x="1208089" y="4065019"/>
+            <a:ext cx="208800" cy="525240"/>
+            <a:chOff x="1208089" y="4065019"/>
+            <a:chExt cx="208800" cy="525240"/>
+          </a:xfrm>
+        </p:grpSpPr>
+        <mc:AlternateContent xmlns:mc="http://schemas.openxmlformats.org/markup-compatibility/2006">
+          <mc:Choice xmlns:p14="http://schemas.microsoft.com/office/powerpoint/2010/main" Requires="p14">
+            <p:contentPart p14:bwMode="auto" r:id="rId30">
+              <p14:nvContentPartPr>
+                <p14:cNvPr id="20" name="Ink 19">
+                  <a:extLst>
+                    <a:ext uri="{FF2B5EF4-FFF2-40B4-BE49-F238E27FC236}">
+                      <a16:creationId xmlns:a16="http://schemas.microsoft.com/office/drawing/2014/main" id="{2DBA12F2-B3A6-4648-A8CB-ACD24D5FB2FF}"/>
+                    </a:ext>
+                  </a:extLst>
+                </p14:cNvPr>
+                <p14:cNvContentPartPr/>
+                <p14:nvPr/>
+              </p14:nvContentPartPr>
+              <p14:xfrm>
+                <a:off x="1306729" y="4065019"/>
+                <a:ext cx="110160" cy="27000"/>
+              </p14:xfrm>
+            </p:contentPart>
+          </mc:Choice>
+          <mc:Fallback>
+            <p:pic>
+              <p:nvPicPr>
+                <p:cNvPr id="20" name="Ink 19">
+                  <a:extLst>
+                    <a:ext uri="{FF2B5EF4-FFF2-40B4-BE49-F238E27FC236}">
+                      <a16:creationId xmlns:a16="http://schemas.microsoft.com/office/drawing/2014/main" id="{2DBA12F2-B3A6-4648-A8CB-ACD24D5FB2FF}"/>
+                    </a:ext>
+                  </a:extLst>
+                </p:cNvPr>
+                <p:cNvPicPr/>
+                <p:nvPr/>
+              </p:nvPicPr>
+              <p:blipFill>
+                <a:blip r:embed="rId31"/>
+                <a:stretch>
+                  <a:fillRect/>
+                </a:stretch>
+              </p:blipFill>
+              <p:spPr>
+                <a:xfrm>
+                  <a:off x="1298089" y="4056379"/>
+                  <a:ext cx="127800" cy="44640"/>
+                </a:xfrm>
+                <a:prstGeom prst="rect">
+                  <a:avLst/>
+                </a:prstGeom>
+              </p:spPr>
+            </p:pic>
+          </mc:Fallback>
+        </mc:AlternateContent>
+        <mc:AlternateContent xmlns:mc="http://schemas.openxmlformats.org/markup-compatibility/2006">
+          <mc:Choice xmlns:p14="http://schemas.microsoft.com/office/powerpoint/2010/main" Requires="p14">
+            <p:contentPart p14:bwMode="auto" r:id="rId32">
+              <p14:nvContentPartPr>
+                <p14:cNvPr id="21" name="Ink 20">
+                  <a:extLst>
+                    <a:ext uri="{FF2B5EF4-FFF2-40B4-BE49-F238E27FC236}">
+                      <a16:creationId xmlns:a16="http://schemas.microsoft.com/office/drawing/2014/main" id="{D7FD9A7E-2C89-4530-8720-B3305AE7A26E}"/>
+                    </a:ext>
+                  </a:extLst>
+                </p14:cNvPr>
+                <p14:cNvContentPartPr/>
+                <p14:nvPr/>
+              </p14:nvContentPartPr>
+              <p14:xfrm>
+                <a:off x="1208089" y="4074379"/>
+                <a:ext cx="168120" cy="515880"/>
+              </p14:xfrm>
+            </p:contentPart>
+          </mc:Choice>
+          <mc:Fallback>
+            <p:pic>
+              <p:nvPicPr>
+                <p:cNvPr id="21" name="Ink 20">
+                  <a:extLst>
+                    <a:ext uri="{FF2B5EF4-FFF2-40B4-BE49-F238E27FC236}">
+                      <a16:creationId xmlns:a16="http://schemas.microsoft.com/office/drawing/2014/main" id="{D7FD9A7E-2C89-4530-8720-B3305AE7A26E}"/>
+                    </a:ext>
+                  </a:extLst>
+                </p:cNvPr>
+                <p:cNvPicPr/>
+                <p:nvPr/>
+              </p:nvPicPr>
+              <p:blipFill>
+                <a:blip r:embed="rId33"/>
+                <a:stretch>
+                  <a:fillRect/>
+                </a:stretch>
+              </p:blipFill>
+              <p:spPr>
+                <a:xfrm>
+                  <a:off x="1199089" y="4065739"/>
+                  <a:ext cx="185760" cy="533520"/>
+                </a:xfrm>
+                <a:prstGeom prst="rect">
+                  <a:avLst/>
+                </a:prstGeom>
+              </p:spPr>
+            </p:pic>
+          </mc:Fallback>
+        </mc:AlternateContent>
+      </p:grpSp>
+      <mc:AlternateContent xmlns:mc="http://schemas.openxmlformats.org/markup-compatibility/2006">
+        <mc:Choice xmlns:p14="http://schemas.microsoft.com/office/powerpoint/2010/main" Requires="p14">
+          <p:contentPart p14:bwMode="auto" r:id="rId34">
+            <p14:nvContentPartPr>
+              <p14:cNvPr id="23" name="Ink 22">
+                <a:extLst>
+                  <a:ext uri="{FF2B5EF4-FFF2-40B4-BE49-F238E27FC236}">
+                    <a16:creationId xmlns:a16="http://schemas.microsoft.com/office/drawing/2014/main" id="{020040ED-811B-4243-A0DC-D5F1B6881498}"/>
+                  </a:ext>
+                </a:extLst>
+              </p14:cNvPr>
+              <p14:cNvContentPartPr/>
+              <p14:nvPr/>
+            </p14:nvContentPartPr>
+            <p14:xfrm>
+              <a:off x="4118329" y="3956299"/>
+              <a:ext cx="1144080" cy="43560"/>
+            </p14:xfrm>
+          </p:contentPart>
+        </mc:Choice>
+        <mc:Fallback>
+          <p:pic>
+            <p:nvPicPr>
+              <p:cNvPr id="23" name="Ink 22">
+                <a:extLst>
+                  <a:ext uri="{FF2B5EF4-FFF2-40B4-BE49-F238E27FC236}">
+                    <a16:creationId xmlns:a16="http://schemas.microsoft.com/office/drawing/2014/main" id="{020040ED-811B-4243-A0DC-D5F1B6881498}"/>
+                  </a:ext>
+                </a:extLst>
+              </p:cNvPr>
+              <p:cNvPicPr/>
+              <p:nvPr/>
+            </p:nvPicPr>
+            <p:blipFill>
+              <a:blip r:embed="rId35"/>
+              <a:stretch>
+                <a:fillRect/>
+              </a:stretch>
+            </p:blipFill>
+            <p:spPr>
+              <a:xfrm>
+                <a:off x="4109329" y="3947659"/>
+                <a:ext cx="1161720" cy="61200"/>
+              </a:xfrm>
+              <a:prstGeom prst="rect">
+                <a:avLst/>
+              </a:prstGeom>
+            </p:spPr>
+          </p:pic>
+        </mc:Fallback>
+      </mc:AlternateContent>
+      <mc:AlternateContent xmlns:mc="http://schemas.openxmlformats.org/markup-compatibility/2006">
+        <mc:Choice xmlns:p14="http://schemas.microsoft.com/office/powerpoint/2010/main" Requires="p14">
+          <p:contentPart p14:bwMode="auto" r:id="rId36">
+            <p14:nvContentPartPr>
+              <p14:cNvPr id="24" name="Ink 23">
+                <a:extLst>
+                  <a:ext uri="{FF2B5EF4-FFF2-40B4-BE49-F238E27FC236}">
+                    <a16:creationId xmlns:a16="http://schemas.microsoft.com/office/drawing/2014/main" id="{AE39AF9F-E7E0-4807-9D8E-E020B076100E}"/>
+                  </a:ext>
+                </a:extLst>
+              </p14:cNvPr>
+              <p14:cNvContentPartPr/>
+              <p14:nvPr/>
+            </p14:nvContentPartPr>
+            <p14:xfrm>
+              <a:off x="3885049" y="3103099"/>
+              <a:ext cx="241560" cy="547560"/>
+            </p14:xfrm>
+          </p:contentPart>
+        </mc:Choice>
+        <mc:Fallback>
+          <p:pic>
+            <p:nvPicPr>
+              <p:cNvPr id="24" name="Ink 23">
+                <a:extLst>
+                  <a:ext uri="{FF2B5EF4-FFF2-40B4-BE49-F238E27FC236}">
+                    <a16:creationId xmlns:a16="http://schemas.microsoft.com/office/drawing/2014/main" id="{AE39AF9F-E7E0-4807-9D8E-E020B076100E}"/>
+                  </a:ext>
+                </a:extLst>
+              </p:cNvPr>
+              <p:cNvPicPr/>
+              <p:nvPr/>
+            </p:nvPicPr>
+            <p:blipFill>
+              <a:blip r:embed="rId37"/>
+              <a:stretch>
+                <a:fillRect/>
+              </a:stretch>
+            </p:blipFill>
+            <p:spPr>
+              <a:xfrm>
+                <a:off x="3876409" y="3094099"/>
+                <a:ext cx="259200" cy="565200"/>
+              </a:xfrm>
+              <a:prstGeom prst="rect">
+                <a:avLst/>
+              </a:prstGeom>
+            </p:spPr>
+          </p:pic>
+        </mc:Fallback>
+      </mc:AlternateContent>
+      <p:grpSp>
+        <p:nvGrpSpPr>
+          <p:cNvPr id="37" name="Group 36">
+            <a:extLst>
+              <a:ext uri="{FF2B5EF4-FFF2-40B4-BE49-F238E27FC236}">
+                <a16:creationId xmlns:a16="http://schemas.microsoft.com/office/drawing/2014/main" id="{39F45B87-E038-4729-A3B0-8DE80155FB64}"/>
+              </a:ext>
+            </a:extLst>
+          </p:cNvPr>
+          <p:cNvGrpSpPr/>
+          <p:nvPr/>
+        </p:nvGrpSpPr>
+        <p:grpSpPr>
+          <a:xfrm>
+            <a:off x="2283409" y="4702939"/>
+            <a:ext cx="1820520" cy="300960"/>
+            <a:chOff x="2283409" y="4702939"/>
+            <a:chExt cx="1820520" cy="300960"/>
+          </a:xfrm>
+        </p:grpSpPr>
+        <mc:AlternateContent xmlns:mc="http://schemas.openxmlformats.org/markup-compatibility/2006">
+          <mc:Choice xmlns:p14="http://schemas.microsoft.com/office/powerpoint/2010/main" Requires="p14">
+            <p:contentPart p14:bwMode="auto" r:id="rId38">
+              <p14:nvContentPartPr>
+                <p14:cNvPr id="25" name="Ink 24">
+                  <a:extLst>
+                    <a:ext uri="{FF2B5EF4-FFF2-40B4-BE49-F238E27FC236}">
+                      <a16:creationId xmlns:a16="http://schemas.microsoft.com/office/drawing/2014/main" id="{F8B1C7E5-D941-4A8A-9FD0-DBC08848A5A3}"/>
+                    </a:ext>
+                  </a:extLst>
+                </p14:cNvPr>
+                <p14:cNvContentPartPr/>
+                <p14:nvPr/>
+              </p14:nvContentPartPr>
+              <p14:xfrm>
+                <a:off x="2815489" y="4761259"/>
+                <a:ext cx="14760" cy="3960"/>
+              </p14:xfrm>
+            </p:contentPart>
+          </mc:Choice>
+          <mc:Fallback>
+            <p:pic>
+              <p:nvPicPr>
+                <p:cNvPr id="25" name="Ink 24">
+                  <a:extLst>
+                    <a:ext uri="{FF2B5EF4-FFF2-40B4-BE49-F238E27FC236}">
+                      <a16:creationId xmlns:a16="http://schemas.microsoft.com/office/drawing/2014/main" id="{F8B1C7E5-D941-4A8A-9FD0-DBC08848A5A3}"/>
+                    </a:ext>
+                  </a:extLst>
+                </p:cNvPr>
+                <p:cNvPicPr/>
+                <p:nvPr/>
+              </p:nvPicPr>
+              <p:blipFill>
+                <a:blip r:embed="rId39"/>
+                <a:stretch>
+                  <a:fillRect/>
+                </a:stretch>
+              </p:blipFill>
+              <p:spPr>
+                <a:xfrm>
+                  <a:off x="2806489" y="4752619"/>
+                  <a:ext cx="32400" cy="21600"/>
+                </a:xfrm>
+                <a:prstGeom prst="rect">
+                  <a:avLst/>
+                </a:prstGeom>
+              </p:spPr>
+            </p:pic>
+          </mc:Fallback>
+        </mc:AlternateContent>
+        <mc:AlternateContent xmlns:mc="http://schemas.openxmlformats.org/markup-compatibility/2006">
+          <mc:Choice xmlns:p14="http://schemas.microsoft.com/office/powerpoint/2010/main" Requires="p14">
+            <p:contentPart p14:bwMode="auto" r:id="rId40">
+              <p14:nvContentPartPr>
+                <p14:cNvPr id="26" name="Ink 25">
+                  <a:extLst>
+                    <a:ext uri="{FF2B5EF4-FFF2-40B4-BE49-F238E27FC236}">
+                      <a16:creationId xmlns:a16="http://schemas.microsoft.com/office/drawing/2014/main" id="{BCB05447-F708-4F50-B0B2-1314BC15DDA9}"/>
+                    </a:ext>
+                  </a:extLst>
+                </p14:cNvPr>
+                <p14:cNvContentPartPr/>
+                <p14:nvPr/>
+              </p14:nvContentPartPr>
+              <p14:xfrm>
+                <a:off x="2733049" y="4742899"/>
+                <a:ext cx="113400" cy="254880"/>
+              </p14:xfrm>
+            </p:contentPart>
+          </mc:Choice>
+          <mc:Fallback>
+            <p:pic>
+              <p:nvPicPr>
+                <p:cNvPr id="26" name="Ink 25">
+                  <a:extLst>
+                    <a:ext uri="{FF2B5EF4-FFF2-40B4-BE49-F238E27FC236}">
+                      <a16:creationId xmlns:a16="http://schemas.microsoft.com/office/drawing/2014/main" id="{BCB05447-F708-4F50-B0B2-1314BC15DDA9}"/>
+                    </a:ext>
+                  </a:extLst>
+                </p:cNvPr>
+                <p:cNvPicPr/>
+                <p:nvPr/>
+              </p:nvPicPr>
+              <p:blipFill>
+                <a:blip r:embed="rId41"/>
+                <a:stretch>
+                  <a:fillRect/>
+                </a:stretch>
+              </p:blipFill>
+              <p:spPr>
+                <a:xfrm>
+                  <a:off x="2724049" y="4733899"/>
+                  <a:ext cx="131040" cy="272520"/>
+                </a:xfrm>
+                <a:prstGeom prst="rect">
+                  <a:avLst/>
+                </a:prstGeom>
+              </p:spPr>
+            </p:pic>
+          </mc:Fallback>
+        </mc:AlternateContent>
+        <mc:AlternateContent xmlns:mc="http://schemas.openxmlformats.org/markup-compatibility/2006">
+          <mc:Choice xmlns:p14="http://schemas.microsoft.com/office/powerpoint/2010/main" Requires="p14">
+            <p:contentPart p14:bwMode="auto" r:id="rId42">
+              <p14:nvContentPartPr>
+                <p14:cNvPr id="27" name="Ink 26">
+                  <a:extLst>
+                    <a:ext uri="{FF2B5EF4-FFF2-40B4-BE49-F238E27FC236}">
+                      <a16:creationId xmlns:a16="http://schemas.microsoft.com/office/drawing/2014/main" id="{DF43E95F-0136-4DFA-9D41-9AB28039E6D9}"/>
+                    </a:ext>
+                  </a:extLst>
+                </p14:cNvPr>
+                <p14:cNvContentPartPr/>
+                <p14:nvPr/>
+              </p14:nvContentPartPr>
+              <p14:xfrm>
+                <a:off x="2884969" y="4737499"/>
+                <a:ext cx="178920" cy="266400"/>
+              </p14:xfrm>
+            </p:contentPart>
+          </mc:Choice>
+          <mc:Fallback>
+            <p:pic>
+              <p:nvPicPr>
+                <p:cNvPr id="27" name="Ink 26">
+                  <a:extLst>
+                    <a:ext uri="{FF2B5EF4-FFF2-40B4-BE49-F238E27FC236}">
+                      <a16:creationId xmlns:a16="http://schemas.microsoft.com/office/drawing/2014/main" id="{DF43E95F-0136-4DFA-9D41-9AB28039E6D9}"/>
+                    </a:ext>
+                  </a:extLst>
+                </p:cNvPr>
+                <p:cNvPicPr/>
+                <p:nvPr/>
+              </p:nvPicPr>
+              <p:blipFill>
+                <a:blip r:embed="rId43"/>
+                <a:stretch>
+                  <a:fillRect/>
+                </a:stretch>
+              </p:blipFill>
+              <p:spPr>
+                <a:xfrm>
+                  <a:off x="2875969" y="4728499"/>
+                  <a:ext cx="196560" cy="284040"/>
+                </a:xfrm>
+                <a:prstGeom prst="rect">
+                  <a:avLst/>
+                </a:prstGeom>
+              </p:spPr>
+            </p:pic>
+          </mc:Fallback>
+        </mc:AlternateContent>
+        <mc:AlternateContent xmlns:mc="http://schemas.openxmlformats.org/markup-compatibility/2006">
+          <mc:Choice xmlns:p14="http://schemas.microsoft.com/office/powerpoint/2010/main" Requires="p14">
+            <p:contentPart p14:bwMode="auto" r:id="rId44">
+              <p14:nvContentPartPr>
+                <p14:cNvPr id="28" name="Ink 27">
+                  <a:extLst>
+                    <a:ext uri="{FF2B5EF4-FFF2-40B4-BE49-F238E27FC236}">
+                      <a16:creationId xmlns:a16="http://schemas.microsoft.com/office/drawing/2014/main" id="{93075A85-AE32-42CF-9D65-2AC58F8C97B6}"/>
+                    </a:ext>
+                  </a:extLst>
+                </p14:cNvPr>
+                <p14:cNvContentPartPr/>
+                <p14:nvPr/>
+              </p14:nvContentPartPr>
+              <p14:xfrm>
+                <a:off x="3162529" y="4841539"/>
+                <a:ext cx="218880" cy="124200"/>
+              </p14:xfrm>
+            </p:contentPart>
+          </mc:Choice>
+          <mc:Fallback>
+            <p:pic>
+              <p:nvPicPr>
+                <p:cNvPr id="28" name="Ink 27">
+                  <a:extLst>
+                    <a:ext uri="{FF2B5EF4-FFF2-40B4-BE49-F238E27FC236}">
+                      <a16:creationId xmlns:a16="http://schemas.microsoft.com/office/drawing/2014/main" id="{93075A85-AE32-42CF-9D65-2AC58F8C97B6}"/>
+                    </a:ext>
+                  </a:extLst>
+                </p:cNvPr>
+                <p:cNvPicPr/>
+                <p:nvPr/>
+              </p:nvPicPr>
+              <p:blipFill>
+                <a:blip r:embed="rId45"/>
+                <a:stretch>
+                  <a:fillRect/>
+                </a:stretch>
+              </p:blipFill>
+              <p:spPr>
+                <a:xfrm>
+                  <a:off x="3153529" y="4832899"/>
+                  <a:ext cx="236520" cy="141840"/>
+                </a:xfrm>
+                <a:prstGeom prst="rect">
+                  <a:avLst/>
+                </a:prstGeom>
+              </p:spPr>
+            </p:pic>
+          </mc:Fallback>
+        </mc:AlternateContent>
+        <mc:AlternateContent xmlns:mc="http://schemas.openxmlformats.org/markup-compatibility/2006">
+          <mc:Choice xmlns:p14="http://schemas.microsoft.com/office/powerpoint/2010/main" Requires="p14">
+            <p:contentPart p14:bwMode="auto" r:id="rId46">
+              <p14:nvContentPartPr>
+                <p14:cNvPr id="29" name="Ink 28">
+                  <a:extLst>
+                    <a:ext uri="{FF2B5EF4-FFF2-40B4-BE49-F238E27FC236}">
+                      <a16:creationId xmlns:a16="http://schemas.microsoft.com/office/drawing/2014/main" id="{F682ED8B-A2B7-4E9C-8BCC-FF840106BB03}"/>
+                    </a:ext>
+                  </a:extLst>
+                </p14:cNvPr>
+                <p14:cNvContentPartPr/>
+                <p14:nvPr/>
+              </p14:nvContentPartPr>
+              <p14:xfrm>
+                <a:off x="3440089" y="4716979"/>
+                <a:ext cx="75600" cy="266400"/>
+              </p14:xfrm>
+            </p:contentPart>
+          </mc:Choice>
+          <mc:Fallback>
+            <p:pic>
+              <p:nvPicPr>
+                <p:cNvPr id="29" name="Ink 28">
+                  <a:extLst>
+                    <a:ext uri="{FF2B5EF4-FFF2-40B4-BE49-F238E27FC236}">
+                      <a16:creationId xmlns:a16="http://schemas.microsoft.com/office/drawing/2014/main" id="{F682ED8B-A2B7-4E9C-8BCC-FF840106BB03}"/>
+                    </a:ext>
+                  </a:extLst>
+                </p:cNvPr>
+                <p:cNvPicPr/>
+                <p:nvPr/>
+              </p:nvPicPr>
+              <p:blipFill>
+                <a:blip r:embed="rId47"/>
+                <a:stretch>
+                  <a:fillRect/>
+                </a:stretch>
+              </p:blipFill>
+              <p:spPr>
+                <a:xfrm>
+                  <a:off x="3431089" y="4708339"/>
+                  <a:ext cx="93240" cy="284040"/>
+                </a:xfrm>
+                <a:prstGeom prst="rect">
+                  <a:avLst/>
+                </a:prstGeom>
+              </p:spPr>
+            </p:pic>
+          </mc:Fallback>
+        </mc:AlternateContent>
+        <mc:AlternateContent xmlns:mc="http://schemas.openxmlformats.org/markup-compatibility/2006">
+          <mc:Choice xmlns:p14="http://schemas.microsoft.com/office/powerpoint/2010/main" Requires="p14">
+            <p:contentPart p14:bwMode="auto" r:id="rId48">
+              <p14:nvContentPartPr>
+                <p14:cNvPr id="30" name="Ink 29">
+                  <a:extLst>
+                    <a:ext uri="{FF2B5EF4-FFF2-40B4-BE49-F238E27FC236}">
+                      <a16:creationId xmlns:a16="http://schemas.microsoft.com/office/drawing/2014/main" id="{1A90D939-E373-40D9-8E76-8B5EB4F2D878}"/>
+                    </a:ext>
+                  </a:extLst>
+                </p14:cNvPr>
+                <p14:cNvContentPartPr/>
+                <p14:nvPr/>
+              </p14:nvContentPartPr>
+              <p14:xfrm>
+                <a:off x="3498769" y="4851979"/>
+                <a:ext cx="118080" cy="126000"/>
+              </p14:xfrm>
+            </p:contentPart>
+          </mc:Choice>
+          <mc:Fallback>
+            <p:pic>
+              <p:nvPicPr>
+                <p:cNvPr id="30" name="Ink 29">
+                  <a:extLst>
+                    <a:ext uri="{FF2B5EF4-FFF2-40B4-BE49-F238E27FC236}">
+                      <a16:creationId xmlns:a16="http://schemas.microsoft.com/office/drawing/2014/main" id="{1A90D939-E373-40D9-8E76-8B5EB4F2D878}"/>
+                    </a:ext>
+                  </a:extLst>
+                </p:cNvPr>
+                <p:cNvPicPr/>
+                <p:nvPr/>
+              </p:nvPicPr>
+              <p:blipFill>
+                <a:blip r:embed="rId49"/>
+                <a:stretch>
+                  <a:fillRect/>
+                </a:stretch>
+              </p:blipFill>
+              <p:spPr>
+                <a:xfrm>
+                  <a:off x="3489769" y="4842979"/>
+                  <a:ext cx="135720" cy="143640"/>
+                </a:xfrm>
+                <a:prstGeom prst="rect">
+                  <a:avLst/>
+                </a:prstGeom>
+              </p:spPr>
+            </p:pic>
+          </mc:Fallback>
+        </mc:AlternateContent>
+        <mc:AlternateContent xmlns:mc="http://schemas.openxmlformats.org/markup-compatibility/2006">
+          <mc:Choice xmlns:p14="http://schemas.microsoft.com/office/powerpoint/2010/main" Requires="p14">
+            <p:contentPart p14:bwMode="auto" r:id="rId50">
+              <p14:nvContentPartPr>
+                <p14:cNvPr id="31" name="Ink 30">
+                  <a:extLst>
+                    <a:ext uri="{FF2B5EF4-FFF2-40B4-BE49-F238E27FC236}">
+                      <a16:creationId xmlns:a16="http://schemas.microsoft.com/office/drawing/2014/main" id="{5BF6B927-584B-45D7-B014-634EF5F90A8A}"/>
+                    </a:ext>
+                  </a:extLst>
+                </p14:cNvPr>
+                <p14:cNvContentPartPr/>
+                <p14:nvPr/>
+              </p14:nvContentPartPr>
+              <p14:xfrm>
+                <a:off x="3654289" y="4875739"/>
+                <a:ext cx="111600" cy="72720"/>
+              </p14:xfrm>
+            </p:contentPart>
+          </mc:Choice>
+          <mc:Fallback>
+            <p:pic>
+              <p:nvPicPr>
+                <p:cNvPr id="31" name="Ink 30">
+                  <a:extLst>
+                    <a:ext uri="{FF2B5EF4-FFF2-40B4-BE49-F238E27FC236}">
+                      <a16:creationId xmlns:a16="http://schemas.microsoft.com/office/drawing/2014/main" id="{5BF6B927-584B-45D7-B014-634EF5F90A8A}"/>
+                    </a:ext>
+                  </a:extLst>
+                </p:cNvPr>
+                <p:cNvPicPr/>
+                <p:nvPr/>
+              </p:nvPicPr>
+              <p:blipFill>
+                <a:blip r:embed="rId51"/>
+                <a:stretch>
+                  <a:fillRect/>
+                </a:stretch>
+              </p:blipFill>
+              <p:spPr>
+                <a:xfrm>
+                  <a:off x="3645289" y="4866739"/>
+                  <a:ext cx="129240" cy="90360"/>
+                </a:xfrm>
+                <a:prstGeom prst="rect">
+                  <a:avLst/>
+                </a:prstGeom>
+              </p:spPr>
+            </p:pic>
+          </mc:Fallback>
+        </mc:AlternateContent>
+        <mc:AlternateContent xmlns:mc="http://schemas.openxmlformats.org/markup-compatibility/2006">
+          <mc:Choice xmlns:p14="http://schemas.microsoft.com/office/powerpoint/2010/main" Requires="p14">
+            <p:contentPart p14:bwMode="auto" r:id="rId52">
+              <p14:nvContentPartPr>
+                <p14:cNvPr id="32" name="Ink 31">
+                  <a:extLst>
+                    <a:ext uri="{FF2B5EF4-FFF2-40B4-BE49-F238E27FC236}">
+                      <a16:creationId xmlns:a16="http://schemas.microsoft.com/office/drawing/2014/main" id="{80B303FF-F02C-4FC3-ABFD-FB2523A5052C}"/>
+                    </a:ext>
+                  </a:extLst>
+                </p14:cNvPr>
+                <p14:cNvContentPartPr/>
+                <p14:nvPr/>
+              </p14:nvContentPartPr>
+              <p14:xfrm>
+                <a:off x="3777409" y="4702939"/>
+                <a:ext cx="110880" cy="255960"/>
+              </p14:xfrm>
+            </p:contentPart>
+          </mc:Choice>
+          <mc:Fallback>
+            <p:pic>
+              <p:nvPicPr>
+                <p:cNvPr id="32" name="Ink 31">
+                  <a:extLst>
+                    <a:ext uri="{FF2B5EF4-FFF2-40B4-BE49-F238E27FC236}">
+                      <a16:creationId xmlns:a16="http://schemas.microsoft.com/office/drawing/2014/main" id="{80B303FF-F02C-4FC3-ABFD-FB2523A5052C}"/>
+                    </a:ext>
+                  </a:extLst>
+                </p:cNvPr>
+                <p:cNvPicPr/>
+                <p:nvPr/>
+              </p:nvPicPr>
+              <p:blipFill>
+                <a:blip r:embed="rId53"/>
+                <a:stretch>
+                  <a:fillRect/>
+                </a:stretch>
+              </p:blipFill>
+              <p:spPr>
+                <a:xfrm>
+                  <a:off x="3768769" y="4693939"/>
+                  <a:ext cx="128520" cy="273600"/>
+                </a:xfrm>
+                <a:prstGeom prst="rect">
+                  <a:avLst/>
+                </a:prstGeom>
+              </p:spPr>
+            </p:pic>
+          </mc:Fallback>
+        </mc:AlternateContent>
+        <mc:AlternateContent xmlns:mc="http://schemas.openxmlformats.org/markup-compatibility/2006">
+          <mc:Choice xmlns:p14="http://schemas.microsoft.com/office/powerpoint/2010/main" Requires="p14">
+            <p:contentPart p14:bwMode="auto" r:id="rId54">
+              <p14:nvContentPartPr>
+                <p14:cNvPr id="33" name="Ink 32">
+                  <a:extLst>
+                    <a:ext uri="{FF2B5EF4-FFF2-40B4-BE49-F238E27FC236}">
+                      <a16:creationId xmlns:a16="http://schemas.microsoft.com/office/drawing/2014/main" id="{594719CA-2A93-49EA-A456-561430D83D53}"/>
+                    </a:ext>
+                  </a:extLst>
+                </p14:cNvPr>
+                <p14:cNvContentPartPr/>
+                <p14:nvPr/>
+              </p14:nvContentPartPr>
+              <p14:xfrm>
+                <a:off x="3957409" y="4872139"/>
+                <a:ext cx="42120" cy="60840"/>
+              </p14:xfrm>
+            </p:contentPart>
+          </mc:Choice>
+          <mc:Fallback>
+            <p:pic>
+              <p:nvPicPr>
+                <p:cNvPr id="33" name="Ink 32">
+                  <a:extLst>
+                    <a:ext uri="{FF2B5EF4-FFF2-40B4-BE49-F238E27FC236}">
+                      <a16:creationId xmlns:a16="http://schemas.microsoft.com/office/drawing/2014/main" id="{594719CA-2A93-49EA-A456-561430D83D53}"/>
+                    </a:ext>
+                  </a:extLst>
+                </p:cNvPr>
+                <p:cNvPicPr/>
+                <p:nvPr/>
+              </p:nvPicPr>
+              <p:blipFill>
+                <a:blip r:embed="rId55"/>
+                <a:stretch>
+                  <a:fillRect/>
+                </a:stretch>
+              </p:blipFill>
+              <p:spPr>
+                <a:xfrm>
+                  <a:off x="3948409" y="4863139"/>
+                  <a:ext cx="59760" cy="78480"/>
+                </a:xfrm>
+                <a:prstGeom prst="rect">
+                  <a:avLst/>
+                </a:prstGeom>
+              </p:spPr>
+            </p:pic>
+          </mc:Fallback>
+        </mc:AlternateContent>
+        <mc:AlternateContent xmlns:mc="http://schemas.openxmlformats.org/markup-compatibility/2006">
+          <mc:Choice xmlns:p14="http://schemas.microsoft.com/office/powerpoint/2010/main" Requires="p14">
+            <p:contentPart p14:bwMode="auto" r:id="rId56">
+              <p14:nvContentPartPr>
+                <p14:cNvPr id="34" name="Ink 33">
+                  <a:extLst>
+                    <a:ext uri="{FF2B5EF4-FFF2-40B4-BE49-F238E27FC236}">
+                      <a16:creationId xmlns:a16="http://schemas.microsoft.com/office/drawing/2014/main" id="{9208C4F1-1F2B-4332-86F2-5EF90E7A3D19}"/>
+                    </a:ext>
+                  </a:extLst>
+                </p14:cNvPr>
+                <p14:cNvContentPartPr/>
+                <p14:nvPr/>
+              </p14:nvContentPartPr>
+              <p14:xfrm>
+                <a:off x="4072609" y="4838659"/>
+                <a:ext cx="31320" cy="118440"/>
+              </p14:xfrm>
+            </p:contentPart>
+          </mc:Choice>
+          <mc:Fallback>
+            <p:pic>
+              <p:nvPicPr>
+                <p:cNvPr id="34" name="Ink 33">
+                  <a:extLst>
+                    <a:ext uri="{FF2B5EF4-FFF2-40B4-BE49-F238E27FC236}">
+                      <a16:creationId xmlns:a16="http://schemas.microsoft.com/office/drawing/2014/main" id="{9208C4F1-1F2B-4332-86F2-5EF90E7A3D19}"/>
+                    </a:ext>
+                  </a:extLst>
+                </p:cNvPr>
+                <p:cNvPicPr/>
+                <p:nvPr/>
+              </p:nvPicPr>
+              <p:blipFill>
+                <a:blip r:embed="rId57"/>
+                <a:stretch>
+                  <a:fillRect/>
+                </a:stretch>
+              </p:blipFill>
+              <p:spPr>
+                <a:xfrm>
+                  <a:off x="4063969" y="4830019"/>
+                  <a:ext cx="48960" cy="136080"/>
+                </a:xfrm>
+                <a:prstGeom prst="rect">
+                  <a:avLst/>
+                </a:prstGeom>
+              </p:spPr>
+            </p:pic>
+          </mc:Fallback>
+        </mc:AlternateContent>
+        <mc:AlternateContent xmlns:mc="http://schemas.openxmlformats.org/markup-compatibility/2006">
+          <mc:Choice xmlns:p14="http://schemas.microsoft.com/office/powerpoint/2010/main" Requires="p14">
+            <p:contentPart p14:bwMode="auto" r:id="rId58">
+              <p14:nvContentPartPr>
+                <p14:cNvPr id="36" name="Ink 35">
+                  <a:extLst>
+                    <a:ext uri="{FF2B5EF4-FFF2-40B4-BE49-F238E27FC236}">
+                      <a16:creationId xmlns:a16="http://schemas.microsoft.com/office/drawing/2014/main" id="{A599598A-5375-426F-BCE7-C7D525574D68}"/>
+                    </a:ext>
+                  </a:extLst>
+                </p14:cNvPr>
+                <p14:cNvContentPartPr/>
+                <p14:nvPr/>
+              </p14:nvContentPartPr>
+              <p14:xfrm>
+                <a:off x="2283409" y="4823539"/>
+                <a:ext cx="324000" cy="131400"/>
+              </p14:xfrm>
+            </p:contentPart>
+          </mc:Choice>
+          <mc:Fallback>
+            <p:pic>
+              <p:nvPicPr>
+                <p:cNvPr id="36" name="Ink 35">
+                  <a:extLst>
+                    <a:ext uri="{FF2B5EF4-FFF2-40B4-BE49-F238E27FC236}">
+                      <a16:creationId xmlns:a16="http://schemas.microsoft.com/office/drawing/2014/main" id="{A599598A-5375-426F-BCE7-C7D525574D68}"/>
+                    </a:ext>
+                  </a:extLst>
+                </p:cNvPr>
+                <p:cNvPicPr/>
+                <p:nvPr/>
+              </p:nvPicPr>
+              <p:blipFill>
+                <a:blip r:embed="rId59"/>
+                <a:stretch>
+                  <a:fillRect/>
+                </a:stretch>
+              </p:blipFill>
+              <p:spPr>
+                <a:xfrm>
+                  <a:off x="2274409" y="4814539"/>
+                  <a:ext cx="341640" cy="149040"/>
+                </a:xfrm>
+                <a:prstGeom prst="rect">
+                  <a:avLst/>
+                </a:prstGeom>
+              </p:spPr>
+            </p:pic>
+          </mc:Fallback>
+        </mc:AlternateContent>
+      </p:grpSp>
+      <mc:AlternateContent xmlns:mc="http://schemas.openxmlformats.org/markup-compatibility/2006">
+        <mc:Choice xmlns:p14="http://schemas.microsoft.com/office/powerpoint/2010/main" Requires="p14">
+          <p:contentPart p14:bwMode="auto" r:id="rId60">
+            <p14:nvContentPartPr>
+              <p14:cNvPr id="38" name="Ink 37">
+                <a:extLst>
+                  <a:ext uri="{FF2B5EF4-FFF2-40B4-BE49-F238E27FC236}">
+                    <a16:creationId xmlns:a16="http://schemas.microsoft.com/office/drawing/2014/main" id="{2CC70464-C63C-4307-8BBE-17674B2F2666}"/>
+                  </a:ext>
+                </a:extLst>
+              </p14:cNvPr>
+              <p14:cNvContentPartPr/>
+              <p14:nvPr/>
+            </p14:nvContentPartPr>
+            <p14:xfrm>
+              <a:off x="2080369" y="3644899"/>
+              <a:ext cx="452520" cy="64080"/>
+            </p14:xfrm>
+          </p:contentPart>
+        </mc:Choice>
+        <mc:Fallback>
+          <p:pic>
+            <p:nvPicPr>
+              <p:cNvPr id="38" name="Ink 37">
+                <a:extLst>
+                  <a:ext uri="{FF2B5EF4-FFF2-40B4-BE49-F238E27FC236}">
+                    <a16:creationId xmlns:a16="http://schemas.microsoft.com/office/drawing/2014/main" id="{2CC70464-C63C-4307-8BBE-17674B2F2666}"/>
+                  </a:ext>
+                </a:extLst>
+              </p:cNvPr>
+              <p:cNvPicPr/>
+              <p:nvPr/>
+            </p:nvPicPr>
+            <p:blipFill>
+              <a:blip r:embed="rId61"/>
+              <a:stretch>
+                <a:fillRect/>
+              </a:stretch>
+            </p:blipFill>
+            <p:spPr>
+              <a:xfrm>
+                <a:off x="2071729" y="3636259"/>
+                <a:ext cx="470160" cy="81720"/>
+              </a:xfrm>
+              <a:prstGeom prst="rect">
+                <a:avLst/>
+              </a:prstGeom>
+            </p:spPr>
+          </p:pic>
+        </mc:Fallback>
+      </mc:AlternateContent>
+      <mc:AlternateContent xmlns:mc="http://schemas.openxmlformats.org/markup-compatibility/2006">
+        <mc:Choice xmlns:p14="http://schemas.microsoft.com/office/powerpoint/2010/main" Requires="p14">
+          <p:contentPart p14:bwMode="auto" r:id="rId62">
+            <p14:nvContentPartPr>
+              <p14:cNvPr id="39" name="Ink 38">
+                <a:extLst>
+                  <a:ext uri="{FF2B5EF4-FFF2-40B4-BE49-F238E27FC236}">
+                    <a16:creationId xmlns:a16="http://schemas.microsoft.com/office/drawing/2014/main" id="{25427CCD-AA75-4AAB-BB31-F593E4FB07F5}"/>
+                  </a:ext>
+                </a:extLst>
+              </p14:cNvPr>
+              <p14:cNvContentPartPr/>
+              <p14:nvPr/>
+            </p14:nvContentPartPr>
+            <p14:xfrm>
+              <a:off x="3912409" y="2980339"/>
+              <a:ext cx="726480" cy="33840"/>
+            </p14:xfrm>
+          </p:contentPart>
+        </mc:Choice>
+        <mc:Fallback>
+          <p:pic>
+            <p:nvPicPr>
+              <p:cNvPr id="39" name="Ink 38">
+                <a:extLst>
+                  <a:ext uri="{FF2B5EF4-FFF2-40B4-BE49-F238E27FC236}">
+                    <a16:creationId xmlns:a16="http://schemas.microsoft.com/office/drawing/2014/main" id="{25427CCD-AA75-4AAB-BB31-F593E4FB07F5}"/>
+                  </a:ext>
+                </a:extLst>
+              </p:cNvPr>
+              <p:cNvPicPr/>
+              <p:nvPr/>
+            </p:nvPicPr>
+            <p:blipFill>
+              <a:blip r:embed="rId63"/>
+              <a:stretch>
+                <a:fillRect/>
+              </a:stretch>
+            </p:blipFill>
+            <p:spPr>
+              <a:xfrm>
+                <a:off x="3903769" y="2971699"/>
+                <a:ext cx="744120" cy="51480"/>
+              </a:xfrm>
+              <a:prstGeom prst="rect">
+                <a:avLst/>
+              </a:prstGeom>
+            </p:spPr>
+          </p:pic>
+        </mc:Fallback>
+      </mc:AlternateContent>
     </p:spTree>
     <p:extLst>
       <p:ext uri="{BB962C8B-B14F-4D97-AF65-F5344CB8AC3E}">

</xml_diff>